<commit_message>
atualizacao tcc e slides
</commit_message>
<xml_diff>
--- a/liceu/3semestre/projeto integrador/tcc slide.pptx
+++ b/liceu/3semestre/projeto integrador/tcc slide.pptx
@@ -5,7 +5,7 @@
     <p:sldMasterId id="2147483648" r:id="rId1"/>
   </p:sldMasterIdLst>
   <p:notesMasterIdLst>
-    <p:notesMasterId r:id="rId21"/>
+    <p:notesMasterId r:id="rId22"/>
   </p:notesMasterIdLst>
   <p:sldIdLst>
     <p:sldId id="256" r:id="rId2"/>
@@ -25,8 +25,9 @@
     <p:sldId id="272" r:id="rId16"/>
     <p:sldId id="264" r:id="rId17"/>
     <p:sldId id="265" r:id="rId18"/>
-    <p:sldId id="266" r:id="rId19"/>
-    <p:sldId id="267" r:id="rId20"/>
+    <p:sldId id="276" r:id="rId19"/>
+    <p:sldId id="266" r:id="rId20"/>
+    <p:sldId id="267" r:id="rId21"/>
   </p:sldIdLst>
   <p:sldSz cx="12192000" cy="6858000"/>
   <p:notesSz cx="6858000" cy="9144000"/>
@@ -215,7 +216,7 @@
           <a:p>
             <a:fld id="{18320935-7879-4FC8-A6C9-17BE08BC5BEB}" type="datetimeFigureOut">
               <a:rPr lang="pt-BR" smtClean="0"/>
-              <a:t>20/05/2025</a:t>
+              <a:t>21/05/2025</a:t>
             </a:fld>
             <a:endParaRPr lang="pt-BR"/>
           </a:p>
@@ -629,7 +630,7 @@
           <a:p>
             <a:fld id="{055D9AF5-8B02-462A-998E-086C6BD146E3}" type="datetime1">
               <a:rPr lang="pt-BR" smtClean="0"/>
-              <a:t>20/05/2025</a:t>
+              <a:t>21/05/2025</a:t>
             </a:fld>
             <a:endParaRPr lang="pt-BR"/>
           </a:p>
@@ -827,7 +828,7 @@
           <a:p>
             <a:fld id="{258448AC-78A4-411F-B30C-72E16663FB27}" type="datetime1">
               <a:rPr lang="pt-BR" smtClean="0"/>
-              <a:t>20/05/2025</a:t>
+              <a:t>21/05/2025</a:t>
             </a:fld>
             <a:endParaRPr lang="pt-BR"/>
           </a:p>
@@ -1035,7 +1036,7 @@
           <a:p>
             <a:fld id="{9F1F3115-DB14-4321-8D36-A5960E5A90C2}" type="datetime1">
               <a:rPr lang="pt-BR" smtClean="0"/>
-              <a:t>20/05/2025</a:t>
+              <a:t>21/05/2025</a:t>
             </a:fld>
             <a:endParaRPr lang="pt-BR"/>
           </a:p>
@@ -1233,7 +1234,7 @@
           <a:p>
             <a:fld id="{D8C6E8C3-9067-43B2-BEF6-C1F5787FC74D}" type="datetime1">
               <a:rPr lang="pt-BR" smtClean="0"/>
-              <a:t>20/05/2025</a:t>
+              <a:t>21/05/2025</a:t>
             </a:fld>
             <a:endParaRPr lang="pt-BR"/>
           </a:p>
@@ -1508,7 +1509,7 @@
           <a:p>
             <a:fld id="{AEDAA854-EDC2-459C-AF0A-0D60AE43886D}" type="datetime1">
               <a:rPr lang="pt-BR" smtClean="0"/>
-              <a:t>20/05/2025</a:t>
+              <a:t>21/05/2025</a:t>
             </a:fld>
             <a:endParaRPr lang="pt-BR"/>
           </a:p>
@@ -1773,7 +1774,7 @@
           <a:p>
             <a:fld id="{5D91D852-DAA6-48D5-92B2-C187B4D9E703}" type="datetime1">
               <a:rPr lang="pt-BR" smtClean="0"/>
-              <a:t>20/05/2025</a:t>
+              <a:t>21/05/2025</a:t>
             </a:fld>
             <a:endParaRPr lang="pt-BR"/>
           </a:p>
@@ -2185,7 +2186,7 @@
           <a:p>
             <a:fld id="{CDC3A4EE-7EB3-49B0-B009-2BF3B4DB4BF7}" type="datetime1">
               <a:rPr lang="pt-BR" smtClean="0"/>
-              <a:t>20/05/2025</a:t>
+              <a:t>21/05/2025</a:t>
             </a:fld>
             <a:endParaRPr lang="pt-BR"/>
           </a:p>
@@ -2326,7 +2327,7 @@
           <a:p>
             <a:fld id="{224C9A1C-CA50-4622-B615-0639F6347B1D}" type="datetime1">
               <a:rPr lang="pt-BR" smtClean="0"/>
-              <a:t>20/05/2025</a:t>
+              <a:t>21/05/2025</a:t>
             </a:fld>
             <a:endParaRPr lang="pt-BR"/>
           </a:p>
@@ -2439,7 +2440,7 @@
           <a:p>
             <a:fld id="{3D6C1E11-059F-430B-ACAB-308983ADDB72}" type="datetime1">
               <a:rPr lang="pt-BR" smtClean="0"/>
-              <a:t>20/05/2025</a:t>
+              <a:t>21/05/2025</a:t>
             </a:fld>
             <a:endParaRPr lang="pt-BR"/>
           </a:p>
@@ -2750,7 +2751,7 @@
           <a:p>
             <a:fld id="{D818A351-4929-4117-9E02-9240FA4BEF66}" type="datetime1">
               <a:rPr lang="pt-BR" smtClean="0"/>
-              <a:t>20/05/2025</a:t>
+              <a:t>21/05/2025</a:t>
             </a:fld>
             <a:endParaRPr lang="pt-BR"/>
           </a:p>
@@ -3038,7 +3039,7 @@
           <a:p>
             <a:fld id="{0717CE0E-0A9C-4DE7-9D3C-C334C624287A}" type="datetime1">
               <a:rPr lang="pt-BR" smtClean="0"/>
-              <a:t>20/05/2025</a:t>
+              <a:t>21/05/2025</a:t>
             </a:fld>
             <a:endParaRPr lang="pt-BR"/>
           </a:p>
@@ -3279,7 +3280,7 @@
           <a:p>
             <a:fld id="{8DEF6C12-3CCD-4BA5-AA5A-B9FCBFB668F7}" type="datetime1">
               <a:rPr lang="pt-BR" smtClean="0"/>
-              <a:t>20/05/2025</a:t>
+              <a:t>21/05/2025</a:t>
             </a:fld>
             <a:endParaRPr lang="pt-BR"/>
           </a:p>
@@ -3921,7 +3922,7 @@
         </p:nvSpPr>
         <p:spPr>
           <a:xfrm>
-            <a:off x="1580113" y="1339195"/>
+            <a:off x="1580112" y="942458"/>
             <a:ext cx="9144000" cy="852211"/>
           </a:xfrm>
         </p:spPr>
@@ -3956,8 +3957,8 @@
         </p:nvSpPr>
         <p:spPr>
           <a:xfrm>
-            <a:off x="1276865" y="2345670"/>
-            <a:ext cx="9750495" cy="1896681"/>
+            <a:off x="901148" y="1696191"/>
+            <a:ext cx="9750495" cy="696632"/>
           </a:xfrm>
         </p:spPr>
         <p:txBody>
@@ -3972,7 +3973,7 @@
             </a:pPr>
             <a:r>
               <a:rPr lang="pt-BR" sz="2800" dirty="0"/>
-              <a:t>Diagrama de Caso de Uso</a:t>
+              <a:t>Diagramas de Caso de Uso</a:t>
             </a:r>
           </a:p>
         </p:txBody>
@@ -4044,6 +4045,134 @@
           <a:xfrm>
             <a:off x="8481392" y="273982"/>
             <a:ext cx="3142076" cy="852210"/>
+          </a:xfrm>
+          <a:prstGeom prst="rect">
+            <a:avLst/>
+          </a:prstGeom>
+        </p:spPr>
+      </p:pic>
+      <p:pic>
+        <p:nvPicPr>
+          <p:cNvPr id="6" name="Imagem 5" descr="Gráfico, Diagrama, Gráfico de bolhas&#10;&#10;O conteúdo gerado por IA pode estar incorreto.">
+            <a:extLst>
+              <a:ext uri="{FF2B5EF4-FFF2-40B4-BE49-F238E27FC236}">
+                <a16:creationId xmlns:a16="http://schemas.microsoft.com/office/drawing/2014/main" id="{EF4226C0-624E-EC78-CD63-CA5E34E06278}"/>
+              </a:ext>
+            </a:extLst>
+          </p:cNvPr>
+          <p:cNvPicPr>
+            <a:picLocks noChangeAspect="1"/>
+          </p:cNvPicPr>
+          <p:nvPr/>
+        </p:nvPicPr>
+        <p:blipFill>
+          <a:blip r:embed="rId4"/>
+          <a:stretch>
+            <a:fillRect/>
+          </a:stretch>
+        </p:blipFill>
+        <p:spPr>
+          <a:xfrm>
+            <a:off x="177985" y="3042257"/>
+            <a:ext cx="2927645" cy="2405413"/>
+          </a:xfrm>
+          <a:prstGeom prst="rect">
+            <a:avLst/>
+          </a:prstGeom>
+        </p:spPr>
+      </p:pic>
+      <p:pic>
+        <p:nvPicPr>
+          <p:cNvPr id="8" name="Imagem 7">
+            <a:extLst>
+              <a:ext uri="{FF2B5EF4-FFF2-40B4-BE49-F238E27FC236}">
+                <a16:creationId xmlns:a16="http://schemas.microsoft.com/office/drawing/2014/main" id="{388C6919-CB7A-556C-34D1-5732F9BC55A9}"/>
+              </a:ext>
+            </a:extLst>
+          </p:cNvPr>
+          <p:cNvPicPr>
+            <a:picLocks noChangeAspect="1"/>
+          </p:cNvPicPr>
+          <p:nvPr/>
+        </p:nvPicPr>
+        <p:blipFill>
+          <a:blip r:embed="rId5">
+            <a:extLst>
+              <a:ext uri="{28A0092B-C50C-407E-A947-70E740481C1C}">
+                <a14:useLocalDpi xmlns:a14="http://schemas.microsoft.com/office/drawing/2010/main" val="0"/>
+              </a:ext>
+            </a:extLst>
+          </a:blip>
+          <a:srcRect/>
+          <a:stretch>
+            <a:fillRect/>
+          </a:stretch>
+        </p:blipFill>
+        <p:spPr bwMode="auto">
+          <a:xfrm>
+            <a:off x="8938830" y="3094405"/>
+            <a:ext cx="3237610" cy="2512597"/>
+          </a:xfrm>
+          <a:prstGeom prst="rect">
+            <a:avLst/>
+          </a:prstGeom>
+          <a:noFill/>
+        </p:spPr>
+      </p:pic>
+      <p:pic>
+        <p:nvPicPr>
+          <p:cNvPr id="9" name="Imagem 8" descr="Gráfico, Gráfico de bolhas&#10;&#10;O conteúdo gerado por IA pode estar incorreto.">
+            <a:extLst>
+              <a:ext uri="{FF2B5EF4-FFF2-40B4-BE49-F238E27FC236}">
+                <a16:creationId xmlns:a16="http://schemas.microsoft.com/office/drawing/2014/main" id="{39A0BDB0-91D7-6B29-682F-D7976F7DA7EB}"/>
+              </a:ext>
+            </a:extLst>
+          </p:cNvPr>
+          <p:cNvPicPr>
+            <a:picLocks noChangeAspect="1"/>
+          </p:cNvPicPr>
+          <p:nvPr/>
+        </p:nvPicPr>
+        <p:blipFill>
+          <a:blip r:embed="rId6"/>
+          <a:stretch>
+            <a:fillRect/>
+          </a:stretch>
+        </p:blipFill>
+        <p:spPr>
+          <a:xfrm>
+            <a:off x="5776395" y="3042257"/>
+            <a:ext cx="3162435" cy="2616896"/>
+          </a:xfrm>
+          <a:prstGeom prst="rect">
+            <a:avLst/>
+          </a:prstGeom>
+        </p:spPr>
+      </p:pic>
+      <p:pic>
+        <p:nvPicPr>
+          <p:cNvPr id="11" name="Imagem 10">
+            <a:extLst>
+              <a:ext uri="{FF2B5EF4-FFF2-40B4-BE49-F238E27FC236}">
+                <a16:creationId xmlns:a16="http://schemas.microsoft.com/office/drawing/2014/main" id="{D1413A69-7077-7094-0BAF-AD4CDB6891BE}"/>
+              </a:ext>
+            </a:extLst>
+          </p:cNvPr>
+          <p:cNvPicPr>
+            <a:picLocks noChangeAspect="1"/>
+          </p:cNvPicPr>
+          <p:nvPr/>
+        </p:nvPicPr>
+        <p:blipFill>
+          <a:blip r:embed="rId7"/>
+          <a:stretch>
+            <a:fillRect/>
+          </a:stretch>
+        </p:blipFill>
+        <p:spPr>
+          <a:xfrm>
+            <a:off x="2875644" y="3099210"/>
+            <a:ext cx="2900751" cy="2502989"/>
           </a:xfrm>
           <a:prstGeom prst="rect">
             <a:avLst/>
@@ -4139,7 +4268,7 @@
         </p:spPr>
         <p:txBody>
           <a:bodyPr>
-            <a:normAutofit/>
+            <a:normAutofit lnSpcReduction="10000"/>
           </a:bodyPr>
           <a:lstStyle/>
           <a:p>
@@ -4202,16 +4331,22 @@
             </a:pPr>
             <a:r>
               <a:rPr lang="pt-BR" sz="2800" dirty="0"/>
-              <a:t>Banco de dados </a:t>
+              <a:t>Banco de dados MySql</a:t>
+            </a:r>
+          </a:p>
+          <a:p>
+            <a:pPr marL="457200" indent="-457200" algn="l">
+              <a:buFontTx/>
+              <a:buChar char="-"/>
+            </a:pPr>
+            <a:r>
+              <a:rPr lang="pt-BR" sz="2800" dirty="0"/>
+              <a:t>Comunicação com </a:t>
             </a:r>
             <a:r>
               <a:rPr lang="pt-BR" sz="2800" dirty="0" err="1"/>
-              <a:t>mySql</a:t>
-            </a:r>
-            <a:endParaRPr lang="pt-BR" sz="2800" dirty="0"/>
-          </a:p>
-          <a:p>
-            <a:pPr algn="l"/>
+              <a:t>socketIO</a:t>
+            </a:r>
             <a:endParaRPr lang="pt-BR" sz="2800" dirty="0"/>
           </a:p>
         </p:txBody>
@@ -4318,7 +4453,7 @@
         </p:blipFill>
         <p:spPr bwMode="auto">
           <a:xfrm>
-            <a:off x="7938053" y="4396615"/>
+            <a:off x="5992442" y="4489929"/>
             <a:ext cx="3431810" cy="1943799"/>
           </a:xfrm>
           <a:prstGeom prst="rect">
@@ -4365,8 +4500,8 @@
         </p:blipFill>
         <p:spPr bwMode="auto">
           <a:xfrm>
-            <a:off x="4732119" y="3816626"/>
-            <a:ext cx="2798565" cy="2798565"/>
+            <a:off x="3855247" y="4396615"/>
+            <a:ext cx="2137195" cy="2137195"/>
           </a:xfrm>
           <a:prstGeom prst="rect">
             <a:avLst/>
@@ -4412,8 +4547,55 @@
         </p:blipFill>
         <p:spPr bwMode="auto">
           <a:xfrm>
-            <a:off x="1045994" y="4396615"/>
-            <a:ext cx="3030715" cy="1298878"/>
+            <a:off x="734938" y="4715902"/>
+            <a:ext cx="2505051" cy="1073593"/>
+          </a:xfrm>
+          <a:prstGeom prst="rect">
+            <a:avLst/>
+          </a:prstGeom>
+          <a:noFill/>
+          <a:extLst>
+            <a:ext uri="{909E8E84-426E-40DD-AFC4-6F175D3DCCD1}">
+              <a14:hiddenFill xmlns:a14="http://schemas.microsoft.com/office/drawing/2010/main">
+                <a:solidFill>
+                  <a:srgbClr val="FFFFFF"/>
+                </a:solidFill>
+              </a14:hiddenFill>
+            </a:ext>
+          </a:extLst>
+        </p:spPr>
+      </p:pic>
+      <p:pic>
+        <p:nvPicPr>
+          <p:cNvPr id="6" name="Picture 4" descr="What's new in SocketIO 4?">
+            <a:extLst>
+              <a:ext uri="{FF2B5EF4-FFF2-40B4-BE49-F238E27FC236}">
+                <a16:creationId xmlns:a16="http://schemas.microsoft.com/office/drawing/2014/main" id="{3891E9E6-EF9A-72D5-B20A-BD05D125CDEC}"/>
+              </a:ext>
+            </a:extLst>
+          </p:cNvPr>
+          <p:cNvPicPr>
+            <a:picLocks noChangeAspect="1" noChangeArrowheads="1"/>
+          </p:cNvPicPr>
+          <p:nvPr/>
+        </p:nvPicPr>
+        <p:blipFill>
+          <a:blip r:embed="rId7">
+            <a:extLst>
+              <a:ext uri="{28A0092B-C50C-407E-A947-70E740481C1C}">
+                <a14:useLocalDpi xmlns:a14="http://schemas.microsoft.com/office/drawing/2010/main" val="0"/>
+              </a:ext>
+            </a:extLst>
+          </a:blip>
+          <a:srcRect/>
+          <a:stretch>
+            <a:fillRect/>
+          </a:stretch>
+        </p:blipFill>
+        <p:spPr bwMode="auto">
+          <a:xfrm>
+            <a:off x="8988417" y="4788052"/>
+            <a:ext cx="2767748" cy="1298823"/>
           </a:xfrm>
           <a:prstGeom prst="rect">
             <a:avLst/>
@@ -4659,7 +4841,7 @@
         </p:nvSpPr>
         <p:spPr>
           <a:xfrm>
-            <a:off x="1580113" y="1339195"/>
+            <a:off x="1524000" y="1120679"/>
             <a:ext cx="9144000" cy="852211"/>
           </a:xfrm>
         </p:spPr>
@@ -4694,8 +4876,8 @@
         </p:nvSpPr>
         <p:spPr>
           <a:xfrm>
-            <a:off x="1276865" y="2345670"/>
-            <a:ext cx="9750495" cy="1896681"/>
+            <a:off x="301935" y="2006425"/>
+            <a:ext cx="9750495" cy="540868"/>
           </a:xfrm>
         </p:spPr>
         <p:txBody>
@@ -4786,6 +4968,42 @@
           <a:xfrm>
             <a:off x="8481392" y="273982"/>
             <a:ext cx="3142076" cy="852210"/>
+          </a:xfrm>
+          <a:prstGeom prst="rect">
+            <a:avLst/>
+          </a:prstGeom>
+        </p:spPr>
+      </p:pic>
+      <p:pic>
+        <p:nvPicPr>
+          <p:cNvPr id="7" name="Imagem 6" descr="Forma, Polígono&#10;&#10;O conteúdo gerado por IA pode estar incorreto.">
+            <a:extLst>
+              <a:ext uri="{FF2B5EF4-FFF2-40B4-BE49-F238E27FC236}">
+                <a16:creationId xmlns:a16="http://schemas.microsoft.com/office/drawing/2014/main" id="{B84E8023-3A70-574E-B2D2-931FC3EA51D5}"/>
+              </a:ext>
+            </a:extLst>
+          </p:cNvPr>
+          <p:cNvPicPr>
+            <a:picLocks noChangeAspect="1"/>
+          </p:cNvPicPr>
+          <p:nvPr/>
+        </p:nvPicPr>
+        <p:blipFill>
+          <a:blip r:embed="rId4">
+            <a:extLst>
+              <a:ext uri="{28A0092B-C50C-407E-A947-70E740481C1C}">
+                <a14:useLocalDpi xmlns:a14="http://schemas.microsoft.com/office/drawing/2010/main" val="0"/>
+              </a:ext>
+            </a:extLst>
+          </a:blip>
+          <a:stretch>
+            <a:fillRect/>
+          </a:stretch>
+        </p:blipFill>
+        <p:spPr>
+          <a:xfrm>
+            <a:off x="2266899" y="2443839"/>
+            <a:ext cx="7482994" cy="4207130"/>
           </a:xfrm>
           <a:prstGeom prst="rect">
             <a:avLst/>
@@ -5453,16 +5671,6 @@
               <a:t>CONSIDERAÇÕES FINAIS</a:t>
             </a:r>
           </a:p>
-          <a:p>
-            <a:pPr marL="457200" indent="-457200" algn="l">
-              <a:buFontTx/>
-              <a:buChar char="-"/>
-            </a:pPr>
-            <a:r>
-              <a:rPr lang="pt-BR" sz="3200" dirty="0"/>
-              <a:t>SUGESTÕES PARA TRABALHOS FUTUROS</a:t>
-            </a:r>
-          </a:p>
         </p:txBody>
       </p:sp>
       <p:pic>
@@ -5556,7 +5764,13 @@
   <p:cSld>
     <p:spTree>
       <p:nvGrpSpPr>
-        <p:cNvPr id="1" name=""/>
+        <p:cNvPr id="1" name="">
+          <a:extLst>
+            <a:ext uri="{FF2B5EF4-FFF2-40B4-BE49-F238E27FC236}">
+              <a16:creationId xmlns:a16="http://schemas.microsoft.com/office/drawing/2014/main" id="{DC9C449D-B2EE-73E6-9FE8-B2F4AD054168}"/>
+            </a:ext>
+          </a:extLst>
+        </p:cNvPr>
         <p:cNvGrpSpPr/>
         <p:nvPr/>
       </p:nvGrpSpPr>
@@ -5573,7 +5787,7 @@
           <p:cNvPr id="2" name="Título 1">
             <a:extLst>
               <a:ext uri="{FF2B5EF4-FFF2-40B4-BE49-F238E27FC236}">
-                <a16:creationId xmlns:a16="http://schemas.microsoft.com/office/drawing/2014/main" id="{5E447ACB-E7DF-4BBE-AC44-A1AC9F22CAC8}"/>
+                <a16:creationId xmlns:a16="http://schemas.microsoft.com/office/drawing/2014/main" id="{9E212F2F-EF2E-4668-E430-6AE92ED06C11}"/>
               </a:ext>
             </a:extLst>
           </p:cNvPr>
@@ -5586,7 +5800,7 @@
         </p:nvSpPr>
         <p:spPr>
           <a:xfrm>
-            <a:off x="1580113" y="2024615"/>
+            <a:off x="1648479" y="1411357"/>
             <a:ext cx="9144000" cy="852211"/>
           </a:xfrm>
         </p:spPr>
@@ -5598,7 +5812,7 @@
           <a:p>
             <a:r>
               <a:rPr lang="pt-BR" sz="4800" dirty="0"/>
-              <a:t>REFERÊNCIAS</a:t>
+              <a:t>TRABALHOS FUTUROS</a:t>
             </a:r>
           </a:p>
         </p:txBody>
@@ -5608,7 +5822,7 @@
           <p:cNvPr id="3" name="Subtítulo 2">
             <a:extLst>
               <a:ext uri="{FF2B5EF4-FFF2-40B4-BE49-F238E27FC236}">
-                <a16:creationId xmlns:a16="http://schemas.microsoft.com/office/drawing/2014/main" id="{D925F25B-ABDD-439F-B7AE-9A79A3FDC1CE}"/>
+                <a16:creationId xmlns:a16="http://schemas.microsoft.com/office/drawing/2014/main" id="{F0FD4423-35C9-AC93-1655-A586ED74B7AB}"/>
               </a:ext>
             </a:extLst>
           </p:cNvPr>
@@ -5621,8 +5835,8 @@
         </p:nvSpPr>
         <p:spPr>
           <a:xfrm>
-            <a:off x="1580113" y="3139144"/>
-            <a:ext cx="9750495" cy="1644891"/>
+            <a:off x="1345231" y="2548733"/>
+            <a:ext cx="9750495" cy="2307499"/>
           </a:xfrm>
         </p:spPr>
         <p:txBody>
@@ -5636,8 +5850,36 @@
               <a:buChar char="-"/>
             </a:pPr>
             <a:r>
-              <a:rPr lang="pt-BR" sz="3200" dirty="0"/>
-              <a:t>PRINCIPAIS FONTES UTILIZADAS (FORMATO ABNT)</a:t>
+              <a:rPr lang="pt-BR" sz="3600" dirty="0"/>
+              <a:t>Expansão para outras escolas e séries</a:t>
+            </a:r>
+          </a:p>
+          <a:p>
+            <a:pPr marL="457200" indent="-457200" algn="l">
+              <a:buFontTx/>
+              <a:buChar char="-"/>
+            </a:pPr>
+            <a:r>
+              <a:rPr lang="pt-BR" sz="3600" dirty="0"/>
+              <a:t>Testes de longo prazo</a:t>
+            </a:r>
+          </a:p>
+          <a:p>
+            <a:pPr marL="457200" indent="-457200" algn="l">
+              <a:buFontTx/>
+              <a:buChar char="-"/>
+            </a:pPr>
+            <a:r>
+              <a:rPr lang="pt-BR" sz="3600" dirty="0"/>
+              <a:t>Integração de </a:t>
+            </a:r>
+            <a:r>
+              <a:rPr lang="pt-BR" sz="3600" dirty="0" err="1"/>
+              <a:t>analytics</a:t>
+            </a:r>
+            <a:r>
+              <a:rPr lang="pt-BR" sz="3600" dirty="0"/>
+              <a:t> avançados e AI</a:t>
             </a:r>
           </a:p>
         </p:txBody>
@@ -5647,7 +5889,7 @@
           <p:cNvPr id="4" name="Imagem 3">
             <a:extLst>
               <a:ext uri="{FF2B5EF4-FFF2-40B4-BE49-F238E27FC236}">
-                <a16:creationId xmlns:a16="http://schemas.microsoft.com/office/drawing/2014/main" id="{4DE49855-8442-4D60-81FD-DFE2DB045AC2}"/>
+                <a16:creationId xmlns:a16="http://schemas.microsoft.com/office/drawing/2014/main" id="{493A8972-D029-D532-6E31-0E0FB637787E}"/>
               </a:ext>
             </a:extLst>
           </p:cNvPr>
@@ -5686,7 +5928,7 @@
           <p:cNvPr id="5" name="Imagem 4">
             <a:extLst>
               <a:ext uri="{FF2B5EF4-FFF2-40B4-BE49-F238E27FC236}">
-                <a16:creationId xmlns:a16="http://schemas.microsoft.com/office/drawing/2014/main" id="{00EB44F1-66E6-49A0-94D9-09FA009430BD}"/>
+                <a16:creationId xmlns:a16="http://schemas.microsoft.com/office/drawing/2014/main" id="{3CA44AA8-F467-9730-06C7-AAB4DB61E516}"/>
               </a:ext>
             </a:extLst>
           </p:cNvPr>
@@ -5718,7 +5960,7 @@
     </p:spTree>
     <p:extLst>
       <p:ext uri="{BB962C8B-B14F-4D97-AF65-F5344CB8AC3E}">
-        <p14:creationId xmlns:p14="http://schemas.microsoft.com/office/powerpoint/2010/main" val="3994031553"/>
+        <p14:creationId xmlns:p14="http://schemas.microsoft.com/office/powerpoint/2010/main" val="3658637"/>
       </p:ext>
     </p:extLst>
   </p:cSld>
@@ -5775,7 +6017,7 @@
           <a:p>
             <a:r>
               <a:rPr lang="pt-BR" sz="4800" dirty="0"/>
-              <a:t>AGRADECIMENTOS (OPCIONAL)</a:t>
+              <a:t>REFERÊNCIAS</a:t>
             </a:r>
           </a:p>
         </p:txBody>
@@ -5813,10 +6055,9 @@
               <a:buChar char="-"/>
             </a:pPr>
             <a:r>
-              <a:rPr lang="pt-BR" sz="3200"/>
-              <a:t>AGRADECIMENTOS À FAMÍLIA, PROFESSORES, COLEGAS, ETC)</a:t>
-            </a:r>
-            <a:endParaRPr lang="pt-BR" sz="3200" dirty="0"/>
+              <a:rPr lang="pt-BR" sz="3200" dirty="0"/>
+              <a:t>PRINCIPAIS FONTES UTILIZADAS (FORMATO ABNT)</a:t>
+            </a:r>
           </a:p>
         </p:txBody>
       </p:sp>
@@ -5896,7 +6137,7 @@
     </p:spTree>
     <p:extLst>
       <p:ext uri="{BB962C8B-B14F-4D97-AF65-F5344CB8AC3E}">
-        <p14:creationId xmlns:p14="http://schemas.microsoft.com/office/powerpoint/2010/main" val="3923686523"/>
+        <p14:creationId xmlns:p14="http://schemas.microsoft.com/office/powerpoint/2010/main" val="3994031553"/>
       </p:ext>
     </p:extLst>
   </p:cSld>
@@ -6002,7 +6243,7 @@
             </a:pPr>
             <a:r>
               <a:rPr lang="pt-BR" sz="3200" dirty="0"/>
-              <a:t>A falta atrativos no ensino atual impacta no aprendizado da nova geração.</a:t>
+              <a:t>A falta atrativos impacta no aprendizado.</a:t>
             </a:r>
           </a:p>
           <a:p>
@@ -6095,6 +6336,184 @@
     <p:extLst>
       <p:ext uri="{BB962C8B-B14F-4D97-AF65-F5344CB8AC3E}">
         <p14:creationId xmlns:p14="http://schemas.microsoft.com/office/powerpoint/2010/main" val="284917026"/>
+      </p:ext>
+    </p:extLst>
+  </p:cSld>
+  <p:clrMapOvr>
+    <a:masterClrMapping/>
+  </p:clrMapOvr>
+</p:sld>
+</file>
+
+<file path=ppt/slides/slide20.xml><?xml version="1.0" encoding="utf-8"?>
+<p:sld xmlns:a="http://schemas.openxmlformats.org/drawingml/2006/main" xmlns:r="http://schemas.openxmlformats.org/officeDocument/2006/relationships" xmlns:p="http://schemas.openxmlformats.org/presentationml/2006/main">
+  <p:cSld>
+    <p:spTree>
+      <p:nvGrpSpPr>
+        <p:cNvPr id="1" name=""/>
+        <p:cNvGrpSpPr/>
+        <p:nvPr/>
+      </p:nvGrpSpPr>
+      <p:grpSpPr>
+        <a:xfrm>
+          <a:off x="0" y="0"/>
+          <a:ext cx="0" cy="0"/>
+          <a:chOff x="0" y="0"/>
+          <a:chExt cx="0" cy="0"/>
+        </a:xfrm>
+      </p:grpSpPr>
+      <p:sp>
+        <p:nvSpPr>
+          <p:cNvPr id="2" name="Título 1">
+            <a:extLst>
+              <a:ext uri="{FF2B5EF4-FFF2-40B4-BE49-F238E27FC236}">
+                <a16:creationId xmlns:a16="http://schemas.microsoft.com/office/drawing/2014/main" id="{5E447ACB-E7DF-4BBE-AC44-A1AC9F22CAC8}"/>
+              </a:ext>
+            </a:extLst>
+          </p:cNvPr>
+          <p:cNvSpPr>
+            <a:spLocks noGrp="1"/>
+          </p:cNvSpPr>
+          <p:nvPr>
+            <p:ph type="ctrTitle"/>
+          </p:nvPr>
+        </p:nvSpPr>
+        <p:spPr>
+          <a:xfrm>
+            <a:off x="1580113" y="2024615"/>
+            <a:ext cx="9144000" cy="852211"/>
+          </a:xfrm>
+        </p:spPr>
+        <p:txBody>
+          <a:bodyPr>
+            <a:noAutofit/>
+          </a:bodyPr>
+          <a:lstStyle/>
+          <a:p>
+            <a:r>
+              <a:rPr lang="pt-BR" sz="4800" dirty="0"/>
+              <a:t>AGRADECIMENTOS (OPCIONAL)</a:t>
+            </a:r>
+          </a:p>
+        </p:txBody>
+      </p:sp>
+      <p:sp>
+        <p:nvSpPr>
+          <p:cNvPr id="3" name="Subtítulo 2">
+            <a:extLst>
+              <a:ext uri="{FF2B5EF4-FFF2-40B4-BE49-F238E27FC236}">
+                <a16:creationId xmlns:a16="http://schemas.microsoft.com/office/drawing/2014/main" id="{D925F25B-ABDD-439F-B7AE-9A79A3FDC1CE}"/>
+              </a:ext>
+            </a:extLst>
+          </p:cNvPr>
+          <p:cNvSpPr>
+            <a:spLocks noGrp="1"/>
+          </p:cNvSpPr>
+          <p:nvPr>
+            <p:ph type="subTitle" idx="1"/>
+          </p:nvPr>
+        </p:nvSpPr>
+        <p:spPr>
+          <a:xfrm>
+            <a:off x="1580113" y="3139144"/>
+            <a:ext cx="9750495" cy="1644891"/>
+          </a:xfrm>
+        </p:spPr>
+        <p:txBody>
+          <a:bodyPr>
+            <a:normAutofit/>
+          </a:bodyPr>
+          <a:lstStyle/>
+          <a:p>
+            <a:pPr marL="457200" indent="-457200" algn="l">
+              <a:buFontTx/>
+              <a:buChar char="-"/>
+            </a:pPr>
+            <a:r>
+              <a:rPr lang="pt-BR" sz="3200"/>
+              <a:t>AGRADECIMENTOS À FAMÍLIA, PROFESSORES, COLEGAS, ETC)</a:t>
+            </a:r>
+            <a:endParaRPr lang="pt-BR" sz="3200" dirty="0"/>
+          </a:p>
+        </p:txBody>
+      </p:sp>
+      <p:pic>
+        <p:nvPicPr>
+          <p:cNvPr id="4" name="Imagem 3">
+            <a:extLst>
+              <a:ext uri="{FF2B5EF4-FFF2-40B4-BE49-F238E27FC236}">
+                <a16:creationId xmlns:a16="http://schemas.microsoft.com/office/drawing/2014/main" id="{4DE49855-8442-4D60-81FD-DFE2DB045AC2}"/>
+              </a:ext>
+            </a:extLst>
+          </p:cNvPr>
+          <p:cNvPicPr/>
+          <p:nvPr/>
+        </p:nvPicPr>
+        <p:blipFill>
+          <a:blip r:embed="rId2">
+            <a:extLst>
+              <a:ext uri="{28A0092B-C50C-407E-A947-70E740481C1C}">
+                <a14:useLocalDpi xmlns:a14="http://schemas.microsoft.com/office/drawing/2010/main" val="0"/>
+              </a:ext>
+            </a:extLst>
+          </a:blip>
+          <a:srcRect/>
+          <a:stretch>
+            <a:fillRect/>
+          </a:stretch>
+        </p:blipFill>
+        <p:spPr bwMode="auto">
+          <a:xfrm>
+            <a:off x="901148" y="207031"/>
+            <a:ext cx="1958215" cy="977900"/>
+          </a:xfrm>
+          <a:prstGeom prst="rect">
+            <a:avLst/>
+          </a:prstGeom>
+          <a:noFill/>
+          <a:ln>
+            <a:noFill/>
+          </a:ln>
+        </p:spPr>
+      </p:pic>
+      <p:pic>
+        <p:nvPicPr>
+          <p:cNvPr id="5" name="Imagem 4">
+            <a:extLst>
+              <a:ext uri="{FF2B5EF4-FFF2-40B4-BE49-F238E27FC236}">
+                <a16:creationId xmlns:a16="http://schemas.microsoft.com/office/drawing/2014/main" id="{00EB44F1-66E6-49A0-94D9-09FA009430BD}"/>
+              </a:ext>
+            </a:extLst>
+          </p:cNvPr>
+          <p:cNvPicPr/>
+          <p:nvPr/>
+        </p:nvPicPr>
+        <p:blipFill>
+          <a:blip r:embed="rId3">
+            <a:extLst>
+              <a:ext uri="{28A0092B-C50C-407E-A947-70E740481C1C}">
+                <a14:useLocalDpi xmlns:a14="http://schemas.microsoft.com/office/drawing/2010/main" val="0"/>
+              </a:ext>
+            </a:extLst>
+          </a:blip>
+          <a:stretch>
+            <a:fillRect/>
+          </a:stretch>
+        </p:blipFill>
+        <p:spPr>
+          <a:xfrm>
+            <a:off x="8481392" y="273982"/>
+            <a:ext cx="3142076" cy="852210"/>
+          </a:xfrm>
+          <a:prstGeom prst="rect">
+            <a:avLst/>
+          </a:prstGeom>
+        </p:spPr>
+      </p:pic>
+    </p:spTree>
+    <p:extLst>
+      <p:ext uri="{BB962C8B-B14F-4D97-AF65-F5344CB8AC3E}">
+        <p14:creationId xmlns:p14="http://schemas.microsoft.com/office/powerpoint/2010/main" val="3923686523"/>
       </p:ext>
     </p:extLst>
   </p:cSld>
@@ -6190,7 +6609,7 @@
             </a:pPr>
             <a:r>
               <a:rPr lang="pt-BR" sz="3200" dirty="0"/>
-              <a:t>Me formei no Ensino Médio em 2023, e não conheci nenhuma ferramenta de auxilio atraente.</a:t>
+              <a:t>Motivação pessoal: experiência de 2023 sem ferramentas atrativas</a:t>
             </a:r>
           </a:p>
           <a:p>
@@ -6200,7 +6619,7 @@
             </a:pPr>
             <a:r>
               <a:rPr lang="pt-BR" sz="3200" dirty="0"/>
-              <a:t>Creio que com plataformas atrativas o ensino consegue ser mais leve e eficaz.</a:t>
+              <a:t>Com plataformas atrativas o ensino consegue ser mais leve e eficaz.</a:t>
             </a:r>
             <a:endParaRPr lang="pt-BR" sz="2800" dirty="0"/>
           </a:p>
@@ -6367,12 +6786,12 @@
         <p:spPr>
           <a:xfrm>
             <a:off x="1580114" y="2949713"/>
-            <a:ext cx="9144000" cy="2311399"/>
+            <a:ext cx="9144000" cy="2869973"/>
           </a:xfrm>
         </p:spPr>
         <p:txBody>
           <a:bodyPr>
-            <a:normAutofit lnSpcReduction="10000"/>
+            <a:noAutofit/>
           </a:bodyPr>
           <a:lstStyle/>
           <a:p>
@@ -6382,7 +6801,7 @@
             </a:pPr>
             <a:r>
               <a:rPr lang="pt-BR" sz="3200" dirty="0"/>
-              <a:t>Este trabalho busca resolver o problema da evasão escolar no Brasil, focando no Ensino Médio.</a:t>
+              <a:t>Queda de engajamento e aumento da evasão no Ensino Médio</a:t>
             </a:r>
           </a:p>
           <a:p>
@@ -6392,8 +6811,39 @@
             </a:pPr>
             <a:r>
               <a:rPr lang="pt-BR" sz="3200" dirty="0"/>
-              <a:t>Também serve para facilitar o processo de ensino dos estudantes e fomentar uma disputa saudável entre colegas de turma.</a:t>
-            </a:r>
+              <a:t>Como tornar o estudo mais atrativo e competitivo?</a:t>
+            </a:r>
+          </a:p>
+          <a:p>
+            <a:pPr marL="457200" indent="-457200" algn="l">
+              <a:buFontTx/>
+              <a:buChar char="-"/>
+            </a:pPr>
+            <a:r>
+              <a:rPr lang="pt-BR" sz="3200" dirty="0"/>
+              <a:t>Pesquisa foca em: </a:t>
+            </a:r>
+            <a:r>
+              <a:rPr lang="pt-BR" sz="3200" b="1" dirty="0"/>
+              <a:t>disputa saudável</a:t>
+            </a:r>
+            <a:r>
+              <a:rPr lang="pt-BR" sz="3200" dirty="0"/>
+              <a:t>, </a:t>
+            </a:r>
+            <a:r>
+              <a:rPr lang="pt-BR" sz="3200" b="1" dirty="0"/>
+              <a:t>interação em tempo real</a:t>
+            </a:r>
+            <a:r>
+              <a:rPr lang="pt-BR" sz="3200" dirty="0"/>
+              <a:t>, </a:t>
+            </a:r>
+            <a:r>
+              <a:rPr lang="pt-BR" sz="3200" b="1" dirty="0"/>
+              <a:t>feedback imediato</a:t>
+            </a:r>
+            <a:endParaRPr lang="pt-BR" sz="3200" dirty="0"/>
           </a:p>
         </p:txBody>
       </p:sp>
@@ -6559,7 +7009,7 @@
         </p:spPr>
         <p:txBody>
           <a:bodyPr>
-            <a:normAutofit fontScale="92500"/>
+            <a:normAutofit/>
           </a:bodyPr>
           <a:lstStyle/>
           <a:p>
@@ -6568,8 +7018,12 @@
               <a:buChar char="-"/>
             </a:pPr>
             <a:r>
+              <a:rPr lang="pt-BR" sz="3200" b="1" dirty="0"/>
+              <a:t>Geral:</a:t>
+            </a:r>
+            <a:r>
               <a:rPr lang="pt-BR" sz="3200" dirty="0"/>
-              <a:t>Criar uma plataforma de ensino atrativa e eficaz, capaz de entreter o aluno no processo de aprendizado.</a:t>
+              <a:t> Desenvolver a plataforma web Play2Learn</a:t>
             </a:r>
           </a:p>
           <a:p>
@@ -6578,36 +7032,42 @@
               <a:buChar char="-"/>
             </a:pPr>
             <a:r>
+              <a:rPr lang="pt-BR" sz="3200" b="1" dirty="0"/>
+              <a:t>Específicos</a:t>
+            </a:r>
+            <a:r>
               <a:rPr lang="pt-BR" sz="3200" dirty="0"/>
-              <a:t>Fazer uma plataforma com sistema de </a:t>
-            </a:r>
-            <a:r>
-              <a:rPr lang="pt-BR" sz="3200" dirty="0" err="1"/>
-              <a:t>raking</a:t>
-            </a:r>
+              <a:t>:</a:t>
+            </a:r>
+          </a:p>
+          <a:p>
+            <a:pPr marL="914400" lvl="1" indent="-457200" algn="l">
+              <a:buFont typeface="+mj-lt"/>
+              <a:buAutoNum type="arabicPeriod"/>
+            </a:pPr>
             <a:r>
               <a:rPr lang="pt-BR" sz="3200" dirty="0"/>
-              <a:t> de sala.</a:t>
-            </a:r>
-          </a:p>
-          <a:p>
-            <a:pPr marL="457200" indent="-457200" algn="l">
-              <a:buFontTx/>
-              <a:buChar char="-"/>
+              <a:t>Sistema de ranking por sala</a:t>
+            </a:r>
+          </a:p>
+          <a:p>
+            <a:pPr marL="914400" lvl="1" indent="-457200" algn="l">
+              <a:buFont typeface="+mj-lt"/>
+              <a:buAutoNum type="arabicPeriod"/>
             </a:pPr>
             <a:r>
               <a:rPr lang="pt-BR" sz="3200" dirty="0"/>
-              <a:t>Fazer uma plataforma com sistema de divisões dentro de cada disciplina.</a:t>
-            </a:r>
-          </a:p>
-          <a:p>
-            <a:pPr marL="457200" indent="-457200" algn="l">
-              <a:buFontTx/>
-              <a:buChar char="-"/>
+              <a:t>Divisões de elos por disciplina</a:t>
+            </a:r>
+          </a:p>
+          <a:p>
+            <a:pPr marL="914400" lvl="1" indent="-457200" algn="l">
+              <a:buFont typeface="+mj-lt"/>
+              <a:buAutoNum type="arabicPeriod"/>
             </a:pPr>
             <a:r>
               <a:rPr lang="pt-BR" sz="3200" dirty="0"/>
-              <a:t>Fazer uma plataforma com interação em tempo real entre alunos.</a:t>
+              <a:t>Modo multiplayer em tempo real</a:t>
             </a:r>
           </a:p>
         </p:txBody>
@@ -6856,11 +7316,11 @@
               <a:buChar char="•"/>
             </a:pPr>
             <a:r>
-              <a:rPr lang="pt-BR" sz="2200" b="1" dirty="0"/>
+              <a:rPr lang="pt-BR" sz="1800" b="1" dirty="0"/>
               <a:t>Freire (1996) - </a:t>
             </a:r>
             <a:r>
-              <a:rPr lang="pt-BR" sz="2200" dirty="0"/>
+              <a:rPr lang="pt-BR" sz="1800" dirty="0"/>
               <a:t>Educação libertadora; protagonismo do estudante</a:t>
             </a:r>
           </a:p>
@@ -6870,11 +7330,11 @@
               <a:buChar char="•"/>
             </a:pPr>
             <a:r>
-              <a:rPr lang="pt-BR" sz="2200" b="1" dirty="0"/>
+              <a:rPr lang="pt-BR" sz="1800" b="1" dirty="0"/>
               <a:t>Moran (2015) - </a:t>
             </a:r>
             <a:r>
-              <a:rPr lang="pt-BR" sz="2200" dirty="0"/>
+              <a:rPr lang="pt-BR" sz="1800" dirty="0"/>
               <a:t>Ambiente digital; dinamicidade e hipermídia</a:t>
             </a:r>
           </a:p>
@@ -6884,15 +7344,15 @@
               <a:buChar char="•"/>
             </a:pPr>
             <a:r>
-              <a:rPr lang="pt-BR" sz="2200" b="1" dirty="0" err="1"/>
+              <a:rPr lang="pt-BR" sz="1800" b="1" dirty="0" err="1"/>
               <a:t>Deci</a:t>
             </a:r>
             <a:r>
-              <a:rPr lang="pt-BR" sz="2200" b="1" dirty="0"/>
+              <a:rPr lang="pt-BR" sz="1800" b="1" dirty="0"/>
               <a:t> &amp; Ryan (2000) - </a:t>
             </a:r>
             <a:r>
-              <a:rPr lang="pt-BR" sz="2200" dirty="0"/>
+              <a:rPr lang="pt-BR" sz="1800" dirty="0"/>
               <a:t>Teoria da autodeterminação (autonomia, competência)</a:t>
             </a:r>
           </a:p>
@@ -6902,14 +7362,14 @@
               <a:buChar char="•"/>
             </a:pPr>
             <a:r>
-              <a:rPr lang="pt-BR" sz="2200" b="1" dirty="0"/>
+              <a:rPr lang="pt-BR" sz="1800" b="1" dirty="0"/>
               <a:t>Skinner (1938) - </a:t>
             </a:r>
             <a:r>
-              <a:rPr lang="pt-BR" sz="2200" dirty="0"/>
+              <a:rPr lang="pt-BR" sz="1800" dirty="0"/>
               <a:t>Condicionamento operante; reforços positivos</a:t>
             </a:r>
-            <a:endParaRPr lang="pt-BR" sz="2200" b="1" dirty="0"/>
+            <a:endParaRPr lang="pt-BR" sz="1800" b="1" dirty="0"/>
           </a:p>
           <a:p>
             <a:pPr algn="l">
@@ -6917,14 +7377,14 @@
               <a:buChar char="•"/>
             </a:pPr>
             <a:r>
-              <a:rPr lang="pt-BR" sz="2200" b="1" dirty="0"/>
+              <a:rPr lang="pt-BR" sz="1800" b="1" dirty="0"/>
               <a:t>Piaget (1972) &amp; Vygotsky (1978) - </a:t>
             </a:r>
             <a:r>
-              <a:rPr lang="pt-BR" sz="2200" dirty="0"/>
+              <a:rPr lang="pt-BR" sz="1800" dirty="0"/>
               <a:t>Construtivismo; Zona de Desenvolvimento Proximal</a:t>
             </a:r>
-            <a:endParaRPr lang="pt-BR" sz="2200" b="1" dirty="0"/>
+            <a:endParaRPr lang="pt-BR" sz="1800" b="1" dirty="0"/>
           </a:p>
           <a:p>
             <a:pPr algn="l">
@@ -6932,30 +7392,30 @@
               <a:buChar char="•"/>
             </a:pPr>
             <a:r>
-              <a:rPr lang="pt-BR" sz="2200" b="1" dirty="0"/>
+              <a:rPr lang="pt-BR" sz="1800" b="1" dirty="0"/>
               <a:t>Garris, </a:t>
             </a:r>
             <a:r>
-              <a:rPr lang="pt-BR" sz="2200" b="1" dirty="0" err="1"/>
+              <a:rPr lang="pt-BR" sz="1800" b="1" dirty="0" err="1"/>
               <a:t>Ahlers</a:t>
             </a:r>
             <a:r>
-              <a:rPr lang="pt-BR" sz="2200" b="1" dirty="0"/>
+              <a:rPr lang="pt-BR" sz="1800" b="1" dirty="0"/>
               <a:t> &amp; </a:t>
             </a:r>
             <a:r>
-              <a:rPr lang="pt-BR" sz="2200" b="1" dirty="0" err="1"/>
+              <a:rPr lang="pt-BR" sz="1800" b="1" dirty="0" err="1"/>
               <a:t>Driskell</a:t>
             </a:r>
             <a:r>
-              <a:rPr lang="pt-BR" sz="2200" b="1" dirty="0"/>
+              <a:rPr lang="pt-BR" sz="1800" b="1" dirty="0"/>
               <a:t> (2002) - </a:t>
             </a:r>
             <a:r>
-              <a:rPr lang="pt-BR" sz="2200" dirty="0"/>
+              <a:rPr lang="pt-BR" sz="1800" dirty="0"/>
               <a:t>Modelo CARPE (Feedback em jogos)</a:t>
             </a:r>
-            <a:endParaRPr lang="pt-BR" sz="2200" b="1" dirty="0"/>
+            <a:endParaRPr lang="pt-BR" sz="1800" b="1" dirty="0"/>
           </a:p>
           <a:p>
             <a:pPr algn="l">
@@ -6963,30 +7423,30 @@
               <a:buChar char="•"/>
             </a:pPr>
             <a:r>
-              <a:rPr lang="pt-BR" sz="2200" b="1" dirty="0"/>
+              <a:rPr lang="pt-BR" sz="1800" b="1" dirty="0"/>
               <a:t>Bittencourt, </a:t>
             </a:r>
             <a:r>
-              <a:rPr lang="pt-BR" sz="2200" b="1" dirty="0" err="1"/>
+              <a:rPr lang="pt-BR" sz="1800" b="1" dirty="0" err="1"/>
               <a:t>Cazella</a:t>
             </a:r>
             <a:r>
-              <a:rPr lang="pt-BR" sz="2200" b="1" dirty="0"/>
+              <a:rPr lang="pt-BR" sz="1800" b="1" dirty="0"/>
               <a:t> &amp; </a:t>
             </a:r>
             <a:r>
-              <a:rPr lang="pt-BR" sz="2200" b="1" dirty="0" err="1"/>
+              <a:rPr lang="pt-BR" sz="1800" b="1" dirty="0" err="1"/>
               <a:t>Isotani</a:t>
             </a:r>
             <a:r>
-              <a:rPr lang="pt-BR" sz="2200" b="1" dirty="0"/>
+              <a:rPr lang="pt-BR" sz="1800" b="1" dirty="0"/>
               <a:t> (2016) - </a:t>
             </a:r>
             <a:r>
-              <a:rPr lang="pt-BR" sz="2200" dirty="0"/>
+              <a:rPr lang="pt-BR" sz="1800" dirty="0"/>
               <a:t>Ambientes flexíveis e interativos</a:t>
             </a:r>
-            <a:endParaRPr lang="pt-BR" sz="2200" b="1" dirty="0"/>
+            <a:endParaRPr lang="pt-BR" sz="1800" b="1" dirty="0"/>
           </a:p>
           <a:p>
             <a:pPr algn="l">
@@ -6994,14 +7454,14 @@
               <a:buChar char="•"/>
             </a:pPr>
             <a:r>
-              <a:rPr lang="pt-BR" sz="2200" b="1" dirty="0"/>
+              <a:rPr lang="pt-BR" sz="1800" b="1" dirty="0"/>
               <a:t>UNESCO (2021) - </a:t>
             </a:r>
             <a:r>
-              <a:rPr lang="pt-BR" sz="2200" dirty="0"/>
+              <a:rPr lang="pt-BR" sz="1800" dirty="0"/>
               <a:t>Integração de ferramentas digitais</a:t>
             </a:r>
-            <a:endParaRPr lang="pt-BR" sz="2200" b="1" dirty="0"/>
+            <a:endParaRPr lang="pt-BR" sz="1800" b="1" dirty="0"/>
           </a:p>
           <a:p>
             <a:pPr algn="l">
@@ -7009,18 +7469,18 @@
               <a:buChar char="•"/>
             </a:pPr>
             <a:r>
-              <a:rPr lang="pt-BR" sz="2200" b="1" dirty="0" err="1"/>
+              <a:rPr lang="pt-BR" sz="1800" b="1" dirty="0" err="1"/>
               <a:t>Metaari</a:t>
             </a:r>
             <a:r>
-              <a:rPr lang="pt-BR" sz="2200" b="1" dirty="0"/>
+              <a:rPr lang="pt-BR" sz="1800" b="1" dirty="0"/>
               <a:t> (2019–2024) - </a:t>
             </a:r>
             <a:r>
-              <a:rPr lang="pt-BR" sz="2200" dirty="0"/>
+              <a:rPr lang="pt-BR" sz="1800" dirty="0"/>
               <a:t>Crescimento do mercado de gamificação</a:t>
             </a:r>
-            <a:endParaRPr lang="pt-BR" sz="2200" b="1" dirty="0"/>
+            <a:endParaRPr lang="pt-BR" sz="1800" b="1" dirty="0"/>
           </a:p>
           <a:p>
             <a:pPr algn="l">
@@ -7028,22 +7488,22 @@
               <a:buChar char="•"/>
             </a:pPr>
             <a:r>
-              <a:rPr lang="pt-BR" sz="2200" b="1" dirty="0"/>
+              <a:rPr lang="pt-BR" sz="1800" b="1" dirty="0"/>
               <a:t>Carvalho &amp; </a:t>
             </a:r>
             <a:r>
-              <a:rPr lang="pt-BR" sz="2200" b="1" dirty="0" err="1"/>
+              <a:rPr lang="pt-BR" sz="1800" b="1" dirty="0" err="1"/>
               <a:t>Ishitani</a:t>
             </a:r>
             <a:r>
-              <a:rPr lang="pt-BR" sz="2200" b="1" dirty="0"/>
+              <a:rPr lang="pt-BR" sz="1800" b="1" dirty="0"/>
               <a:t> (2012) - </a:t>
             </a:r>
             <a:r>
-              <a:rPr lang="pt-BR" sz="2200" dirty="0"/>
+              <a:rPr lang="pt-BR" sz="1800" dirty="0"/>
               <a:t>Estudos de gamificação no contexto brasileiro</a:t>
             </a:r>
-            <a:endParaRPr lang="pt-BR" sz="2200" b="1" dirty="0"/>
+            <a:endParaRPr lang="pt-BR" sz="1800" b="1" dirty="0"/>
           </a:p>
           <a:p>
             <a:pPr algn="l">
@@ -7345,7 +7805,7 @@
         <p:spPr>
           <a:xfrm>
             <a:off x="1276865" y="2345670"/>
-            <a:ext cx="9750495" cy="1896681"/>
+            <a:ext cx="9750495" cy="3525291"/>
           </a:xfrm>
         </p:spPr>
         <p:txBody>
@@ -7359,9 +7819,71 @@
               <a:buChar char="-"/>
             </a:pPr>
             <a:r>
-              <a:rPr lang="pt-BR" sz="2800" dirty="0"/>
+              <a:rPr lang="pt-BR" sz="2800" b="1" dirty="0"/>
               <a:t>Atores</a:t>
             </a:r>
+            <a:endParaRPr lang="pt-BR" b="1" dirty="0"/>
+          </a:p>
+          <a:p>
+            <a:pPr marL="914400" lvl="1" indent="-457200" algn="l">
+              <a:buFontTx/>
+              <a:buChar char="-"/>
+            </a:pPr>
+            <a:r>
+              <a:rPr lang="pt-BR" sz="2400" dirty="0">
+                <a:effectLst/>
+                <a:latin typeface="Arial" panose="020B0604020202020204" pitchFamily="34" charset="0"/>
+                <a:ea typeface="Calibri" panose="020F0502020204030204" pitchFamily="34" charset="0"/>
+              </a:rPr>
+              <a:t>Aluno</a:t>
+            </a:r>
+          </a:p>
+          <a:p>
+            <a:pPr marL="914400" lvl="1" indent="-457200" algn="l">
+              <a:buFontTx/>
+              <a:buChar char="-"/>
+            </a:pPr>
+            <a:r>
+              <a:rPr lang="pt-BR" sz="2400" dirty="0">
+                <a:effectLst/>
+                <a:latin typeface="Arial" panose="020B0604020202020204" pitchFamily="34" charset="0"/>
+                <a:ea typeface="Calibri" panose="020F0502020204030204" pitchFamily="34" charset="0"/>
+              </a:rPr>
+              <a:t>Professor</a:t>
+            </a:r>
+            <a:endParaRPr lang="pt-BR" sz="2400" dirty="0">
+              <a:latin typeface="Arial" panose="020B0604020202020204" pitchFamily="34" charset="0"/>
+              <a:ea typeface="Calibri" panose="020F0502020204030204" pitchFamily="34" charset="0"/>
+            </a:endParaRPr>
+          </a:p>
+          <a:p>
+            <a:pPr marL="914400" lvl="1" indent="-457200" algn="l">
+              <a:buFontTx/>
+              <a:buChar char="-"/>
+            </a:pPr>
+            <a:r>
+              <a:rPr lang="pt-BR" sz="2400" dirty="0">
+                <a:effectLst/>
+                <a:latin typeface="Arial" panose="020B0604020202020204" pitchFamily="34" charset="0"/>
+                <a:ea typeface="Calibri" panose="020F0502020204030204" pitchFamily="34" charset="0"/>
+              </a:rPr>
+              <a:t>Diretor</a:t>
+            </a:r>
+          </a:p>
+          <a:p>
+            <a:pPr marL="914400" lvl="1" indent="-457200" algn="l">
+              <a:buFontTx/>
+              <a:buChar char="-"/>
+            </a:pPr>
+            <a:r>
+              <a:rPr lang="pt-BR" sz="2400" dirty="0">
+                <a:effectLst/>
+                <a:latin typeface="Arial" panose="020B0604020202020204" pitchFamily="34" charset="0"/>
+                <a:ea typeface="Calibri" panose="020F0502020204030204" pitchFamily="34" charset="0"/>
+              </a:rPr>
+              <a:t>Administrador</a:t>
+            </a:r>
+            <a:endParaRPr lang="pt-BR" sz="2400" dirty="0"/>
           </a:p>
           <a:p>
             <a:pPr algn="l"/>
@@ -7490,7 +8012,7 @@
         </p:nvSpPr>
         <p:spPr>
           <a:xfrm>
-            <a:off x="1580113" y="1339195"/>
+            <a:off x="1417743" y="942458"/>
             <a:ext cx="9144000" cy="852211"/>
           </a:xfrm>
         </p:spPr>
@@ -7525,7 +8047,7 @@
         </p:nvSpPr>
         <p:spPr>
           <a:xfrm>
-            <a:off x="1276865" y="2345670"/>
+            <a:off x="1220752" y="1920358"/>
             <a:ext cx="9750495" cy="1896681"/>
           </a:xfrm>
         </p:spPr>
@@ -7541,13 +8063,8 @@
             </a:pPr>
             <a:r>
               <a:rPr lang="pt-BR" sz="2800" dirty="0"/>
-              <a:t>Diagrama </a:t>
-            </a:r>
-            <a:r>
-              <a:rPr lang="pt-BR" sz="2800"/>
-              <a:t>de Classe</a:t>
-            </a:r>
-            <a:endParaRPr lang="pt-BR" sz="2800" dirty="0"/>
+              <a:t>Diagrama de Classe</a:t>
+            </a:r>
           </a:p>
         </p:txBody>
       </p:sp>
@@ -7624,6 +8141,103 @@
           </a:prstGeom>
         </p:spPr>
       </p:pic>
+      <p:pic>
+        <p:nvPicPr>
+          <p:cNvPr id="6" name="Imagem 5" descr="Diagrama, Desenho técnico&#10;&#10;O conteúdo gerado por IA pode estar incorreto.">
+            <a:extLst>
+              <a:ext uri="{FF2B5EF4-FFF2-40B4-BE49-F238E27FC236}">
+                <a16:creationId xmlns:a16="http://schemas.microsoft.com/office/drawing/2014/main" id="{B550CFC9-D36F-B621-311A-377D52F54910}"/>
+              </a:ext>
+            </a:extLst>
+          </p:cNvPr>
+          <p:cNvPicPr>
+            <a:picLocks noChangeAspect="1"/>
+          </p:cNvPicPr>
+          <p:nvPr/>
+        </p:nvPicPr>
+        <p:blipFill>
+          <a:blip r:embed="rId4">
+            <a:extLst>
+              <a:ext uri="{28A0092B-C50C-407E-A947-70E740481C1C}">
+                <a14:useLocalDpi xmlns:a14="http://schemas.microsoft.com/office/drawing/2010/main" val="0"/>
+              </a:ext>
+            </a:extLst>
+          </a:blip>
+          <a:srcRect/>
+          <a:stretch>
+            <a:fillRect/>
+          </a:stretch>
+        </p:blipFill>
+        <p:spPr bwMode="auto">
+          <a:xfrm>
+            <a:off x="5798459" y="1794668"/>
+            <a:ext cx="4823105" cy="4755586"/>
+          </a:xfrm>
+          <a:prstGeom prst="rect">
+            <a:avLst/>
+          </a:prstGeom>
+          <a:noFill/>
+          <a:ln>
+            <a:noFill/>
+          </a:ln>
+        </p:spPr>
+      </p:pic>
+      <p:sp>
+        <p:nvSpPr>
+          <p:cNvPr id="8" name="CaixaDeTexto 7">
+            <a:extLst>
+              <a:ext uri="{FF2B5EF4-FFF2-40B4-BE49-F238E27FC236}">
+                <a16:creationId xmlns:a16="http://schemas.microsoft.com/office/drawing/2014/main" id="{726E5CC1-EEC2-CA63-0847-2348B81DF330}"/>
+              </a:ext>
+            </a:extLst>
+          </p:cNvPr>
+          <p:cNvSpPr txBox="1"/>
+          <p:nvPr/>
+        </p:nvSpPr>
+        <p:spPr>
+          <a:xfrm>
+            <a:off x="5716827" y="6537443"/>
+            <a:ext cx="6097424" cy="276999"/>
+          </a:xfrm>
+          <a:prstGeom prst="rect">
+            <a:avLst/>
+          </a:prstGeom>
+          <a:noFill/>
+        </p:spPr>
+        <p:txBody>
+          <a:bodyPr wrap="square">
+            <a:spAutoFit/>
+          </a:bodyPr>
+          <a:lstStyle/>
+          <a:p>
+            <a:pPr algn="just"/>
+            <a:r>
+              <a:rPr lang="pt-BR" sz="1200" dirty="0">
+                <a:effectLst/>
+                <a:latin typeface="Arial" panose="020B0604020202020204" pitchFamily="34" charset="0"/>
+                <a:ea typeface="Calibri" panose="020F0502020204030204" pitchFamily="34" charset="0"/>
+                <a:cs typeface="Times New Roman" panose="02020603050405020304" pitchFamily="18" charset="0"/>
+              </a:rPr>
+              <a:t>Fonte: Elaborado pelo autor com </a:t>
+            </a:r>
+            <a:r>
+              <a:rPr lang="pt-BR" sz="1200" dirty="0" err="1">
+                <a:effectLst/>
+                <a:latin typeface="Arial" panose="020B0604020202020204" pitchFamily="34" charset="0"/>
+                <a:ea typeface="Calibri" panose="020F0502020204030204" pitchFamily="34" charset="0"/>
+                <a:cs typeface="Times New Roman" panose="02020603050405020304" pitchFamily="18" charset="0"/>
+              </a:rPr>
+              <a:t>PlantUML</a:t>
+            </a:r>
+            <a:endParaRPr lang="pt-BR" sz="1200" dirty="0">
+              <a:effectLst/>
+              <a:latin typeface="Calibri" panose="020F0502020204030204" pitchFamily="34" charset="0"/>
+              <a:ea typeface="Calibri" panose="020F0502020204030204" pitchFamily="34" charset="0"/>
+              <a:cs typeface="Times New Roman" panose="02020603050405020304" pitchFamily="18" charset="0"/>
+            </a:endParaRPr>
+          </a:p>
+        </p:txBody>
+      </p:sp>
     </p:spTree>
     <p:extLst>
       <p:ext uri="{BB962C8B-B14F-4D97-AF65-F5344CB8AC3E}">

</xml_diff>

<commit_message>
atualizacoa slides, ainda falta terminar
</commit_message>
<xml_diff>
--- a/liceu/3semestre/projeto integrador/tcc slide.pptx
+++ b/liceu/3semestre/projeto integrador/tcc slide.pptx
@@ -216,7 +216,7 @@
           <a:p>
             <a:fld id="{18320935-7879-4FC8-A6C9-17BE08BC5BEB}" type="datetimeFigureOut">
               <a:rPr lang="pt-BR" smtClean="0"/>
-              <a:t>21/05/2025</a:t>
+              <a:t>22/05/2025</a:t>
             </a:fld>
             <a:endParaRPr lang="pt-BR"/>
           </a:p>
@@ -630,7 +630,7 @@
           <a:p>
             <a:fld id="{055D9AF5-8B02-462A-998E-086C6BD146E3}" type="datetime1">
               <a:rPr lang="pt-BR" smtClean="0"/>
-              <a:t>21/05/2025</a:t>
+              <a:t>22/05/2025</a:t>
             </a:fld>
             <a:endParaRPr lang="pt-BR"/>
           </a:p>
@@ -828,7 +828,7 @@
           <a:p>
             <a:fld id="{258448AC-78A4-411F-B30C-72E16663FB27}" type="datetime1">
               <a:rPr lang="pt-BR" smtClean="0"/>
-              <a:t>21/05/2025</a:t>
+              <a:t>22/05/2025</a:t>
             </a:fld>
             <a:endParaRPr lang="pt-BR"/>
           </a:p>
@@ -1036,7 +1036,7 @@
           <a:p>
             <a:fld id="{9F1F3115-DB14-4321-8D36-A5960E5A90C2}" type="datetime1">
               <a:rPr lang="pt-BR" smtClean="0"/>
-              <a:t>21/05/2025</a:t>
+              <a:t>22/05/2025</a:t>
             </a:fld>
             <a:endParaRPr lang="pt-BR"/>
           </a:p>
@@ -1234,7 +1234,7 @@
           <a:p>
             <a:fld id="{D8C6E8C3-9067-43B2-BEF6-C1F5787FC74D}" type="datetime1">
               <a:rPr lang="pt-BR" smtClean="0"/>
-              <a:t>21/05/2025</a:t>
+              <a:t>22/05/2025</a:t>
             </a:fld>
             <a:endParaRPr lang="pt-BR"/>
           </a:p>
@@ -1509,7 +1509,7 @@
           <a:p>
             <a:fld id="{AEDAA854-EDC2-459C-AF0A-0D60AE43886D}" type="datetime1">
               <a:rPr lang="pt-BR" smtClean="0"/>
-              <a:t>21/05/2025</a:t>
+              <a:t>22/05/2025</a:t>
             </a:fld>
             <a:endParaRPr lang="pt-BR"/>
           </a:p>
@@ -1774,7 +1774,7 @@
           <a:p>
             <a:fld id="{5D91D852-DAA6-48D5-92B2-C187B4D9E703}" type="datetime1">
               <a:rPr lang="pt-BR" smtClean="0"/>
-              <a:t>21/05/2025</a:t>
+              <a:t>22/05/2025</a:t>
             </a:fld>
             <a:endParaRPr lang="pt-BR"/>
           </a:p>
@@ -2186,7 +2186,7 @@
           <a:p>
             <a:fld id="{CDC3A4EE-7EB3-49B0-B009-2BF3B4DB4BF7}" type="datetime1">
               <a:rPr lang="pt-BR" smtClean="0"/>
-              <a:t>21/05/2025</a:t>
+              <a:t>22/05/2025</a:t>
             </a:fld>
             <a:endParaRPr lang="pt-BR"/>
           </a:p>
@@ -2327,7 +2327,7 @@
           <a:p>
             <a:fld id="{224C9A1C-CA50-4622-B615-0639F6347B1D}" type="datetime1">
               <a:rPr lang="pt-BR" smtClean="0"/>
-              <a:t>21/05/2025</a:t>
+              <a:t>22/05/2025</a:t>
             </a:fld>
             <a:endParaRPr lang="pt-BR"/>
           </a:p>
@@ -2440,7 +2440,7 @@
           <a:p>
             <a:fld id="{3D6C1E11-059F-430B-ACAB-308983ADDB72}" type="datetime1">
               <a:rPr lang="pt-BR" smtClean="0"/>
-              <a:t>21/05/2025</a:t>
+              <a:t>22/05/2025</a:t>
             </a:fld>
             <a:endParaRPr lang="pt-BR"/>
           </a:p>
@@ -2751,7 +2751,7 @@
           <a:p>
             <a:fld id="{D818A351-4929-4117-9E02-9240FA4BEF66}" type="datetime1">
               <a:rPr lang="pt-BR" smtClean="0"/>
-              <a:t>21/05/2025</a:t>
+              <a:t>22/05/2025</a:t>
             </a:fld>
             <a:endParaRPr lang="pt-BR"/>
           </a:p>
@@ -3039,7 +3039,7 @@
           <a:p>
             <a:fld id="{0717CE0E-0A9C-4DE7-9D3C-C334C624287A}" type="datetime1">
               <a:rPr lang="pt-BR" smtClean="0"/>
-              <a:t>21/05/2025</a:t>
+              <a:t>22/05/2025</a:t>
             </a:fld>
             <a:endParaRPr lang="pt-BR"/>
           </a:p>
@@ -3280,7 +3280,7 @@
           <a:p>
             <a:fld id="{8DEF6C12-3CCD-4BA5-AA5A-B9FCBFB668F7}" type="datetime1">
               <a:rPr lang="pt-BR" smtClean="0"/>
-              <a:t>21/05/2025</a:t>
+              <a:t>22/05/2025</a:t>
             </a:fld>
             <a:endParaRPr lang="pt-BR"/>
           </a:p>
@@ -4695,8 +4695,8 @@
         </p:nvSpPr>
         <p:spPr>
           <a:xfrm>
-            <a:off x="1276865" y="2345670"/>
-            <a:ext cx="9750495" cy="1896681"/>
+            <a:off x="729934" y="2345670"/>
+            <a:ext cx="9750495" cy="2969814"/>
           </a:xfrm>
         </p:spPr>
         <p:txBody>
@@ -4712,6 +4712,34 @@
             <a:r>
               <a:rPr lang="pt-BR" sz="2800" dirty="0"/>
               <a:t>Gamificação na plataforma</a:t>
+            </a:r>
+          </a:p>
+          <a:p>
+            <a:pPr algn="l"/>
+            <a:r>
+              <a:rPr lang="pt-BR" sz="2800" dirty="0"/>
+              <a:t>	- Sistema de níveis</a:t>
+            </a:r>
+          </a:p>
+          <a:p>
+            <a:pPr algn="l"/>
+            <a:r>
+              <a:rPr lang="pt-BR" sz="2800" dirty="0"/>
+              <a:t>	- Sistema de ranking</a:t>
+            </a:r>
+          </a:p>
+          <a:p>
+            <a:pPr algn="l"/>
+            <a:r>
+              <a:rPr lang="pt-BR" sz="2800" dirty="0"/>
+              <a:t>	- Sistema de modo online</a:t>
+            </a:r>
+          </a:p>
+          <a:p>
+            <a:pPr algn="l"/>
+            <a:r>
+              <a:rPr lang="pt-BR" sz="2800" dirty="0"/>
+              <a:t>	- Sistema de elos</a:t>
             </a:r>
           </a:p>
           <a:p>
@@ -4787,6 +4815,66 @@
           <a:xfrm>
             <a:off x="8481392" y="273982"/>
             <a:ext cx="3142076" cy="852210"/>
+          </a:xfrm>
+          <a:prstGeom prst="rect">
+            <a:avLst/>
+          </a:prstGeom>
+        </p:spPr>
+      </p:pic>
+      <p:pic>
+        <p:nvPicPr>
+          <p:cNvPr id="7" name="Imagem 6">
+            <a:extLst>
+              <a:ext uri="{FF2B5EF4-FFF2-40B4-BE49-F238E27FC236}">
+                <a16:creationId xmlns:a16="http://schemas.microsoft.com/office/drawing/2014/main" id="{AA5F8965-BC7D-F142-E5C3-4D6DD5A1E2C5}"/>
+              </a:ext>
+            </a:extLst>
+          </p:cNvPr>
+          <p:cNvPicPr>
+            <a:picLocks noChangeAspect="1"/>
+          </p:cNvPicPr>
+          <p:nvPr/>
+        </p:nvPicPr>
+        <p:blipFill>
+          <a:blip r:embed="rId4"/>
+          <a:stretch>
+            <a:fillRect/>
+          </a:stretch>
+        </p:blipFill>
+        <p:spPr>
+          <a:xfrm>
+            <a:off x="6298729" y="2363741"/>
+            <a:ext cx="2897733" cy="3447711"/>
+          </a:xfrm>
+          <a:prstGeom prst="rect">
+            <a:avLst/>
+          </a:prstGeom>
+        </p:spPr>
+      </p:pic>
+      <p:pic>
+        <p:nvPicPr>
+          <p:cNvPr id="9" name="Imagem 8">
+            <a:extLst>
+              <a:ext uri="{FF2B5EF4-FFF2-40B4-BE49-F238E27FC236}">
+                <a16:creationId xmlns:a16="http://schemas.microsoft.com/office/drawing/2014/main" id="{908862AE-8C22-3188-C1B2-ECEC6B6D5643}"/>
+              </a:ext>
+            </a:extLst>
+          </p:cNvPr>
+          <p:cNvPicPr>
+            <a:picLocks noChangeAspect="1"/>
+          </p:cNvPicPr>
+          <p:nvPr/>
+        </p:nvPicPr>
+        <p:blipFill>
+          <a:blip r:embed="rId5"/>
+          <a:stretch>
+            <a:fillRect/>
+          </a:stretch>
+        </p:blipFill>
+        <p:spPr>
+          <a:xfrm>
+            <a:off x="9338236" y="2390630"/>
+            <a:ext cx="2591162" cy="1038370"/>
           </a:xfrm>
           <a:prstGeom prst="rect">
             <a:avLst/>
@@ -5191,6 +5279,113 @@
           </a:prstGeom>
         </p:spPr>
       </p:pic>
+      <p:pic>
+        <p:nvPicPr>
+          <p:cNvPr id="7" name="Imagem 6">
+            <a:extLst>
+              <a:ext uri="{FF2B5EF4-FFF2-40B4-BE49-F238E27FC236}">
+                <a16:creationId xmlns:a16="http://schemas.microsoft.com/office/drawing/2014/main" id="{5E41090B-8C68-8B19-E122-8F014F26238B}"/>
+              </a:ext>
+            </a:extLst>
+          </p:cNvPr>
+          <p:cNvPicPr>
+            <a:picLocks noChangeAspect="1"/>
+          </p:cNvPicPr>
+          <p:nvPr/>
+        </p:nvPicPr>
+        <p:blipFill>
+          <a:blip r:embed="rId4"/>
+          <a:stretch>
+            <a:fillRect/>
+          </a:stretch>
+        </p:blipFill>
+        <p:spPr>
+          <a:xfrm>
+            <a:off x="6207351" y="3026068"/>
+            <a:ext cx="5779433" cy="2953449"/>
+          </a:xfrm>
+          <a:prstGeom prst="rect">
+            <a:avLst/>
+          </a:prstGeom>
+        </p:spPr>
+      </p:pic>
+      <p:pic>
+        <p:nvPicPr>
+          <p:cNvPr id="9" name="Imagem 8">
+            <a:extLst>
+              <a:ext uri="{FF2B5EF4-FFF2-40B4-BE49-F238E27FC236}">
+                <a16:creationId xmlns:a16="http://schemas.microsoft.com/office/drawing/2014/main" id="{EBAF35C5-B46C-C58B-A08C-1B3130234E0A}"/>
+              </a:ext>
+            </a:extLst>
+          </p:cNvPr>
+          <p:cNvPicPr>
+            <a:picLocks noChangeAspect="1"/>
+          </p:cNvPicPr>
+          <p:nvPr/>
+        </p:nvPicPr>
+        <p:blipFill>
+          <a:blip r:embed="rId5"/>
+          <a:stretch>
+            <a:fillRect/>
+          </a:stretch>
+        </p:blipFill>
+        <p:spPr>
+          <a:xfrm>
+            <a:off x="429487" y="2977573"/>
+            <a:ext cx="5518396" cy="1785660"/>
+          </a:xfrm>
+          <a:prstGeom prst="rect">
+            <a:avLst/>
+          </a:prstGeom>
+        </p:spPr>
+      </p:pic>
+      <p:pic>
+        <p:nvPicPr>
+          <p:cNvPr id="1034" name="Picture 10" descr="15 melhores ideias de Thumbnail Youtube | thumbnail youtube, photoshop, no  photoshop">
+            <a:extLst>
+              <a:ext uri="{FF2B5EF4-FFF2-40B4-BE49-F238E27FC236}">
+                <a16:creationId xmlns:a16="http://schemas.microsoft.com/office/drawing/2014/main" id="{55CA89A2-4BC4-4610-CFE8-14DB08D355C9}"/>
+              </a:ext>
+            </a:extLst>
+          </p:cNvPr>
+          <p:cNvPicPr>
+            <a:picLocks noChangeAspect="1" noChangeArrowheads="1"/>
+          </p:cNvPicPr>
+          <p:nvPr/>
+        </p:nvPicPr>
+        <p:blipFill>
+          <a:blip r:embed="rId6">
+            <a:extLst>
+              <a:ext uri="{28A0092B-C50C-407E-A947-70E740481C1C}">
+                <a14:useLocalDpi xmlns:a14="http://schemas.microsoft.com/office/drawing/2010/main" val="0"/>
+              </a:ext>
+            </a:extLst>
+          </a:blip>
+          <a:srcRect/>
+          <a:stretch>
+            <a:fillRect/>
+          </a:stretch>
+        </p:blipFill>
+        <p:spPr bwMode="auto">
+          <a:xfrm flipV="1">
+            <a:off x="4119072" y="4874254"/>
+            <a:ext cx="1618004" cy="847711"/>
+          </a:xfrm>
+          <a:prstGeom prst="rect">
+            <a:avLst/>
+          </a:prstGeom>
+          <a:noFill/>
+          <a:extLst>
+            <a:ext uri="{909E8E84-426E-40DD-AFC4-6F175D3DCCD1}">
+              <a14:hiddenFill xmlns:a14="http://schemas.microsoft.com/office/drawing/2010/main">
+                <a:solidFill>
+                  <a:srgbClr val="FFFFFF"/>
+                </a:solidFill>
+              </a14:hiddenFill>
+            </a:ext>
+          </a:extLst>
+        </p:spPr>
+      </p:pic>
     </p:spTree>
     <p:extLst>
       <p:ext uri="{BB962C8B-B14F-4D97-AF65-F5344CB8AC3E}">
@@ -5366,6 +5561,113 @@
           <a:xfrm>
             <a:off x="8481392" y="273982"/>
             <a:ext cx="3142076" cy="852210"/>
+          </a:xfrm>
+          <a:prstGeom prst="rect">
+            <a:avLst/>
+          </a:prstGeom>
+        </p:spPr>
+      </p:pic>
+      <p:pic>
+        <p:nvPicPr>
+          <p:cNvPr id="7" name="Imagem 6">
+            <a:extLst>
+              <a:ext uri="{FF2B5EF4-FFF2-40B4-BE49-F238E27FC236}">
+                <a16:creationId xmlns:a16="http://schemas.microsoft.com/office/drawing/2014/main" id="{889CAA86-2F84-A08E-E60D-7B87109B27D8}"/>
+              </a:ext>
+            </a:extLst>
+          </p:cNvPr>
+          <p:cNvPicPr>
+            <a:picLocks noChangeAspect="1"/>
+          </p:cNvPicPr>
+          <p:nvPr/>
+        </p:nvPicPr>
+        <p:blipFill>
+          <a:blip r:embed="rId4"/>
+          <a:stretch>
+            <a:fillRect/>
+          </a:stretch>
+        </p:blipFill>
+        <p:spPr>
+          <a:xfrm>
+            <a:off x="1212437" y="3059393"/>
+            <a:ext cx="2340780" cy="2065711"/>
+          </a:xfrm>
+          <a:prstGeom prst="rect">
+            <a:avLst/>
+          </a:prstGeom>
+        </p:spPr>
+      </p:pic>
+      <p:pic>
+        <p:nvPicPr>
+          <p:cNvPr id="2052" name="Picture 4" descr="15 melhores ideias de Thumbnail Youtube | thumbnail youtube, photoshop, no  photoshop">
+            <a:extLst>
+              <a:ext uri="{FF2B5EF4-FFF2-40B4-BE49-F238E27FC236}">
+                <a16:creationId xmlns:a16="http://schemas.microsoft.com/office/drawing/2014/main" id="{841EB090-B6F1-FCF3-CFA4-5530B231E7F4}"/>
+              </a:ext>
+            </a:extLst>
+          </p:cNvPr>
+          <p:cNvPicPr>
+            <a:picLocks noChangeAspect="1" noChangeArrowheads="1"/>
+          </p:cNvPicPr>
+          <p:nvPr/>
+        </p:nvPicPr>
+        <p:blipFill>
+          <a:blip r:embed="rId5">
+            <a:extLst>
+              <a:ext uri="{28A0092B-C50C-407E-A947-70E740481C1C}">
+                <a14:useLocalDpi xmlns:a14="http://schemas.microsoft.com/office/drawing/2010/main" val="0"/>
+              </a:ext>
+            </a:extLst>
+          </a:blip>
+          <a:srcRect/>
+          <a:stretch>
+            <a:fillRect/>
+          </a:stretch>
+        </p:blipFill>
+        <p:spPr bwMode="auto">
+          <a:xfrm flipV="1">
+            <a:off x="2859363" y="5250724"/>
+            <a:ext cx="1846603" cy="1080666"/>
+          </a:xfrm>
+          <a:prstGeom prst="rect">
+            <a:avLst/>
+          </a:prstGeom>
+          <a:noFill/>
+          <a:extLst>
+            <a:ext uri="{909E8E84-426E-40DD-AFC4-6F175D3DCCD1}">
+              <a14:hiddenFill xmlns:a14="http://schemas.microsoft.com/office/drawing/2010/main">
+                <a:solidFill>
+                  <a:srgbClr val="FFFFFF"/>
+                </a:solidFill>
+              </a14:hiddenFill>
+            </a:ext>
+          </a:extLst>
+        </p:spPr>
+      </p:pic>
+      <p:pic>
+        <p:nvPicPr>
+          <p:cNvPr id="11" name="Imagem 10">
+            <a:extLst>
+              <a:ext uri="{FF2B5EF4-FFF2-40B4-BE49-F238E27FC236}">
+                <a16:creationId xmlns:a16="http://schemas.microsoft.com/office/drawing/2014/main" id="{661B5F1A-F41C-84FC-7200-C5148D52E426}"/>
+              </a:ext>
+            </a:extLst>
+          </p:cNvPr>
+          <p:cNvPicPr>
+            <a:picLocks noChangeAspect="1"/>
+          </p:cNvPicPr>
+          <p:nvPr/>
+        </p:nvPicPr>
+        <p:blipFill>
+          <a:blip r:embed="rId6"/>
+          <a:stretch>
+            <a:fillRect/>
+          </a:stretch>
+        </p:blipFill>
+        <p:spPr>
+          <a:xfrm>
+            <a:off x="4965106" y="2888477"/>
+            <a:ext cx="6831375" cy="3506402"/>
           </a:xfrm>
           <a:prstGeom prst="rect">
             <a:avLst/>
@@ -7355,36 +7657,6 @@
               <a:rPr lang="pt-BR" sz="1800" dirty="0"/>
               <a:t>Teoria da autodeterminação (autonomia, competência)</a:t>
             </a:r>
-          </a:p>
-          <a:p>
-            <a:pPr algn="l">
-              <a:buFont typeface="Arial" panose="020B0604020202020204" pitchFamily="34" charset="0"/>
-              <a:buChar char="•"/>
-            </a:pPr>
-            <a:r>
-              <a:rPr lang="pt-BR" sz="1800" b="1" dirty="0"/>
-              <a:t>Skinner (1938) - </a:t>
-            </a:r>
-            <a:r>
-              <a:rPr lang="pt-BR" sz="1800" dirty="0"/>
-              <a:t>Condicionamento operante; reforços positivos</a:t>
-            </a:r>
-            <a:endParaRPr lang="pt-BR" sz="1800" b="1" dirty="0"/>
-          </a:p>
-          <a:p>
-            <a:pPr algn="l">
-              <a:buFont typeface="Arial" panose="020B0604020202020204" pitchFamily="34" charset="0"/>
-              <a:buChar char="•"/>
-            </a:pPr>
-            <a:r>
-              <a:rPr lang="pt-BR" sz="1800" b="1" dirty="0"/>
-              <a:t>Piaget (1972) &amp; Vygotsky (1978) - </a:t>
-            </a:r>
-            <a:r>
-              <a:rPr lang="pt-BR" sz="1800" dirty="0"/>
-              <a:t>Construtivismo; Zona de Desenvolvimento Proximal</a:t>
-            </a:r>
-            <a:endParaRPr lang="pt-BR" sz="1800" b="1" dirty="0"/>
           </a:p>
           <a:p>
             <a:pPr algn="l">

</xml_diff>

<commit_message>
parte de metodologia !pronta!, mas ainda falta dirar duvidas e fazer as discussoes e conclusao
</commit_message>
<xml_diff>
--- a/liceu/3semestre/projeto integrador/tcc slide.pptx
+++ b/liceu/3semestre/projeto integrador/tcc slide.pptx
@@ -5,7 +5,7 @@
     <p:sldMasterId id="2147483648" r:id="rId1"/>
   </p:sldMasterIdLst>
   <p:notesMasterIdLst>
-    <p:notesMasterId r:id="rId22"/>
+    <p:notesMasterId r:id="rId25"/>
   </p:notesMasterIdLst>
   <p:sldIdLst>
     <p:sldId id="256" r:id="rId2"/>
@@ -15,19 +15,22 @@
     <p:sldId id="260" r:id="rId6"/>
     <p:sldId id="261" r:id="rId7"/>
     <p:sldId id="262" r:id="rId8"/>
-    <p:sldId id="273" r:id="rId9"/>
-    <p:sldId id="274" r:id="rId10"/>
-    <p:sldId id="275" r:id="rId11"/>
-    <p:sldId id="263" r:id="rId12"/>
-    <p:sldId id="269" r:id="rId13"/>
-    <p:sldId id="270" r:id="rId14"/>
-    <p:sldId id="271" r:id="rId15"/>
-    <p:sldId id="272" r:id="rId16"/>
-    <p:sldId id="264" r:id="rId17"/>
-    <p:sldId id="265" r:id="rId18"/>
-    <p:sldId id="276" r:id="rId19"/>
-    <p:sldId id="266" r:id="rId20"/>
-    <p:sldId id="267" r:id="rId21"/>
+    <p:sldId id="279" r:id="rId9"/>
+    <p:sldId id="278" r:id="rId10"/>
+    <p:sldId id="273" r:id="rId11"/>
+    <p:sldId id="274" r:id="rId12"/>
+    <p:sldId id="275" r:id="rId13"/>
+    <p:sldId id="277" r:id="rId14"/>
+    <p:sldId id="263" r:id="rId15"/>
+    <p:sldId id="269" r:id="rId16"/>
+    <p:sldId id="270" r:id="rId17"/>
+    <p:sldId id="271" r:id="rId18"/>
+    <p:sldId id="272" r:id="rId19"/>
+    <p:sldId id="264" r:id="rId20"/>
+    <p:sldId id="265" r:id="rId21"/>
+    <p:sldId id="276" r:id="rId22"/>
+    <p:sldId id="266" r:id="rId23"/>
+    <p:sldId id="267" r:id="rId24"/>
   </p:sldIdLst>
   <p:sldSz cx="12192000" cy="6858000"/>
   <p:notesSz cx="6858000" cy="9144000"/>
@@ -3922,7 +3925,7 @@
         </p:nvSpPr>
         <p:spPr>
           <a:xfrm>
-            <a:off x="1580112" y="942458"/>
+            <a:off x="1580113" y="1339195"/>
             <a:ext cx="9144000" cy="852211"/>
           </a:xfrm>
         </p:spPr>
@@ -3957,8 +3960,8 @@
         </p:nvSpPr>
         <p:spPr>
           <a:xfrm>
-            <a:off x="901148" y="1696191"/>
-            <a:ext cx="9750495" cy="696632"/>
+            <a:off x="1276865" y="2345670"/>
+            <a:ext cx="9750495" cy="3525291"/>
           </a:xfrm>
         </p:spPr>
         <p:txBody>
@@ -3972,9 +3975,75 @@
               <a:buChar char="-"/>
             </a:pPr>
             <a:r>
-              <a:rPr lang="pt-BR" sz="2800" dirty="0"/>
-              <a:t>Diagramas de Caso de Uso</a:t>
-            </a:r>
+              <a:rPr lang="pt-BR" sz="2800" b="1" dirty="0"/>
+              <a:t>Atores</a:t>
+            </a:r>
+            <a:endParaRPr lang="pt-BR" b="1" dirty="0"/>
+          </a:p>
+          <a:p>
+            <a:pPr marL="914400" lvl="1" indent="-457200" algn="l">
+              <a:buFontTx/>
+              <a:buChar char="-"/>
+            </a:pPr>
+            <a:r>
+              <a:rPr lang="pt-BR" sz="2400" dirty="0">
+                <a:effectLst/>
+                <a:latin typeface="Arial" panose="020B0604020202020204" pitchFamily="34" charset="0"/>
+                <a:ea typeface="Calibri" panose="020F0502020204030204" pitchFamily="34" charset="0"/>
+              </a:rPr>
+              <a:t>Aluno</a:t>
+            </a:r>
+          </a:p>
+          <a:p>
+            <a:pPr marL="914400" lvl="1" indent="-457200" algn="l">
+              <a:buFontTx/>
+              <a:buChar char="-"/>
+            </a:pPr>
+            <a:r>
+              <a:rPr lang="pt-BR" sz="2400" dirty="0">
+                <a:effectLst/>
+                <a:latin typeface="Arial" panose="020B0604020202020204" pitchFamily="34" charset="0"/>
+                <a:ea typeface="Calibri" panose="020F0502020204030204" pitchFamily="34" charset="0"/>
+              </a:rPr>
+              <a:t>Professor</a:t>
+            </a:r>
+            <a:endParaRPr lang="pt-BR" sz="2400" dirty="0">
+              <a:latin typeface="Arial" panose="020B0604020202020204" pitchFamily="34" charset="0"/>
+              <a:ea typeface="Calibri" panose="020F0502020204030204" pitchFamily="34" charset="0"/>
+            </a:endParaRPr>
+          </a:p>
+          <a:p>
+            <a:pPr marL="914400" lvl="1" indent="-457200" algn="l">
+              <a:buFontTx/>
+              <a:buChar char="-"/>
+            </a:pPr>
+            <a:r>
+              <a:rPr lang="pt-BR" sz="2400" dirty="0">
+                <a:effectLst/>
+                <a:latin typeface="Arial" panose="020B0604020202020204" pitchFamily="34" charset="0"/>
+                <a:ea typeface="Calibri" panose="020F0502020204030204" pitchFamily="34" charset="0"/>
+              </a:rPr>
+              <a:t>Diretor</a:t>
+            </a:r>
+          </a:p>
+          <a:p>
+            <a:pPr marL="914400" lvl="1" indent="-457200" algn="l">
+              <a:buFontTx/>
+              <a:buChar char="-"/>
+            </a:pPr>
+            <a:r>
+              <a:rPr lang="pt-BR" sz="2400" dirty="0">
+                <a:effectLst/>
+                <a:latin typeface="Arial" panose="020B0604020202020204" pitchFamily="34" charset="0"/>
+                <a:ea typeface="Calibri" panose="020F0502020204030204" pitchFamily="34" charset="0"/>
+              </a:rPr>
+              <a:t>Administrador</a:t>
+            </a:r>
+            <a:endParaRPr lang="pt-BR" sz="2400" dirty="0"/>
+          </a:p>
+          <a:p>
+            <a:pPr algn="l"/>
+            <a:endParaRPr lang="pt-BR" sz="2800" dirty="0"/>
           </a:p>
         </p:txBody>
       </p:sp>
@@ -4051,138 +4120,10 @@
           </a:prstGeom>
         </p:spPr>
       </p:pic>
-      <p:pic>
-        <p:nvPicPr>
-          <p:cNvPr id="6" name="Imagem 5" descr="Gráfico, Diagrama, Gráfico de bolhas&#10;&#10;O conteúdo gerado por IA pode estar incorreto.">
-            <a:extLst>
-              <a:ext uri="{FF2B5EF4-FFF2-40B4-BE49-F238E27FC236}">
-                <a16:creationId xmlns:a16="http://schemas.microsoft.com/office/drawing/2014/main" id="{EF4226C0-624E-EC78-CD63-CA5E34E06278}"/>
-              </a:ext>
-            </a:extLst>
-          </p:cNvPr>
-          <p:cNvPicPr>
-            <a:picLocks noChangeAspect="1"/>
-          </p:cNvPicPr>
-          <p:nvPr/>
-        </p:nvPicPr>
-        <p:blipFill>
-          <a:blip r:embed="rId4"/>
-          <a:stretch>
-            <a:fillRect/>
-          </a:stretch>
-        </p:blipFill>
-        <p:spPr>
-          <a:xfrm>
-            <a:off x="177985" y="3042257"/>
-            <a:ext cx="2927645" cy="2405413"/>
-          </a:xfrm>
-          <a:prstGeom prst="rect">
-            <a:avLst/>
-          </a:prstGeom>
-        </p:spPr>
-      </p:pic>
-      <p:pic>
-        <p:nvPicPr>
-          <p:cNvPr id="8" name="Imagem 7">
-            <a:extLst>
-              <a:ext uri="{FF2B5EF4-FFF2-40B4-BE49-F238E27FC236}">
-                <a16:creationId xmlns:a16="http://schemas.microsoft.com/office/drawing/2014/main" id="{388C6919-CB7A-556C-34D1-5732F9BC55A9}"/>
-              </a:ext>
-            </a:extLst>
-          </p:cNvPr>
-          <p:cNvPicPr>
-            <a:picLocks noChangeAspect="1"/>
-          </p:cNvPicPr>
-          <p:nvPr/>
-        </p:nvPicPr>
-        <p:blipFill>
-          <a:blip r:embed="rId5">
-            <a:extLst>
-              <a:ext uri="{28A0092B-C50C-407E-A947-70E740481C1C}">
-                <a14:useLocalDpi xmlns:a14="http://schemas.microsoft.com/office/drawing/2010/main" val="0"/>
-              </a:ext>
-            </a:extLst>
-          </a:blip>
-          <a:srcRect/>
-          <a:stretch>
-            <a:fillRect/>
-          </a:stretch>
-        </p:blipFill>
-        <p:spPr bwMode="auto">
-          <a:xfrm>
-            <a:off x="8938830" y="3094405"/>
-            <a:ext cx="3237610" cy="2512597"/>
-          </a:xfrm>
-          <a:prstGeom prst="rect">
-            <a:avLst/>
-          </a:prstGeom>
-          <a:noFill/>
-        </p:spPr>
-      </p:pic>
-      <p:pic>
-        <p:nvPicPr>
-          <p:cNvPr id="9" name="Imagem 8" descr="Gráfico, Gráfico de bolhas&#10;&#10;O conteúdo gerado por IA pode estar incorreto.">
-            <a:extLst>
-              <a:ext uri="{FF2B5EF4-FFF2-40B4-BE49-F238E27FC236}">
-                <a16:creationId xmlns:a16="http://schemas.microsoft.com/office/drawing/2014/main" id="{39A0BDB0-91D7-6B29-682F-D7976F7DA7EB}"/>
-              </a:ext>
-            </a:extLst>
-          </p:cNvPr>
-          <p:cNvPicPr>
-            <a:picLocks noChangeAspect="1"/>
-          </p:cNvPicPr>
-          <p:nvPr/>
-        </p:nvPicPr>
-        <p:blipFill>
-          <a:blip r:embed="rId6"/>
-          <a:stretch>
-            <a:fillRect/>
-          </a:stretch>
-        </p:blipFill>
-        <p:spPr>
-          <a:xfrm>
-            <a:off x="5776395" y="3042257"/>
-            <a:ext cx="3162435" cy="2616896"/>
-          </a:xfrm>
-          <a:prstGeom prst="rect">
-            <a:avLst/>
-          </a:prstGeom>
-        </p:spPr>
-      </p:pic>
-      <p:pic>
-        <p:nvPicPr>
-          <p:cNvPr id="11" name="Imagem 10">
-            <a:extLst>
-              <a:ext uri="{FF2B5EF4-FFF2-40B4-BE49-F238E27FC236}">
-                <a16:creationId xmlns:a16="http://schemas.microsoft.com/office/drawing/2014/main" id="{D1413A69-7077-7094-0BAF-AD4CDB6891BE}"/>
-              </a:ext>
-            </a:extLst>
-          </p:cNvPr>
-          <p:cNvPicPr>
-            <a:picLocks noChangeAspect="1"/>
-          </p:cNvPicPr>
-          <p:nvPr/>
-        </p:nvPicPr>
-        <p:blipFill>
-          <a:blip r:embed="rId7"/>
-          <a:stretch>
-            <a:fillRect/>
-          </a:stretch>
-        </p:blipFill>
-        <p:spPr>
-          <a:xfrm>
-            <a:off x="2875644" y="3099210"/>
-            <a:ext cx="2900751" cy="2502989"/>
-          </a:xfrm>
-          <a:prstGeom prst="rect">
-            <a:avLst/>
-          </a:prstGeom>
-        </p:spPr>
-      </p:pic>
     </p:spTree>
     <p:extLst>
       <p:ext uri="{BB962C8B-B14F-4D97-AF65-F5344CB8AC3E}">
-        <p14:creationId xmlns:p14="http://schemas.microsoft.com/office/powerpoint/2010/main" val="1084600439"/>
+        <p14:creationId xmlns:p14="http://schemas.microsoft.com/office/powerpoint/2010/main" val="1917091790"/>
       </p:ext>
     </p:extLst>
   </p:cSld>
@@ -4227,7 +4168,7 @@
         </p:nvSpPr>
         <p:spPr>
           <a:xfrm>
-            <a:off x="1580113" y="1339195"/>
+            <a:off x="1417743" y="942458"/>
             <a:ext cx="9144000" cy="852211"/>
           </a:xfrm>
         </p:spPr>
@@ -4262,13 +4203,13 @@
         </p:nvSpPr>
         <p:spPr>
           <a:xfrm>
-            <a:off x="1276865" y="2345670"/>
+            <a:off x="1220752" y="1920358"/>
             <a:ext cx="9750495" cy="1896681"/>
           </a:xfrm>
         </p:spPr>
         <p:txBody>
           <a:bodyPr>
-            <a:normAutofit lnSpcReduction="10000"/>
+            <a:normAutofit/>
           </a:bodyPr>
           <a:lstStyle/>
           <a:p>
@@ -4277,77 +4218,9 @@
               <a:buChar char="-"/>
             </a:pPr>
             <a:r>
-              <a:rPr lang="pt-BR" sz="2800" dirty="0" err="1"/>
-              <a:t>React</a:t>
-            </a:r>
-            <a:r>
               <a:rPr lang="pt-BR" sz="2800" dirty="0"/>
-              <a:t> em </a:t>
-            </a:r>
-            <a:r>
-              <a:rPr lang="pt-BR" sz="2800" dirty="0" err="1"/>
-              <a:t>Typescript</a:t>
-            </a:r>
-            <a:r>
-              <a:rPr lang="pt-BR" sz="2800" dirty="0"/>
-              <a:t> para o front-</a:t>
-            </a:r>
-            <a:r>
-              <a:rPr lang="pt-BR" sz="2800" dirty="0" err="1"/>
-              <a:t>end</a:t>
-            </a:r>
-            <a:endParaRPr lang="pt-BR" sz="2800" dirty="0"/>
-          </a:p>
-          <a:p>
-            <a:pPr marL="457200" indent="-457200" algn="l">
-              <a:buFontTx/>
-              <a:buChar char="-"/>
-            </a:pPr>
-            <a:r>
-              <a:rPr lang="pt-BR" sz="2800" dirty="0"/>
-              <a:t>Back-</a:t>
-            </a:r>
-            <a:r>
-              <a:rPr lang="pt-BR" sz="2800" dirty="0" err="1"/>
-              <a:t>end</a:t>
-            </a:r>
-            <a:r>
-              <a:rPr lang="pt-BR" sz="2800" dirty="0"/>
-              <a:t>  </a:t>
-            </a:r>
-            <a:r>
-              <a:rPr lang="pt-BR" sz="2800" dirty="0" err="1"/>
-              <a:t>nodejs</a:t>
-            </a:r>
-            <a:r>
-              <a:rPr lang="pt-BR" sz="2800" dirty="0"/>
-              <a:t> </a:t>
-            </a:r>
-          </a:p>
-          <a:p>
-            <a:pPr marL="457200" indent="-457200" algn="l">
-              <a:buFontTx/>
-              <a:buChar char="-"/>
-            </a:pPr>
-            <a:r>
-              <a:rPr lang="pt-BR" sz="2800" dirty="0"/>
-              <a:t>Banco de dados MySql</a:t>
-            </a:r>
-          </a:p>
-          <a:p>
-            <a:pPr marL="457200" indent="-457200" algn="l">
-              <a:buFontTx/>
-              <a:buChar char="-"/>
-            </a:pPr>
-            <a:r>
-              <a:rPr lang="pt-BR" sz="2800" dirty="0"/>
-              <a:t>Comunicação com </a:t>
-            </a:r>
-            <a:r>
-              <a:rPr lang="pt-BR" sz="2800" dirty="0" err="1"/>
-              <a:t>socketIO</a:t>
-            </a:r>
-            <a:endParaRPr lang="pt-BR" sz="2800" dirty="0"/>
+              <a:t>Diagrama de Classe</a:t>
+            </a:r>
           </a:p>
         </p:txBody>
       </p:sp>
@@ -4426,15 +4299,15 @@
       </p:pic>
       <p:pic>
         <p:nvPicPr>
-          <p:cNvPr id="2052" name="Picture 4" descr="Como criar e configurar um servidor Nodejs">
-            <a:extLst>
-              <a:ext uri="{FF2B5EF4-FFF2-40B4-BE49-F238E27FC236}">
-                <a16:creationId xmlns:a16="http://schemas.microsoft.com/office/drawing/2014/main" id="{08BB1752-B497-471B-A58B-9CB5D07115A3}"/>
+          <p:cNvPr id="6" name="Imagem 5" descr="Diagrama, Desenho técnico&#10;&#10;O conteúdo gerado por IA pode estar incorreto.">
+            <a:extLst>
+              <a:ext uri="{FF2B5EF4-FFF2-40B4-BE49-F238E27FC236}">
+                <a16:creationId xmlns:a16="http://schemas.microsoft.com/office/drawing/2014/main" id="{B550CFC9-D36F-B621-311A-377D52F54910}"/>
               </a:ext>
             </a:extLst>
           </p:cNvPr>
           <p:cNvPicPr>
-            <a:picLocks noChangeAspect="1" noChangeArrowheads="1"/>
+            <a:picLocks noChangeAspect="1"/>
           </p:cNvPicPr>
           <p:nvPr/>
         </p:nvPicPr>
@@ -4453,169 +4326,78 @@
         </p:blipFill>
         <p:spPr bwMode="auto">
           <a:xfrm>
-            <a:off x="5992442" y="4489929"/>
-            <a:ext cx="3431810" cy="1943799"/>
+            <a:off x="5798459" y="1794668"/>
+            <a:ext cx="4823105" cy="4755586"/>
           </a:xfrm>
           <a:prstGeom prst="rect">
             <a:avLst/>
           </a:prstGeom>
           <a:noFill/>
-          <a:extLst>
-            <a:ext uri="{909E8E84-426E-40DD-AFC4-6F175D3DCCD1}">
-              <a14:hiddenFill xmlns:a14="http://schemas.microsoft.com/office/drawing/2010/main">
-                <a:solidFill>
-                  <a:srgbClr val="FFFFFF"/>
-                </a:solidFill>
-              </a14:hiddenFill>
-            </a:ext>
-          </a:extLst>
+          <a:ln>
+            <a:noFill/>
+          </a:ln>
         </p:spPr>
       </p:pic>
-      <p:pic>
-        <p:nvPicPr>
-          <p:cNvPr id="2054" name="Picture 6" descr="React adesivo sticker">
-            <a:extLst>
-              <a:ext uri="{FF2B5EF4-FFF2-40B4-BE49-F238E27FC236}">
-                <a16:creationId xmlns:a16="http://schemas.microsoft.com/office/drawing/2014/main" id="{CE6CE7CE-777F-4441-884A-F6970DBF3AFF}"/>
-              </a:ext>
-            </a:extLst>
-          </p:cNvPr>
-          <p:cNvPicPr>
-            <a:picLocks noChangeAspect="1" noChangeArrowheads="1"/>
-          </p:cNvPicPr>
+      <p:sp>
+        <p:nvSpPr>
+          <p:cNvPr id="8" name="CaixaDeTexto 7">
+            <a:extLst>
+              <a:ext uri="{FF2B5EF4-FFF2-40B4-BE49-F238E27FC236}">
+                <a16:creationId xmlns:a16="http://schemas.microsoft.com/office/drawing/2014/main" id="{726E5CC1-EEC2-CA63-0847-2348B81DF330}"/>
+              </a:ext>
+            </a:extLst>
+          </p:cNvPr>
+          <p:cNvSpPr txBox="1"/>
           <p:nvPr/>
-        </p:nvPicPr>
-        <p:blipFill>
-          <a:blip r:embed="rId5">
-            <a:extLst>
-              <a:ext uri="{28A0092B-C50C-407E-A947-70E740481C1C}">
-                <a14:useLocalDpi xmlns:a14="http://schemas.microsoft.com/office/drawing/2010/main" val="0"/>
-              </a:ext>
-            </a:extLst>
-          </a:blip>
-          <a:srcRect/>
-          <a:stretch>
-            <a:fillRect/>
-          </a:stretch>
-        </p:blipFill>
-        <p:spPr bwMode="auto">
-          <a:xfrm>
-            <a:off x="3855247" y="4396615"/>
-            <a:ext cx="2137195" cy="2137195"/>
+        </p:nvSpPr>
+        <p:spPr>
+          <a:xfrm>
+            <a:off x="5716827" y="6537443"/>
+            <a:ext cx="6097424" cy="276999"/>
           </a:xfrm>
           <a:prstGeom prst="rect">
             <a:avLst/>
           </a:prstGeom>
           <a:noFill/>
-          <a:extLst>
-            <a:ext uri="{909E8E84-426E-40DD-AFC4-6F175D3DCCD1}">
-              <a14:hiddenFill xmlns:a14="http://schemas.microsoft.com/office/drawing/2010/main">
-                <a:solidFill>
-                  <a:srgbClr val="FFFFFF"/>
-                </a:solidFill>
-              </a14:hiddenFill>
-            </a:ext>
-          </a:extLst>
-        </p:spPr>
-      </p:pic>
-      <p:pic>
-        <p:nvPicPr>
-          <p:cNvPr id="2056" name="Picture 8" descr="O que é o MySQL? | OVHcloud Portugal">
-            <a:extLst>
-              <a:ext uri="{FF2B5EF4-FFF2-40B4-BE49-F238E27FC236}">
-                <a16:creationId xmlns:a16="http://schemas.microsoft.com/office/drawing/2014/main" id="{04805C8F-9653-4549-A79D-2C6A344034D9}"/>
-              </a:ext>
-            </a:extLst>
-          </p:cNvPr>
-          <p:cNvPicPr>
-            <a:picLocks noChangeAspect="1" noChangeArrowheads="1"/>
-          </p:cNvPicPr>
-          <p:nvPr/>
-        </p:nvPicPr>
-        <p:blipFill>
-          <a:blip r:embed="rId6">
-            <a:extLst>
-              <a:ext uri="{28A0092B-C50C-407E-A947-70E740481C1C}">
-                <a14:useLocalDpi xmlns:a14="http://schemas.microsoft.com/office/drawing/2010/main" val="0"/>
-              </a:ext>
-            </a:extLst>
-          </a:blip>
-          <a:srcRect/>
-          <a:stretch>
-            <a:fillRect/>
-          </a:stretch>
-        </p:blipFill>
-        <p:spPr bwMode="auto">
-          <a:xfrm>
-            <a:off x="734938" y="4715902"/>
-            <a:ext cx="2505051" cy="1073593"/>
-          </a:xfrm>
-          <a:prstGeom prst="rect">
-            <a:avLst/>
-          </a:prstGeom>
-          <a:noFill/>
-          <a:extLst>
-            <a:ext uri="{909E8E84-426E-40DD-AFC4-6F175D3DCCD1}">
-              <a14:hiddenFill xmlns:a14="http://schemas.microsoft.com/office/drawing/2010/main">
-                <a:solidFill>
-                  <a:srgbClr val="FFFFFF"/>
-                </a:solidFill>
-              </a14:hiddenFill>
-            </a:ext>
-          </a:extLst>
-        </p:spPr>
-      </p:pic>
-      <p:pic>
-        <p:nvPicPr>
-          <p:cNvPr id="6" name="Picture 4" descr="What's new in SocketIO 4?">
-            <a:extLst>
-              <a:ext uri="{FF2B5EF4-FFF2-40B4-BE49-F238E27FC236}">
-                <a16:creationId xmlns:a16="http://schemas.microsoft.com/office/drawing/2014/main" id="{3891E9E6-EF9A-72D5-B20A-BD05D125CDEC}"/>
-              </a:ext>
-            </a:extLst>
-          </p:cNvPr>
-          <p:cNvPicPr>
-            <a:picLocks noChangeAspect="1" noChangeArrowheads="1"/>
-          </p:cNvPicPr>
-          <p:nvPr/>
-        </p:nvPicPr>
-        <p:blipFill>
-          <a:blip r:embed="rId7">
-            <a:extLst>
-              <a:ext uri="{28A0092B-C50C-407E-A947-70E740481C1C}">
-                <a14:useLocalDpi xmlns:a14="http://schemas.microsoft.com/office/drawing/2010/main" val="0"/>
-              </a:ext>
-            </a:extLst>
-          </a:blip>
-          <a:srcRect/>
-          <a:stretch>
-            <a:fillRect/>
-          </a:stretch>
-        </p:blipFill>
-        <p:spPr bwMode="auto">
-          <a:xfrm>
-            <a:off x="8988417" y="4788052"/>
-            <a:ext cx="2767748" cy="1298823"/>
-          </a:xfrm>
-          <a:prstGeom prst="rect">
-            <a:avLst/>
-          </a:prstGeom>
-          <a:noFill/>
-          <a:extLst>
-            <a:ext uri="{909E8E84-426E-40DD-AFC4-6F175D3DCCD1}">
-              <a14:hiddenFill xmlns:a14="http://schemas.microsoft.com/office/drawing/2010/main">
-                <a:solidFill>
-                  <a:srgbClr val="FFFFFF"/>
-                </a:solidFill>
-              </a14:hiddenFill>
-            </a:ext>
-          </a:extLst>
-        </p:spPr>
-      </p:pic>
+        </p:spPr>
+        <p:txBody>
+          <a:bodyPr wrap="square">
+            <a:spAutoFit/>
+          </a:bodyPr>
+          <a:lstStyle/>
+          <a:p>
+            <a:pPr algn="just"/>
+            <a:r>
+              <a:rPr lang="pt-BR" sz="1200" dirty="0">
+                <a:effectLst/>
+                <a:latin typeface="Arial" panose="020B0604020202020204" pitchFamily="34" charset="0"/>
+                <a:ea typeface="Calibri" panose="020F0502020204030204" pitchFamily="34" charset="0"/>
+                <a:cs typeface="Times New Roman" panose="02020603050405020304" pitchFamily="18" charset="0"/>
+              </a:rPr>
+              <a:t>Fonte: Elaborado pelo autor com </a:t>
+            </a:r>
+            <a:r>
+              <a:rPr lang="pt-BR" sz="1200" dirty="0" err="1">
+                <a:effectLst/>
+                <a:latin typeface="Arial" panose="020B0604020202020204" pitchFamily="34" charset="0"/>
+                <a:ea typeface="Calibri" panose="020F0502020204030204" pitchFamily="34" charset="0"/>
+                <a:cs typeface="Times New Roman" panose="02020603050405020304" pitchFamily="18" charset="0"/>
+              </a:rPr>
+              <a:t>PlantUML</a:t>
+            </a:r>
+            <a:endParaRPr lang="pt-BR" sz="1200" dirty="0">
+              <a:effectLst/>
+              <a:latin typeface="Calibri" panose="020F0502020204030204" pitchFamily="34" charset="0"/>
+              <a:ea typeface="Calibri" panose="020F0502020204030204" pitchFamily="34" charset="0"/>
+              <a:cs typeface="Times New Roman" panose="02020603050405020304" pitchFamily="18" charset="0"/>
+            </a:endParaRPr>
+          </a:p>
+        </p:txBody>
+      </p:sp>
     </p:spTree>
     <p:extLst>
       <p:ext uri="{BB962C8B-B14F-4D97-AF65-F5344CB8AC3E}">
-        <p14:creationId xmlns:p14="http://schemas.microsoft.com/office/powerpoint/2010/main" val="580873634"/>
+        <p14:creationId xmlns:p14="http://schemas.microsoft.com/office/powerpoint/2010/main" val="686589215"/>
       </p:ext>
     </p:extLst>
   </p:cSld>
@@ -4660,7 +4442,7 @@
         </p:nvSpPr>
         <p:spPr>
           <a:xfrm>
-            <a:off x="1580113" y="1339195"/>
+            <a:off x="1580112" y="942458"/>
             <a:ext cx="9144000" cy="852211"/>
           </a:xfrm>
         </p:spPr>
@@ -4672,7 +4454,7 @@
           <a:p>
             <a:r>
               <a:rPr lang="pt-BR" sz="4800" dirty="0"/>
-              <a:t>DESENVOLVIMENTO / RESULTADOS</a:t>
+              <a:t>DESENVOLVIMENTO</a:t>
             </a:r>
           </a:p>
         </p:txBody>
@@ -4695,8 +4477,8 @@
         </p:nvSpPr>
         <p:spPr>
           <a:xfrm>
-            <a:off x="729934" y="2345670"/>
-            <a:ext cx="9750495" cy="2969814"/>
+            <a:off x="680756" y="1766513"/>
+            <a:ext cx="9750495" cy="696632"/>
           </a:xfrm>
         </p:spPr>
         <p:txBody>
@@ -4711,40 +4493,8 @@
             </a:pPr>
             <a:r>
               <a:rPr lang="pt-BR" sz="2800" dirty="0"/>
-              <a:t>Gamificação na plataforma</a:t>
-            </a:r>
-          </a:p>
-          <a:p>
-            <a:pPr algn="l"/>
-            <a:r>
-              <a:rPr lang="pt-BR" sz="2800" dirty="0"/>
-              <a:t>	- Sistema de níveis</a:t>
-            </a:r>
-          </a:p>
-          <a:p>
-            <a:pPr algn="l"/>
-            <a:r>
-              <a:rPr lang="pt-BR" sz="2800" dirty="0"/>
-              <a:t>	- Sistema de ranking</a:t>
-            </a:r>
-          </a:p>
-          <a:p>
-            <a:pPr algn="l"/>
-            <a:r>
-              <a:rPr lang="pt-BR" sz="2800" dirty="0"/>
-              <a:t>	- Sistema de modo online</a:t>
-            </a:r>
-          </a:p>
-          <a:p>
-            <a:pPr algn="l"/>
-            <a:r>
-              <a:rPr lang="pt-BR" sz="2800" dirty="0"/>
-              <a:t>	- Sistema de elos</a:t>
-            </a:r>
-          </a:p>
-          <a:p>
-            <a:pPr algn="l"/>
-            <a:endParaRPr lang="pt-BR" sz="2800" dirty="0"/>
+              <a:t>Diagramas de Caso de Uso</a:t>
+            </a:r>
           </a:p>
         </p:txBody>
       </p:sp>
@@ -4823,10 +4573,10 @@
       </p:pic>
       <p:pic>
         <p:nvPicPr>
-          <p:cNvPr id="7" name="Imagem 6">
-            <a:extLst>
-              <a:ext uri="{FF2B5EF4-FFF2-40B4-BE49-F238E27FC236}">
-                <a16:creationId xmlns:a16="http://schemas.microsoft.com/office/drawing/2014/main" id="{AA5F8965-BC7D-F142-E5C3-4D6DD5A1E2C5}"/>
+          <p:cNvPr id="6" name="Imagem 5" descr="Gráfico, Diagrama, Gráfico de bolhas&#10;&#10;O conteúdo gerado por IA pode estar incorreto.">
+            <a:extLst>
+              <a:ext uri="{FF2B5EF4-FFF2-40B4-BE49-F238E27FC236}">
+                <a16:creationId xmlns:a16="http://schemas.microsoft.com/office/drawing/2014/main" id="{EF4226C0-624E-EC78-CD63-CA5E34E06278}"/>
               </a:ext>
             </a:extLst>
           </p:cNvPr>
@@ -4843,8 +4593,8 @@
         </p:blipFill>
         <p:spPr>
           <a:xfrm>
-            <a:off x="6298729" y="2363741"/>
-            <a:ext cx="2897733" cy="3447711"/>
+            <a:off x="1187865" y="2442869"/>
+            <a:ext cx="4964247" cy="4078727"/>
           </a:xfrm>
           <a:prstGeom prst="rect">
             <a:avLst/>
@@ -4853,10 +4603,10 @@
       </p:pic>
       <p:pic>
         <p:nvPicPr>
-          <p:cNvPr id="9" name="Imagem 8">
-            <a:extLst>
-              <a:ext uri="{FF2B5EF4-FFF2-40B4-BE49-F238E27FC236}">
-                <a16:creationId xmlns:a16="http://schemas.microsoft.com/office/drawing/2014/main" id="{908862AE-8C22-3188-C1B2-ECEC6B6D5643}"/>
+          <p:cNvPr id="11" name="Imagem 10">
+            <a:extLst>
+              <a:ext uri="{FF2B5EF4-FFF2-40B4-BE49-F238E27FC236}">
+                <a16:creationId xmlns:a16="http://schemas.microsoft.com/office/drawing/2014/main" id="{D1413A69-7077-7094-0BAF-AD4CDB6891BE}"/>
               </a:ext>
             </a:extLst>
           </p:cNvPr>
@@ -4873,8 +4623,8 @@
         </p:blipFill>
         <p:spPr>
           <a:xfrm>
-            <a:off x="9338236" y="2390630"/>
-            <a:ext cx="2591162" cy="1038370"/>
+            <a:off x="6659221" y="2287936"/>
+            <a:ext cx="4964247" cy="4283531"/>
           </a:xfrm>
           <a:prstGeom prst="rect">
             <a:avLst/>
@@ -4884,7 +4634,7 @@
     </p:spTree>
     <p:extLst>
       <p:ext uri="{BB962C8B-B14F-4D97-AF65-F5344CB8AC3E}">
-        <p14:creationId xmlns:p14="http://schemas.microsoft.com/office/powerpoint/2010/main" val="541942102"/>
+        <p14:creationId xmlns:p14="http://schemas.microsoft.com/office/powerpoint/2010/main" val="1084600439"/>
       </p:ext>
     </p:extLst>
   </p:cSld>
@@ -4899,7 +4649,13 @@
   <p:cSld>
     <p:spTree>
       <p:nvGrpSpPr>
-        <p:cNvPr id="1" name=""/>
+        <p:cNvPr id="1" name="">
+          <a:extLst>
+            <a:ext uri="{FF2B5EF4-FFF2-40B4-BE49-F238E27FC236}">
+              <a16:creationId xmlns:a16="http://schemas.microsoft.com/office/drawing/2014/main" id="{158DF9D0-4270-E14B-EA02-3189CF1BC0F1}"/>
+            </a:ext>
+          </a:extLst>
+        </p:cNvPr>
         <p:cNvGrpSpPr/>
         <p:nvPr/>
       </p:nvGrpSpPr>
@@ -4916,7 +4672,7 @@
           <p:cNvPr id="2" name="Título 1">
             <a:extLst>
               <a:ext uri="{FF2B5EF4-FFF2-40B4-BE49-F238E27FC236}">
-                <a16:creationId xmlns:a16="http://schemas.microsoft.com/office/drawing/2014/main" id="{5E447ACB-E7DF-4BBE-AC44-A1AC9F22CAC8}"/>
+                <a16:creationId xmlns:a16="http://schemas.microsoft.com/office/drawing/2014/main" id="{99DD4DF6-0716-E63E-71E6-75F67311777A}"/>
               </a:ext>
             </a:extLst>
           </p:cNvPr>
@@ -4929,7 +4685,7 @@
         </p:nvSpPr>
         <p:spPr>
           <a:xfrm>
-            <a:off x="1524000" y="1120679"/>
+            <a:off x="1580112" y="942458"/>
             <a:ext cx="9144000" cy="852211"/>
           </a:xfrm>
         </p:spPr>
@@ -4941,7 +4697,7 @@
           <a:p>
             <a:r>
               <a:rPr lang="pt-BR" sz="4800" dirty="0"/>
-              <a:t>DESENVOLVIMENTO / RESULTADOS</a:t>
+              <a:t>DESENVOLVIMENTO</a:t>
             </a:r>
           </a:p>
         </p:txBody>
@@ -4951,7 +4707,7 @@
           <p:cNvPr id="3" name="Subtítulo 2">
             <a:extLst>
               <a:ext uri="{FF2B5EF4-FFF2-40B4-BE49-F238E27FC236}">
-                <a16:creationId xmlns:a16="http://schemas.microsoft.com/office/drawing/2014/main" id="{D925F25B-ABDD-439F-B7AE-9A79A3FDC1CE}"/>
+                <a16:creationId xmlns:a16="http://schemas.microsoft.com/office/drawing/2014/main" id="{A0FC7E30-115A-4DEA-7820-4750948A6AD0}"/>
               </a:ext>
             </a:extLst>
           </p:cNvPr>
@@ -4964,8 +4720,8 @@
         </p:nvSpPr>
         <p:spPr>
           <a:xfrm>
-            <a:off x="301935" y="2006425"/>
-            <a:ext cx="9750495" cy="540868"/>
+            <a:off x="891793" y="1833464"/>
+            <a:ext cx="9750495" cy="696632"/>
           </a:xfrm>
         </p:spPr>
         <p:txBody>
@@ -4980,12 +4736,8 @@
             </a:pPr>
             <a:r>
               <a:rPr lang="pt-BR" sz="2800" dirty="0"/>
-              <a:t>Sistema de elos</a:t>
-            </a:r>
-          </a:p>
-          <a:p>
-            <a:pPr algn="l"/>
-            <a:endParaRPr lang="pt-BR" sz="2800" dirty="0"/>
+              <a:t>Diagramas de Caso de Uso</a:t>
+            </a:r>
           </a:p>
         </p:txBody>
       </p:sp>
@@ -4994,7 +4746,7 @@
           <p:cNvPr id="4" name="Imagem 3">
             <a:extLst>
               <a:ext uri="{FF2B5EF4-FFF2-40B4-BE49-F238E27FC236}">
-                <a16:creationId xmlns:a16="http://schemas.microsoft.com/office/drawing/2014/main" id="{4DE49855-8442-4D60-81FD-DFE2DB045AC2}"/>
+                <a16:creationId xmlns:a16="http://schemas.microsoft.com/office/drawing/2014/main" id="{08BE3665-8B1F-BF4E-0EBC-87FC0C295C03}"/>
               </a:ext>
             </a:extLst>
           </p:cNvPr>
@@ -5033,7 +4785,7 @@
           <p:cNvPr id="5" name="Imagem 4">
             <a:extLst>
               <a:ext uri="{FF2B5EF4-FFF2-40B4-BE49-F238E27FC236}">
-                <a16:creationId xmlns:a16="http://schemas.microsoft.com/office/drawing/2014/main" id="{00EB44F1-66E6-49A0-94D9-09FA009430BD}"/>
+                <a16:creationId xmlns:a16="http://schemas.microsoft.com/office/drawing/2014/main" id="{1F9B3220-5CF8-2760-15B0-3EFF0417D1E0}"/>
               </a:ext>
             </a:extLst>
           </p:cNvPr>
@@ -5064,10 +4816,10 @@
       </p:pic>
       <p:pic>
         <p:nvPicPr>
-          <p:cNvPr id="7" name="Imagem 6" descr="Forma, Polígono&#10;&#10;O conteúdo gerado por IA pode estar incorreto.">
-            <a:extLst>
-              <a:ext uri="{FF2B5EF4-FFF2-40B4-BE49-F238E27FC236}">
-                <a16:creationId xmlns:a16="http://schemas.microsoft.com/office/drawing/2014/main" id="{B84E8023-3A70-574E-B2D2-931FC3EA51D5}"/>
+          <p:cNvPr id="8" name="Imagem 7">
+            <a:extLst>
+              <a:ext uri="{FF2B5EF4-FFF2-40B4-BE49-F238E27FC236}">
+                <a16:creationId xmlns:a16="http://schemas.microsoft.com/office/drawing/2014/main" id="{CF4DB96C-4279-4852-F5EB-C058AEBB3C6F}"/>
               </a:ext>
             </a:extLst>
           </p:cNvPr>
@@ -5084,14 +4836,46 @@
               </a:ext>
             </a:extLst>
           </a:blip>
+          <a:srcRect/>
           <a:stretch>
             <a:fillRect/>
           </a:stretch>
         </p:blipFill>
-        <p:spPr>
-          <a:xfrm>
-            <a:off x="2266899" y="2443839"/>
-            <a:ext cx="7482994" cy="4207130"/>
+        <p:spPr bwMode="auto">
+          <a:xfrm>
+            <a:off x="6323028" y="2446643"/>
+            <a:ext cx="5023610" cy="3898650"/>
+          </a:xfrm>
+          <a:prstGeom prst="rect">
+            <a:avLst/>
+          </a:prstGeom>
+          <a:noFill/>
+        </p:spPr>
+      </p:pic>
+      <p:pic>
+        <p:nvPicPr>
+          <p:cNvPr id="9" name="Imagem 8" descr="Gráfico, Gráfico de bolhas&#10;&#10;O conteúdo gerado por IA pode estar incorreto.">
+            <a:extLst>
+              <a:ext uri="{FF2B5EF4-FFF2-40B4-BE49-F238E27FC236}">
+                <a16:creationId xmlns:a16="http://schemas.microsoft.com/office/drawing/2014/main" id="{1E05BC3F-3755-9D57-D042-F6EA44627C0D}"/>
+              </a:ext>
+            </a:extLst>
+          </p:cNvPr>
+          <p:cNvPicPr>
+            <a:picLocks noChangeAspect="1"/>
+          </p:cNvPicPr>
+          <p:nvPr/>
+        </p:nvPicPr>
+        <p:blipFill>
+          <a:blip r:embed="rId5"/>
+          <a:stretch>
+            <a:fillRect/>
+          </a:stretch>
+        </p:blipFill>
+        <p:spPr>
+          <a:xfrm>
+            <a:off x="770101" y="2446643"/>
+            <a:ext cx="4878670" cy="4037070"/>
           </a:xfrm>
           <a:prstGeom prst="rect">
             <a:avLst/>
@@ -5101,7 +4885,7 @@
     </p:spTree>
     <p:extLst>
       <p:ext uri="{BB962C8B-B14F-4D97-AF65-F5344CB8AC3E}">
-        <p14:creationId xmlns:p14="http://schemas.microsoft.com/office/powerpoint/2010/main" val="2689894874"/>
+        <p14:creationId xmlns:p14="http://schemas.microsoft.com/office/powerpoint/2010/main" val="4153711746"/>
       </p:ext>
     </p:extLst>
   </p:cSld>
@@ -5158,7 +4942,7 @@
           <a:p>
             <a:r>
               <a:rPr lang="pt-BR" sz="4800" dirty="0"/>
-              <a:t>DESENVOLVIMENTO / RESULTADOS</a:t>
+              <a:t>DESENVOLVIMENTO</a:t>
             </a:r>
           </a:p>
         </p:txBody>
@@ -5187,7 +4971,7 @@
         </p:spPr>
         <p:txBody>
           <a:bodyPr>
-            <a:normAutofit/>
+            <a:normAutofit lnSpcReduction="10000"/>
           </a:bodyPr>
           <a:lstStyle/>
           <a:p>
@@ -5196,12 +4980,76 @@
               <a:buChar char="-"/>
             </a:pPr>
             <a:r>
+              <a:rPr lang="pt-BR" sz="2800" dirty="0" err="1"/>
+              <a:t>React</a:t>
+            </a:r>
+            <a:r>
               <a:rPr lang="pt-BR" sz="2800" dirty="0"/>
-              <a:t>Sistema de salas (offline)</a:t>
-            </a:r>
-          </a:p>
-          <a:p>
-            <a:pPr algn="l"/>
+              <a:t> em </a:t>
+            </a:r>
+            <a:r>
+              <a:rPr lang="pt-BR" sz="2800" dirty="0" err="1"/>
+              <a:t>Typescript</a:t>
+            </a:r>
+            <a:r>
+              <a:rPr lang="pt-BR" sz="2800" dirty="0"/>
+              <a:t> para o front-</a:t>
+            </a:r>
+            <a:r>
+              <a:rPr lang="pt-BR" sz="2800" dirty="0" err="1"/>
+              <a:t>end</a:t>
+            </a:r>
+            <a:endParaRPr lang="pt-BR" sz="2800" dirty="0"/>
+          </a:p>
+          <a:p>
+            <a:pPr marL="457200" indent="-457200" algn="l">
+              <a:buFontTx/>
+              <a:buChar char="-"/>
+            </a:pPr>
+            <a:r>
+              <a:rPr lang="pt-BR" sz="2800" dirty="0"/>
+              <a:t>Back-</a:t>
+            </a:r>
+            <a:r>
+              <a:rPr lang="pt-BR" sz="2800" dirty="0" err="1"/>
+              <a:t>end</a:t>
+            </a:r>
+            <a:r>
+              <a:rPr lang="pt-BR" sz="2800" dirty="0"/>
+              <a:t>  </a:t>
+            </a:r>
+            <a:r>
+              <a:rPr lang="pt-BR" sz="2800" dirty="0" err="1"/>
+              <a:t>nodejs</a:t>
+            </a:r>
+            <a:r>
+              <a:rPr lang="pt-BR" sz="2800" dirty="0"/>
+              <a:t> </a:t>
+            </a:r>
+          </a:p>
+          <a:p>
+            <a:pPr marL="457200" indent="-457200" algn="l">
+              <a:buFontTx/>
+              <a:buChar char="-"/>
+            </a:pPr>
+            <a:r>
+              <a:rPr lang="pt-BR" sz="2800" dirty="0"/>
+              <a:t>Banco de dados MySql</a:t>
+            </a:r>
+          </a:p>
+          <a:p>
+            <a:pPr marL="457200" indent="-457200" algn="l">
+              <a:buFontTx/>
+              <a:buChar char="-"/>
+            </a:pPr>
+            <a:r>
+              <a:rPr lang="pt-BR" sz="2800" dirty="0"/>
+              <a:t>Comunicação com </a:t>
+            </a:r>
+            <a:r>
+              <a:rPr lang="pt-BR" sz="2800" dirty="0" err="1"/>
+              <a:t>socketIO</a:t>
+            </a:r>
             <a:endParaRPr lang="pt-BR" sz="2800" dirty="0"/>
           </a:p>
         </p:txBody>
@@ -5281,70 +5129,10 @@
       </p:pic>
       <p:pic>
         <p:nvPicPr>
-          <p:cNvPr id="7" name="Imagem 6">
-            <a:extLst>
-              <a:ext uri="{FF2B5EF4-FFF2-40B4-BE49-F238E27FC236}">
-                <a16:creationId xmlns:a16="http://schemas.microsoft.com/office/drawing/2014/main" id="{5E41090B-8C68-8B19-E122-8F014F26238B}"/>
-              </a:ext>
-            </a:extLst>
-          </p:cNvPr>
-          <p:cNvPicPr>
-            <a:picLocks noChangeAspect="1"/>
-          </p:cNvPicPr>
-          <p:nvPr/>
-        </p:nvPicPr>
-        <p:blipFill>
-          <a:blip r:embed="rId4"/>
-          <a:stretch>
-            <a:fillRect/>
-          </a:stretch>
-        </p:blipFill>
-        <p:spPr>
-          <a:xfrm>
-            <a:off x="6207351" y="3026068"/>
-            <a:ext cx="5779433" cy="2953449"/>
-          </a:xfrm>
-          <a:prstGeom prst="rect">
-            <a:avLst/>
-          </a:prstGeom>
-        </p:spPr>
-      </p:pic>
-      <p:pic>
-        <p:nvPicPr>
-          <p:cNvPr id="9" name="Imagem 8">
-            <a:extLst>
-              <a:ext uri="{FF2B5EF4-FFF2-40B4-BE49-F238E27FC236}">
-                <a16:creationId xmlns:a16="http://schemas.microsoft.com/office/drawing/2014/main" id="{EBAF35C5-B46C-C58B-A08C-1B3130234E0A}"/>
-              </a:ext>
-            </a:extLst>
-          </p:cNvPr>
-          <p:cNvPicPr>
-            <a:picLocks noChangeAspect="1"/>
-          </p:cNvPicPr>
-          <p:nvPr/>
-        </p:nvPicPr>
-        <p:blipFill>
-          <a:blip r:embed="rId5"/>
-          <a:stretch>
-            <a:fillRect/>
-          </a:stretch>
-        </p:blipFill>
-        <p:spPr>
-          <a:xfrm>
-            <a:off x="429487" y="2977573"/>
-            <a:ext cx="5518396" cy="1785660"/>
-          </a:xfrm>
-          <a:prstGeom prst="rect">
-            <a:avLst/>
-          </a:prstGeom>
-        </p:spPr>
-      </p:pic>
-      <p:pic>
-        <p:nvPicPr>
-          <p:cNvPr id="1034" name="Picture 10" descr="15 melhores ideias de Thumbnail Youtube | thumbnail youtube, photoshop, no  photoshop">
-            <a:extLst>
-              <a:ext uri="{FF2B5EF4-FFF2-40B4-BE49-F238E27FC236}">
-                <a16:creationId xmlns:a16="http://schemas.microsoft.com/office/drawing/2014/main" id="{55CA89A2-4BC4-4610-CFE8-14DB08D355C9}"/>
+          <p:cNvPr id="2052" name="Picture 4" descr="Como criar e configurar um servidor Nodejs">
+            <a:extLst>
+              <a:ext uri="{FF2B5EF4-FFF2-40B4-BE49-F238E27FC236}">
+                <a16:creationId xmlns:a16="http://schemas.microsoft.com/office/drawing/2014/main" id="{08BB1752-B497-471B-A58B-9CB5D07115A3}"/>
               </a:ext>
             </a:extLst>
           </p:cNvPr>
@@ -5354,7 +5142,7 @@
           <p:nvPr/>
         </p:nvPicPr>
         <p:blipFill>
-          <a:blip r:embed="rId6">
+          <a:blip r:embed="rId4">
             <a:extLst>
               <a:ext uri="{28A0092B-C50C-407E-A947-70E740481C1C}">
                 <a14:useLocalDpi xmlns:a14="http://schemas.microsoft.com/office/drawing/2010/main" val="0"/>
@@ -5367,9 +5155,9 @@
           </a:stretch>
         </p:blipFill>
         <p:spPr bwMode="auto">
-          <a:xfrm flipV="1">
-            <a:off x="4119072" y="4874254"/>
-            <a:ext cx="1618004" cy="847711"/>
+          <a:xfrm>
+            <a:off x="5992442" y="4489929"/>
+            <a:ext cx="3431810" cy="1943799"/>
           </a:xfrm>
           <a:prstGeom prst="rect">
             <a:avLst/>
@@ -5386,10 +5174,151 @@
           </a:extLst>
         </p:spPr>
       </p:pic>
+      <p:pic>
+        <p:nvPicPr>
+          <p:cNvPr id="2054" name="Picture 6" descr="React adesivo sticker">
+            <a:extLst>
+              <a:ext uri="{FF2B5EF4-FFF2-40B4-BE49-F238E27FC236}">
+                <a16:creationId xmlns:a16="http://schemas.microsoft.com/office/drawing/2014/main" id="{CE6CE7CE-777F-4441-884A-F6970DBF3AFF}"/>
+              </a:ext>
+            </a:extLst>
+          </p:cNvPr>
+          <p:cNvPicPr>
+            <a:picLocks noChangeAspect="1" noChangeArrowheads="1"/>
+          </p:cNvPicPr>
+          <p:nvPr/>
+        </p:nvPicPr>
+        <p:blipFill>
+          <a:blip r:embed="rId5">
+            <a:extLst>
+              <a:ext uri="{28A0092B-C50C-407E-A947-70E740481C1C}">
+                <a14:useLocalDpi xmlns:a14="http://schemas.microsoft.com/office/drawing/2010/main" val="0"/>
+              </a:ext>
+            </a:extLst>
+          </a:blip>
+          <a:srcRect/>
+          <a:stretch>
+            <a:fillRect/>
+          </a:stretch>
+        </p:blipFill>
+        <p:spPr bwMode="auto">
+          <a:xfrm>
+            <a:off x="3855247" y="4396615"/>
+            <a:ext cx="2137195" cy="2137195"/>
+          </a:xfrm>
+          <a:prstGeom prst="rect">
+            <a:avLst/>
+          </a:prstGeom>
+          <a:noFill/>
+          <a:extLst>
+            <a:ext uri="{909E8E84-426E-40DD-AFC4-6F175D3DCCD1}">
+              <a14:hiddenFill xmlns:a14="http://schemas.microsoft.com/office/drawing/2010/main">
+                <a:solidFill>
+                  <a:srgbClr val="FFFFFF"/>
+                </a:solidFill>
+              </a14:hiddenFill>
+            </a:ext>
+          </a:extLst>
+        </p:spPr>
+      </p:pic>
+      <p:pic>
+        <p:nvPicPr>
+          <p:cNvPr id="2056" name="Picture 8" descr="O que é o MySQL? | OVHcloud Portugal">
+            <a:extLst>
+              <a:ext uri="{FF2B5EF4-FFF2-40B4-BE49-F238E27FC236}">
+                <a16:creationId xmlns:a16="http://schemas.microsoft.com/office/drawing/2014/main" id="{04805C8F-9653-4549-A79D-2C6A344034D9}"/>
+              </a:ext>
+            </a:extLst>
+          </p:cNvPr>
+          <p:cNvPicPr>
+            <a:picLocks noChangeAspect="1" noChangeArrowheads="1"/>
+          </p:cNvPicPr>
+          <p:nvPr/>
+        </p:nvPicPr>
+        <p:blipFill>
+          <a:blip r:embed="rId6">
+            <a:extLst>
+              <a:ext uri="{28A0092B-C50C-407E-A947-70E740481C1C}">
+                <a14:useLocalDpi xmlns:a14="http://schemas.microsoft.com/office/drawing/2010/main" val="0"/>
+              </a:ext>
+            </a:extLst>
+          </a:blip>
+          <a:srcRect/>
+          <a:stretch>
+            <a:fillRect/>
+          </a:stretch>
+        </p:blipFill>
+        <p:spPr bwMode="auto">
+          <a:xfrm>
+            <a:off x="734938" y="4715902"/>
+            <a:ext cx="2505051" cy="1073593"/>
+          </a:xfrm>
+          <a:prstGeom prst="rect">
+            <a:avLst/>
+          </a:prstGeom>
+          <a:noFill/>
+          <a:extLst>
+            <a:ext uri="{909E8E84-426E-40DD-AFC4-6F175D3DCCD1}">
+              <a14:hiddenFill xmlns:a14="http://schemas.microsoft.com/office/drawing/2010/main">
+                <a:solidFill>
+                  <a:srgbClr val="FFFFFF"/>
+                </a:solidFill>
+              </a14:hiddenFill>
+            </a:ext>
+          </a:extLst>
+        </p:spPr>
+      </p:pic>
+      <p:pic>
+        <p:nvPicPr>
+          <p:cNvPr id="6" name="Picture 4" descr="What's new in SocketIO 4?">
+            <a:extLst>
+              <a:ext uri="{FF2B5EF4-FFF2-40B4-BE49-F238E27FC236}">
+                <a16:creationId xmlns:a16="http://schemas.microsoft.com/office/drawing/2014/main" id="{3891E9E6-EF9A-72D5-B20A-BD05D125CDEC}"/>
+              </a:ext>
+            </a:extLst>
+          </p:cNvPr>
+          <p:cNvPicPr>
+            <a:picLocks noChangeAspect="1" noChangeArrowheads="1"/>
+          </p:cNvPicPr>
+          <p:nvPr/>
+        </p:nvPicPr>
+        <p:blipFill>
+          <a:blip r:embed="rId7">
+            <a:extLst>
+              <a:ext uri="{28A0092B-C50C-407E-A947-70E740481C1C}">
+                <a14:useLocalDpi xmlns:a14="http://schemas.microsoft.com/office/drawing/2010/main" val="0"/>
+              </a:ext>
+            </a:extLst>
+          </a:blip>
+          <a:srcRect/>
+          <a:stretch>
+            <a:fillRect/>
+          </a:stretch>
+        </p:blipFill>
+        <p:spPr bwMode="auto">
+          <a:xfrm>
+            <a:off x="8988417" y="4788052"/>
+            <a:ext cx="2767748" cy="1298823"/>
+          </a:xfrm>
+          <a:prstGeom prst="rect">
+            <a:avLst/>
+          </a:prstGeom>
+          <a:noFill/>
+          <a:extLst>
+            <a:ext uri="{909E8E84-426E-40DD-AFC4-6F175D3DCCD1}">
+              <a14:hiddenFill xmlns:a14="http://schemas.microsoft.com/office/drawing/2010/main">
+                <a:solidFill>
+                  <a:srgbClr val="FFFFFF"/>
+                </a:solidFill>
+              </a14:hiddenFill>
+            </a:ext>
+          </a:extLst>
+        </p:spPr>
+      </p:pic>
     </p:spTree>
     <p:extLst>
       <p:ext uri="{BB962C8B-B14F-4D97-AF65-F5344CB8AC3E}">
-        <p14:creationId xmlns:p14="http://schemas.microsoft.com/office/powerpoint/2010/main" val="2841758471"/>
+        <p14:creationId xmlns:p14="http://schemas.microsoft.com/office/powerpoint/2010/main" val="580873634"/>
       </p:ext>
     </p:extLst>
   </p:cSld>
@@ -5469,8 +5398,8 @@
         </p:nvSpPr>
         <p:spPr>
           <a:xfrm>
-            <a:off x="1276865" y="2345670"/>
-            <a:ext cx="9750495" cy="1896681"/>
+            <a:off x="729934" y="2345670"/>
+            <a:ext cx="9750495" cy="2969814"/>
           </a:xfrm>
         </p:spPr>
         <p:txBody>
@@ -5485,7 +5414,35 @@
             </a:pPr>
             <a:r>
               <a:rPr lang="pt-BR" sz="2800" dirty="0"/>
-              <a:t>Sistema de salas (online)</a:t>
+              <a:t>Gamificação na plataforma</a:t>
+            </a:r>
+          </a:p>
+          <a:p>
+            <a:pPr algn="l"/>
+            <a:r>
+              <a:rPr lang="pt-BR" sz="2800" dirty="0"/>
+              <a:t>	- Sistema de níveis</a:t>
+            </a:r>
+          </a:p>
+          <a:p>
+            <a:pPr algn="l"/>
+            <a:r>
+              <a:rPr lang="pt-BR" sz="2800" dirty="0"/>
+              <a:t>	- Sistema de ranking</a:t>
+            </a:r>
+          </a:p>
+          <a:p>
+            <a:pPr algn="l"/>
+            <a:r>
+              <a:rPr lang="pt-BR" sz="2800" dirty="0"/>
+              <a:t>	- Sistema de modo online</a:t>
+            </a:r>
+          </a:p>
+          <a:p>
+            <a:pPr algn="l"/>
+            <a:r>
+              <a:rPr lang="pt-BR" sz="2800" dirty="0"/>
+              <a:t>	- Sistema de elos</a:t>
             </a:r>
           </a:p>
           <a:p>
@@ -5572,7 +5529,7 @@
           <p:cNvPr id="7" name="Imagem 6">
             <a:extLst>
               <a:ext uri="{FF2B5EF4-FFF2-40B4-BE49-F238E27FC236}">
-                <a16:creationId xmlns:a16="http://schemas.microsoft.com/office/drawing/2014/main" id="{889CAA86-2F84-A08E-E60D-7B87109B27D8}"/>
+                <a16:creationId xmlns:a16="http://schemas.microsoft.com/office/drawing/2014/main" id="{AA5F8965-BC7D-F142-E5C3-4D6DD5A1E2C5}"/>
               </a:ext>
             </a:extLst>
           </p:cNvPr>
@@ -5589,8 +5546,8 @@
         </p:blipFill>
         <p:spPr>
           <a:xfrm>
-            <a:off x="1212437" y="3059393"/>
-            <a:ext cx="2340780" cy="2065711"/>
+            <a:off x="6298729" y="2363741"/>
+            <a:ext cx="2897733" cy="3447711"/>
           </a:xfrm>
           <a:prstGeom prst="rect">
             <a:avLst/>
@@ -5599,57 +5556,10 @@
       </p:pic>
       <p:pic>
         <p:nvPicPr>
-          <p:cNvPr id="2052" name="Picture 4" descr="15 melhores ideias de Thumbnail Youtube | thumbnail youtube, photoshop, no  photoshop">
-            <a:extLst>
-              <a:ext uri="{FF2B5EF4-FFF2-40B4-BE49-F238E27FC236}">
-                <a16:creationId xmlns:a16="http://schemas.microsoft.com/office/drawing/2014/main" id="{841EB090-B6F1-FCF3-CFA4-5530B231E7F4}"/>
-              </a:ext>
-            </a:extLst>
-          </p:cNvPr>
-          <p:cNvPicPr>
-            <a:picLocks noChangeAspect="1" noChangeArrowheads="1"/>
-          </p:cNvPicPr>
-          <p:nvPr/>
-        </p:nvPicPr>
-        <p:blipFill>
-          <a:blip r:embed="rId5">
-            <a:extLst>
-              <a:ext uri="{28A0092B-C50C-407E-A947-70E740481C1C}">
-                <a14:useLocalDpi xmlns:a14="http://schemas.microsoft.com/office/drawing/2010/main" val="0"/>
-              </a:ext>
-            </a:extLst>
-          </a:blip>
-          <a:srcRect/>
-          <a:stretch>
-            <a:fillRect/>
-          </a:stretch>
-        </p:blipFill>
-        <p:spPr bwMode="auto">
-          <a:xfrm flipV="1">
-            <a:off x="2859363" y="5250724"/>
-            <a:ext cx="1846603" cy="1080666"/>
-          </a:xfrm>
-          <a:prstGeom prst="rect">
-            <a:avLst/>
-          </a:prstGeom>
-          <a:noFill/>
-          <a:extLst>
-            <a:ext uri="{909E8E84-426E-40DD-AFC4-6F175D3DCCD1}">
-              <a14:hiddenFill xmlns:a14="http://schemas.microsoft.com/office/drawing/2010/main">
-                <a:solidFill>
-                  <a:srgbClr val="FFFFFF"/>
-                </a:solidFill>
-              </a14:hiddenFill>
-            </a:ext>
-          </a:extLst>
-        </p:spPr>
-      </p:pic>
-      <p:pic>
-        <p:nvPicPr>
-          <p:cNvPr id="11" name="Imagem 10">
-            <a:extLst>
-              <a:ext uri="{FF2B5EF4-FFF2-40B4-BE49-F238E27FC236}">
-                <a16:creationId xmlns:a16="http://schemas.microsoft.com/office/drawing/2014/main" id="{661B5F1A-F41C-84FC-7200-C5148D52E426}"/>
+          <p:cNvPr id="9" name="Imagem 8">
+            <a:extLst>
+              <a:ext uri="{FF2B5EF4-FFF2-40B4-BE49-F238E27FC236}">
+                <a16:creationId xmlns:a16="http://schemas.microsoft.com/office/drawing/2014/main" id="{908862AE-8C22-3188-C1B2-ECEC6B6D5643}"/>
               </a:ext>
             </a:extLst>
           </p:cNvPr>
@@ -5659,15 +5569,15 @@
           <p:nvPr/>
         </p:nvPicPr>
         <p:blipFill>
-          <a:blip r:embed="rId6"/>
+          <a:blip r:embed="rId5"/>
           <a:stretch>
             <a:fillRect/>
           </a:stretch>
         </p:blipFill>
         <p:spPr>
           <a:xfrm>
-            <a:off x="4965106" y="2888477"/>
-            <a:ext cx="6831375" cy="3506402"/>
+            <a:off x="9338236" y="2390630"/>
+            <a:ext cx="2591162" cy="1038370"/>
           </a:xfrm>
           <a:prstGeom prst="rect">
             <a:avLst/>
@@ -5677,7 +5587,7 @@
     </p:spTree>
     <p:extLst>
       <p:ext uri="{BB962C8B-B14F-4D97-AF65-F5344CB8AC3E}">
-        <p14:creationId xmlns:p14="http://schemas.microsoft.com/office/powerpoint/2010/main" val="1958081894"/>
+        <p14:creationId xmlns:p14="http://schemas.microsoft.com/office/powerpoint/2010/main" val="541942102"/>
       </p:ext>
     </p:extLst>
   </p:cSld>
@@ -5722,7 +5632,7 @@
         </p:nvSpPr>
         <p:spPr>
           <a:xfrm>
-            <a:off x="1580113" y="2024615"/>
+            <a:off x="1524000" y="1120679"/>
             <a:ext cx="9144000" cy="852211"/>
           </a:xfrm>
         </p:spPr>
@@ -5734,7 +5644,7 @@
           <a:p>
             <a:r>
               <a:rPr lang="pt-BR" sz="4800" dirty="0"/>
-              <a:t>DISCUSSÃO</a:t>
+              <a:t>DESENVOLVIMENTO / RESULTADOS</a:t>
             </a:r>
           </a:p>
         </p:txBody>
@@ -5757,8 +5667,8 @@
         </p:nvSpPr>
         <p:spPr>
           <a:xfrm>
-            <a:off x="1580113" y="3139144"/>
-            <a:ext cx="9750495" cy="1896681"/>
+            <a:off x="301935" y="2006425"/>
+            <a:ext cx="9750495" cy="540868"/>
           </a:xfrm>
         </p:spPr>
         <p:txBody>
@@ -5772,19 +5682,13 @@
               <a:buChar char="-"/>
             </a:pPr>
             <a:r>
-              <a:rPr lang="pt-BR" sz="3200" dirty="0"/>
-              <a:t>COMPARAÇÃO DOS RESULTADOS COM A TEORIA</a:t>
-            </a:r>
-          </a:p>
-          <a:p>
-            <a:pPr marL="457200" indent="-457200" algn="l">
-              <a:buFontTx/>
-              <a:buChar char="-"/>
-            </a:pPr>
-            <a:r>
-              <a:rPr lang="pt-BR" sz="3200" dirty="0"/>
-              <a:t>O QUE FOI DESCOBERTO OU CONSTRUÍDO</a:t>
-            </a:r>
+              <a:rPr lang="pt-BR" sz="2800" dirty="0"/>
+              <a:t>Sistema de elos</a:t>
+            </a:r>
+          </a:p>
+          <a:p>
+            <a:pPr algn="l"/>
+            <a:endParaRPr lang="pt-BR" sz="2800" dirty="0"/>
           </a:p>
         </p:txBody>
       </p:sp>
@@ -5861,10 +5765,46 @@
           </a:prstGeom>
         </p:spPr>
       </p:pic>
+      <p:pic>
+        <p:nvPicPr>
+          <p:cNvPr id="7" name="Imagem 6" descr="Forma, Polígono&#10;&#10;O conteúdo gerado por IA pode estar incorreto.">
+            <a:extLst>
+              <a:ext uri="{FF2B5EF4-FFF2-40B4-BE49-F238E27FC236}">
+                <a16:creationId xmlns:a16="http://schemas.microsoft.com/office/drawing/2014/main" id="{B84E8023-3A70-574E-B2D2-931FC3EA51D5}"/>
+              </a:ext>
+            </a:extLst>
+          </p:cNvPr>
+          <p:cNvPicPr>
+            <a:picLocks noChangeAspect="1"/>
+          </p:cNvPicPr>
+          <p:nvPr/>
+        </p:nvPicPr>
+        <p:blipFill>
+          <a:blip r:embed="rId4">
+            <a:extLst>
+              <a:ext uri="{28A0092B-C50C-407E-A947-70E740481C1C}">
+                <a14:useLocalDpi xmlns:a14="http://schemas.microsoft.com/office/drawing/2010/main" val="0"/>
+              </a:ext>
+            </a:extLst>
+          </a:blip>
+          <a:stretch>
+            <a:fillRect/>
+          </a:stretch>
+        </p:blipFill>
+        <p:spPr>
+          <a:xfrm>
+            <a:off x="2266899" y="2443839"/>
+            <a:ext cx="7482994" cy="4207130"/>
+          </a:xfrm>
+          <a:prstGeom prst="rect">
+            <a:avLst/>
+          </a:prstGeom>
+        </p:spPr>
+      </p:pic>
     </p:spTree>
     <p:extLst>
       <p:ext uri="{BB962C8B-B14F-4D97-AF65-F5344CB8AC3E}">
-        <p14:creationId xmlns:p14="http://schemas.microsoft.com/office/powerpoint/2010/main" val="4104907513"/>
+        <p14:creationId xmlns:p14="http://schemas.microsoft.com/office/powerpoint/2010/main" val="2689894874"/>
       </p:ext>
     </p:extLst>
   </p:cSld>
@@ -5909,7 +5849,7 @@
         </p:nvSpPr>
         <p:spPr>
           <a:xfrm>
-            <a:off x="1580113" y="2024615"/>
+            <a:off x="1580113" y="1339195"/>
             <a:ext cx="9144000" cy="852211"/>
           </a:xfrm>
         </p:spPr>
@@ -5921,7 +5861,7 @@
           <a:p>
             <a:r>
               <a:rPr lang="pt-BR" sz="4800" dirty="0"/>
-              <a:t>CONCLUSÃO</a:t>
+              <a:t>DESENVOLVIMENTO / RESULTADOS</a:t>
             </a:r>
           </a:p>
         </p:txBody>
@@ -5944,8 +5884,8 @@
         </p:nvSpPr>
         <p:spPr>
           <a:xfrm>
-            <a:off x="1580113" y="3139144"/>
-            <a:ext cx="9750495" cy="2307499"/>
+            <a:off x="1276865" y="2345670"/>
+            <a:ext cx="9750495" cy="1896681"/>
           </a:xfrm>
         </p:spPr>
         <p:txBody>
@@ -5959,19 +5899,13 @@
               <a:buChar char="-"/>
             </a:pPr>
             <a:r>
-              <a:rPr lang="pt-BR" sz="3200" dirty="0"/>
-              <a:t>RETOMADA DOS OBJETIVOS E SE FORAM ALCANÇADOS</a:t>
-            </a:r>
-          </a:p>
-          <a:p>
-            <a:pPr marL="457200" indent="-457200" algn="l">
-              <a:buFontTx/>
-              <a:buChar char="-"/>
-            </a:pPr>
-            <a:r>
-              <a:rPr lang="pt-BR" sz="3200" dirty="0"/>
-              <a:t>CONSIDERAÇÕES FINAIS</a:t>
-            </a:r>
+              <a:rPr lang="pt-BR" sz="2800" dirty="0"/>
+              <a:t>Sistema de salas (offline)</a:t>
+            </a:r>
+          </a:p>
+          <a:p>
+            <a:pPr algn="l"/>
+            <a:endParaRPr lang="pt-BR" sz="2800" dirty="0"/>
           </a:p>
         </p:txBody>
       </p:sp>
@@ -6048,10 +5982,117 @@
           </a:prstGeom>
         </p:spPr>
       </p:pic>
+      <p:pic>
+        <p:nvPicPr>
+          <p:cNvPr id="7" name="Imagem 6">
+            <a:extLst>
+              <a:ext uri="{FF2B5EF4-FFF2-40B4-BE49-F238E27FC236}">
+                <a16:creationId xmlns:a16="http://schemas.microsoft.com/office/drawing/2014/main" id="{5E41090B-8C68-8B19-E122-8F014F26238B}"/>
+              </a:ext>
+            </a:extLst>
+          </p:cNvPr>
+          <p:cNvPicPr>
+            <a:picLocks noChangeAspect="1"/>
+          </p:cNvPicPr>
+          <p:nvPr/>
+        </p:nvPicPr>
+        <p:blipFill>
+          <a:blip r:embed="rId4"/>
+          <a:stretch>
+            <a:fillRect/>
+          </a:stretch>
+        </p:blipFill>
+        <p:spPr>
+          <a:xfrm>
+            <a:off x="6207351" y="3026068"/>
+            <a:ext cx="5779433" cy="2953449"/>
+          </a:xfrm>
+          <a:prstGeom prst="rect">
+            <a:avLst/>
+          </a:prstGeom>
+        </p:spPr>
+      </p:pic>
+      <p:pic>
+        <p:nvPicPr>
+          <p:cNvPr id="9" name="Imagem 8">
+            <a:extLst>
+              <a:ext uri="{FF2B5EF4-FFF2-40B4-BE49-F238E27FC236}">
+                <a16:creationId xmlns:a16="http://schemas.microsoft.com/office/drawing/2014/main" id="{EBAF35C5-B46C-C58B-A08C-1B3130234E0A}"/>
+              </a:ext>
+            </a:extLst>
+          </p:cNvPr>
+          <p:cNvPicPr>
+            <a:picLocks noChangeAspect="1"/>
+          </p:cNvPicPr>
+          <p:nvPr/>
+        </p:nvPicPr>
+        <p:blipFill>
+          <a:blip r:embed="rId5"/>
+          <a:stretch>
+            <a:fillRect/>
+          </a:stretch>
+        </p:blipFill>
+        <p:spPr>
+          <a:xfrm>
+            <a:off x="429487" y="2977573"/>
+            <a:ext cx="5518396" cy="1785660"/>
+          </a:xfrm>
+          <a:prstGeom prst="rect">
+            <a:avLst/>
+          </a:prstGeom>
+        </p:spPr>
+      </p:pic>
+      <p:pic>
+        <p:nvPicPr>
+          <p:cNvPr id="1034" name="Picture 10" descr="15 melhores ideias de Thumbnail Youtube | thumbnail youtube, photoshop, no  photoshop">
+            <a:extLst>
+              <a:ext uri="{FF2B5EF4-FFF2-40B4-BE49-F238E27FC236}">
+                <a16:creationId xmlns:a16="http://schemas.microsoft.com/office/drawing/2014/main" id="{55CA89A2-4BC4-4610-CFE8-14DB08D355C9}"/>
+              </a:ext>
+            </a:extLst>
+          </p:cNvPr>
+          <p:cNvPicPr>
+            <a:picLocks noChangeAspect="1" noChangeArrowheads="1"/>
+          </p:cNvPicPr>
+          <p:nvPr/>
+        </p:nvPicPr>
+        <p:blipFill>
+          <a:blip r:embed="rId6">
+            <a:extLst>
+              <a:ext uri="{28A0092B-C50C-407E-A947-70E740481C1C}">
+                <a14:useLocalDpi xmlns:a14="http://schemas.microsoft.com/office/drawing/2010/main" val="0"/>
+              </a:ext>
+            </a:extLst>
+          </a:blip>
+          <a:srcRect/>
+          <a:stretch>
+            <a:fillRect/>
+          </a:stretch>
+        </p:blipFill>
+        <p:spPr bwMode="auto">
+          <a:xfrm flipV="1">
+            <a:off x="4119072" y="4874254"/>
+            <a:ext cx="1618004" cy="847711"/>
+          </a:xfrm>
+          <a:prstGeom prst="rect">
+            <a:avLst/>
+          </a:prstGeom>
+          <a:noFill/>
+          <a:extLst>
+            <a:ext uri="{909E8E84-426E-40DD-AFC4-6F175D3DCCD1}">
+              <a14:hiddenFill xmlns:a14="http://schemas.microsoft.com/office/drawing/2010/main">
+                <a:solidFill>
+                  <a:srgbClr val="FFFFFF"/>
+                </a:solidFill>
+              </a14:hiddenFill>
+            </a:ext>
+          </a:extLst>
+        </p:spPr>
+      </p:pic>
     </p:spTree>
     <p:extLst>
       <p:ext uri="{BB962C8B-B14F-4D97-AF65-F5344CB8AC3E}">
-        <p14:creationId xmlns:p14="http://schemas.microsoft.com/office/powerpoint/2010/main" val="1325944170"/>
+        <p14:creationId xmlns:p14="http://schemas.microsoft.com/office/powerpoint/2010/main" val="2841758471"/>
       </p:ext>
     </p:extLst>
   </p:cSld>
@@ -6066,13 +6107,7 @@
   <p:cSld>
     <p:spTree>
       <p:nvGrpSpPr>
-        <p:cNvPr id="1" name="">
-          <a:extLst>
-            <a:ext uri="{FF2B5EF4-FFF2-40B4-BE49-F238E27FC236}">
-              <a16:creationId xmlns:a16="http://schemas.microsoft.com/office/drawing/2014/main" id="{DC9C449D-B2EE-73E6-9FE8-B2F4AD054168}"/>
-            </a:ext>
-          </a:extLst>
-        </p:cNvPr>
+        <p:cNvPr id="1" name=""/>
         <p:cNvGrpSpPr/>
         <p:nvPr/>
       </p:nvGrpSpPr>
@@ -6089,7 +6124,7 @@
           <p:cNvPr id="2" name="Título 1">
             <a:extLst>
               <a:ext uri="{FF2B5EF4-FFF2-40B4-BE49-F238E27FC236}">
-                <a16:creationId xmlns:a16="http://schemas.microsoft.com/office/drawing/2014/main" id="{9E212F2F-EF2E-4668-E430-6AE92ED06C11}"/>
+                <a16:creationId xmlns:a16="http://schemas.microsoft.com/office/drawing/2014/main" id="{5E447ACB-E7DF-4BBE-AC44-A1AC9F22CAC8}"/>
               </a:ext>
             </a:extLst>
           </p:cNvPr>
@@ -6102,7 +6137,7 @@
         </p:nvSpPr>
         <p:spPr>
           <a:xfrm>
-            <a:off x="1648479" y="1411357"/>
+            <a:off x="1580113" y="1339195"/>
             <a:ext cx="9144000" cy="852211"/>
           </a:xfrm>
         </p:spPr>
@@ -6114,7 +6149,7 @@
           <a:p>
             <a:r>
               <a:rPr lang="pt-BR" sz="4800" dirty="0"/>
-              <a:t>TRABALHOS FUTUROS</a:t>
+              <a:t>DESENVOLVIMENTO / RESULTADOS</a:t>
             </a:r>
           </a:p>
         </p:txBody>
@@ -6124,7 +6159,7 @@
           <p:cNvPr id="3" name="Subtítulo 2">
             <a:extLst>
               <a:ext uri="{FF2B5EF4-FFF2-40B4-BE49-F238E27FC236}">
-                <a16:creationId xmlns:a16="http://schemas.microsoft.com/office/drawing/2014/main" id="{F0FD4423-35C9-AC93-1655-A586ED74B7AB}"/>
+                <a16:creationId xmlns:a16="http://schemas.microsoft.com/office/drawing/2014/main" id="{D925F25B-ABDD-439F-B7AE-9A79A3FDC1CE}"/>
               </a:ext>
             </a:extLst>
           </p:cNvPr>
@@ -6137,8 +6172,8 @@
         </p:nvSpPr>
         <p:spPr>
           <a:xfrm>
-            <a:off x="1345231" y="2548733"/>
-            <a:ext cx="9750495" cy="2307499"/>
+            <a:off x="1276865" y="2345670"/>
+            <a:ext cx="9750495" cy="1896681"/>
           </a:xfrm>
         </p:spPr>
         <p:txBody>
@@ -6152,37 +6187,13 @@
               <a:buChar char="-"/>
             </a:pPr>
             <a:r>
-              <a:rPr lang="pt-BR" sz="3600" dirty="0"/>
-              <a:t>Expansão para outras escolas e séries</a:t>
-            </a:r>
-          </a:p>
-          <a:p>
-            <a:pPr marL="457200" indent="-457200" algn="l">
-              <a:buFontTx/>
-              <a:buChar char="-"/>
-            </a:pPr>
-            <a:r>
-              <a:rPr lang="pt-BR" sz="3600" dirty="0"/>
-              <a:t>Testes de longo prazo</a:t>
-            </a:r>
-          </a:p>
-          <a:p>
-            <a:pPr marL="457200" indent="-457200" algn="l">
-              <a:buFontTx/>
-              <a:buChar char="-"/>
-            </a:pPr>
-            <a:r>
-              <a:rPr lang="pt-BR" sz="3600" dirty="0"/>
-              <a:t>Integração de </a:t>
-            </a:r>
-            <a:r>
-              <a:rPr lang="pt-BR" sz="3600" dirty="0" err="1"/>
-              <a:t>analytics</a:t>
-            </a:r>
-            <a:r>
-              <a:rPr lang="pt-BR" sz="3600" dirty="0"/>
-              <a:t> avançados e AI</a:t>
-            </a:r>
+              <a:rPr lang="pt-BR" sz="2800" dirty="0"/>
+              <a:t>Sistema de salas (online)</a:t>
+            </a:r>
+          </a:p>
+          <a:p>
+            <a:pPr algn="l"/>
+            <a:endParaRPr lang="pt-BR" sz="2800" dirty="0"/>
           </a:p>
         </p:txBody>
       </p:sp>
@@ -6191,7 +6202,7 @@
           <p:cNvPr id="4" name="Imagem 3">
             <a:extLst>
               <a:ext uri="{FF2B5EF4-FFF2-40B4-BE49-F238E27FC236}">
-                <a16:creationId xmlns:a16="http://schemas.microsoft.com/office/drawing/2014/main" id="{493A8972-D029-D532-6E31-0E0FB637787E}"/>
+                <a16:creationId xmlns:a16="http://schemas.microsoft.com/office/drawing/2014/main" id="{4DE49855-8442-4D60-81FD-DFE2DB045AC2}"/>
               </a:ext>
             </a:extLst>
           </p:cNvPr>
@@ -6230,7 +6241,7 @@
           <p:cNvPr id="5" name="Imagem 4">
             <a:extLst>
               <a:ext uri="{FF2B5EF4-FFF2-40B4-BE49-F238E27FC236}">
-                <a16:creationId xmlns:a16="http://schemas.microsoft.com/office/drawing/2014/main" id="{3CA44AA8-F467-9730-06C7-AAB4DB61E516}"/>
+                <a16:creationId xmlns:a16="http://schemas.microsoft.com/office/drawing/2014/main" id="{00EB44F1-66E6-49A0-94D9-09FA009430BD}"/>
               </a:ext>
             </a:extLst>
           </p:cNvPr>
@@ -6259,10 +6270,117 @@
           </a:prstGeom>
         </p:spPr>
       </p:pic>
+      <p:pic>
+        <p:nvPicPr>
+          <p:cNvPr id="7" name="Imagem 6">
+            <a:extLst>
+              <a:ext uri="{FF2B5EF4-FFF2-40B4-BE49-F238E27FC236}">
+                <a16:creationId xmlns:a16="http://schemas.microsoft.com/office/drawing/2014/main" id="{889CAA86-2F84-A08E-E60D-7B87109B27D8}"/>
+              </a:ext>
+            </a:extLst>
+          </p:cNvPr>
+          <p:cNvPicPr>
+            <a:picLocks noChangeAspect="1"/>
+          </p:cNvPicPr>
+          <p:nvPr/>
+        </p:nvPicPr>
+        <p:blipFill>
+          <a:blip r:embed="rId4"/>
+          <a:stretch>
+            <a:fillRect/>
+          </a:stretch>
+        </p:blipFill>
+        <p:spPr>
+          <a:xfrm>
+            <a:off x="1212437" y="3059393"/>
+            <a:ext cx="2340780" cy="2065711"/>
+          </a:xfrm>
+          <a:prstGeom prst="rect">
+            <a:avLst/>
+          </a:prstGeom>
+        </p:spPr>
+      </p:pic>
+      <p:pic>
+        <p:nvPicPr>
+          <p:cNvPr id="2052" name="Picture 4" descr="15 melhores ideias de Thumbnail Youtube | thumbnail youtube, photoshop, no  photoshop">
+            <a:extLst>
+              <a:ext uri="{FF2B5EF4-FFF2-40B4-BE49-F238E27FC236}">
+                <a16:creationId xmlns:a16="http://schemas.microsoft.com/office/drawing/2014/main" id="{841EB090-B6F1-FCF3-CFA4-5530B231E7F4}"/>
+              </a:ext>
+            </a:extLst>
+          </p:cNvPr>
+          <p:cNvPicPr>
+            <a:picLocks noChangeAspect="1" noChangeArrowheads="1"/>
+          </p:cNvPicPr>
+          <p:nvPr/>
+        </p:nvPicPr>
+        <p:blipFill>
+          <a:blip r:embed="rId5">
+            <a:extLst>
+              <a:ext uri="{28A0092B-C50C-407E-A947-70E740481C1C}">
+                <a14:useLocalDpi xmlns:a14="http://schemas.microsoft.com/office/drawing/2010/main" val="0"/>
+              </a:ext>
+            </a:extLst>
+          </a:blip>
+          <a:srcRect/>
+          <a:stretch>
+            <a:fillRect/>
+          </a:stretch>
+        </p:blipFill>
+        <p:spPr bwMode="auto">
+          <a:xfrm flipV="1">
+            <a:off x="2859363" y="5250724"/>
+            <a:ext cx="1846603" cy="1080666"/>
+          </a:xfrm>
+          <a:prstGeom prst="rect">
+            <a:avLst/>
+          </a:prstGeom>
+          <a:noFill/>
+          <a:extLst>
+            <a:ext uri="{909E8E84-426E-40DD-AFC4-6F175D3DCCD1}">
+              <a14:hiddenFill xmlns:a14="http://schemas.microsoft.com/office/drawing/2010/main">
+                <a:solidFill>
+                  <a:srgbClr val="FFFFFF"/>
+                </a:solidFill>
+              </a14:hiddenFill>
+            </a:ext>
+          </a:extLst>
+        </p:spPr>
+      </p:pic>
+      <p:pic>
+        <p:nvPicPr>
+          <p:cNvPr id="11" name="Imagem 10">
+            <a:extLst>
+              <a:ext uri="{FF2B5EF4-FFF2-40B4-BE49-F238E27FC236}">
+                <a16:creationId xmlns:a16="http://schemas.microsoft.com/office/drawing/2014/main" id="{661B5F1A-F41C-84FC-7200-C5148D52E426}"/>
+              </a:ext>
+            </a:extLst>
+          </p:cNvPr>
+          <p:cNvPicPr>
+            <a:picLocks noChangeAspect="1"/>
+          </p:cNvPicPr>
+          <p:nvPr/>
+        </p:nvPicPr>
+        <p:blipFill>
+          <a:blip r:embed="rId6"/>
+          <a:stretch>
+            <a:fillRect/>
+          </a:stretch>
+        </p:blipFill>
+        <p:spPr>
+          <a:xfrm>
+            <a:off x="4965106" y="2888477"/>
+            <a:ext cx="6831375" cy="3506402"/>
+          </a:xfrm>
+          <a:prstGeom prst="rect">
+            <a:avLst/>
+          </a:prstGeom>
+        </p:spPr>
+      </p:pic>
     </p:spTree>
     <p:extLst>
       <p:ext uri="{BB962C8B-B14F-4D97-AF65-F5344CB8AC3E}">
-        <p14:creationId xmlns:p14="http://schemas.microsoft.com/office/powerpoint/2010/main" val="3658637"/>
+        <p14:creationId xmlns:p14="http://schemas.microsoft.com/office/powerpoint/2010/main" val="1958081894"/>
       </p:ext>
     </p:extLst>
   </p:cSld>
@@ -6319,7 +6437,7 @@
           <a:p>
             <a:r>
               <a:rPr lang="pt-BR" sz="4800" dirty="0"/>
-              <a:t>REFERÊNCIAS</a:t>
+              <a:t>DISCUSSÃO</a:t>
             </a:r>
           </a:p>
         </p:txBody>
@@ -6343,7 +6461,7 @@
         <p:spPr>
           <a:xfrm>
             <a:off x="1580113" y="3139144"/>
-            <a:ext cx="9750495" cy="1644891"/>
+            <a:ext cx="9750495" cy="1896681"/>
           </a:xfrm>
         </p:spPr>
         <p:txBody>
@@ -6358,7 +6476,17 @@
             </a:pPr>
             <a:r>
               <a:rPr lang="pt-BR" sz="3200" dirty="0"/>
-              <a:t>PRINCIPAIS FONTES UTILIZADAS (FORMATO ABNT)</a:t>
+              <a:t>COMPARAÇÃO DOS RESULTADOS COM A TEORIA</a:t>
+            </a:r>
+          </a:p>
+          <a:p>
+            <a:pPr marL="457200" indent="-457200" algn="l">
+              <a:buFontTx/>
+              <a:buChar char="-"/>
+            </a:pPr>
+            <a:r>
+              <a:rPr lang="pt-BR" sz="3200" dirty="0"/>
+              <a:t>O QUE FOI DESCOBERTO OU CONSTRUÍDO</a:t>
             </a:r>
           </a:p>
         </p:txBody>
@@ -6439,7 +6567,7 @@
     </p:spTree>
     <p:extLst>
       <p:ext uri="{BB962C8B-B14F-4D97-AF65-F5344CB8AC3E}">
-        <p14:creationId xmlns:p14="http://schemas.microsoft.com/office/powerpoint/2010/main" val="3994031553"/>
+        <p14:creationId xmlns:p14="http://schemas.microsoft.com/office/powerpoint/2010/main" val="4104907513"/>
       </p:ext>
     </p:extLst>
   </p:cSld>
@@ -6694,6 +6822,581 @@
           <a:p>
             <a:r>
               <a:rPr lang="pt-BR" sz="4800" dirty="0"/>
+              <a:t>CONCLUSÃO</a:t>
+            </a:r>
+          </a:p>
+        </p:txBody>
+      </p:sp>
+      <p:sp>
+        <p:nvSpPr>
+          <p:cNvPr id="3" name="Subtítulo 2">
+            <a:extLst>
+              <a:ext uri="{FF2B5EF4-FFF2-40B4-BE49-F238E27FC236}">
+                <a16:creationId xmlns:a16="http://schemas.microsoft.com/office/drawing/2014/main" id="{D925F25B-ABDD-439F-B7AE-9A79A3FDC1CE}"/>
+              </a:ext>
+            </a:extLst>
+          </p:cNvPr>
+          <p:cNvSpPr>
+            <a:spLocks noGrp="1"/>
+          </p:cNvSpPr>
+          <p:nvPr>
+            <p:ph type="subTitle" idx="1"/>
+          </p:nvPr>
+        </p:nvSpPr>
+        <p:spPr>
+          <a:xfrm>
+            <a:off x="1580113" y="3139144"/>
+            <a:ext cx="9750495" cy="2307499"/>
+          </a:xfrm>
+        </p:spPr>
+        <p:txBody>
+          <a:bodyPr>
+            <a:normAutofit/>
+          </a:bodyPr>
+          <a:lstStyle/>
+          <a:p>
+            <a:pPr marL="457200" indent="-457200" algn="l">
+              <a:buFontTx/>
+              <a:buChar char="-"/>
+            </a:pPr>
+            <a:r>
+              <a:rPr lang="pt-BR" sz="3200" dirty="0"/>
+              <a:t>RETOMADA DOS OBJETIVOS E SE FORAM ALCANÇADOS</a:t>
+            </a:r>
+          </a:p>
+          <a:p>
+            <a:pPr marL="457200" indent="-457200" algn="l">
+              <a:buFontTx/>
+              <a:buChar char="-"/>
+            </a:pPr>
+            <a:r>
+              <a:rPr lang="pt-BR" sz="3200" dirty="0"/>
+              <a:t>CONSIDERAÇÕES FINAIS</a:t>
+            </a:r>
+          </a:p>
+        </p:txBody>
+      </p:sp>
+      <p:pic>
+        <p:nvPicPr>
+          <p:cNvPr id="4" name="Imagem 3">
+            <a:extLst>
+              <a:ext uri="{FF2B5EF4-FFF2-40B4-BE49-F238E27FC236}">
+                <a16:creationId xmlns:a16="http://schemas.microsoft.com/office/drawing/2014/main" id="{4DE49855-8442-4D60-81FD-DFE2DB045AC2}"/>
+              </a:ext>
+            </a:extLst>
+          </p:cNvPr>
+          <p:cNvPicPr/>
+          <p:nvPr/>
+        </p:nvPicPr>
+        <p:blipFill>
+          <a:blip r:embed="rId2">
+            <a:extLst>
+              <a:ext uri="{28A0092B-C50C-407E-A947-70E740481C1C}">
+                <a14:useLocalDpi xmlns:a14="http://schemas.microsoft.com/office/drawing/2010/main" val="0"/>
+              </a:ext>
+            </a:extLst>
+          </a:blip>
+          <a:srcRect/>
+          <a:stretch>
+            <a:fillRect/>
+          </a:stretch>
+        </p:blipFill>
+        <p:spPr bwMode="auto">
+          <a:xfrm>
+            <a:off x="901148" y="207031"/>
+            <a:ext cx="1958215" cy="977900"/>
+          </a:xfrm>
+          <a:prstGeom prst="rect">
+            <a:avLst/>
+          </a:prstGeom>
+          <a:noFill/>
+          <a:ln>
+            <a:noFill/>
+          </a:ln>
+        </p:spPr>
+      </p:pic>
+      <p:pic>
+        <p:nvPicPr>
+          <p:cNvPr id="5" name="Imagem 4">
+            <a:extLst>
+              <a:ext uri="{FF2B5EF4-FFF2-40B4-BE49-F238E27FC236}">
+                <a16:creationId xmlns:a16="http://schemas.microsoft.com/office/drawing/2014/main" id="{00EB44F1-66E6-49A0-94D9-09FA009430BD}"/>
+              </a:ext>
+            </a:extLst>
+          </p:cNvPr>
+          <p:cNvPicPr/>
+          <p:nvPr/>
+        </p:nvPicPr>
+        <p:blipFill>
+          <a:blip r:embed="rId3">
+            <a:extLst>
+              <a:ext uri="{28A0092B-C50C-407E-A947-70E740481C1C}">
+                <a14:useLocalDpi xmlns:a14="http://schemas.microsoft.com/office/drawing/2010/main" val="0"/>
+              </a:ext>
+            </a:extLst>
+          </a:blip>
+          <a:stretch>
+            <a:fillRect/>
+          </a:stretch>
+        </p:blipFill>
+        <p:spPr>
+          <a:xfrm>
+            <a:off x="8481392" y="273982"/>
+            <a:ext cx="3142076" cy="852210"/>
+          </a:xfrm>
+          <a:prstGeom prst="rect">
+            <a:avLst/>
+          </a:prstGeom>
+        </p:spPr>
+      </p:pic>
+    </p:spTree>
+    <p:extLst>
+      <p:ext uri="{BB962C8B-B14F-4D97-AF65-F5344CB8AC3E}">
+        <p14:creationId xmlns:p14="http://schemas.microsoft.com/office/powerpoint/2010/main" val="1325944170"/>
+      </p:ext>
+    </p:extLst>
+  </p:cSld>
+  <p:clrMapOvr>
+    <a:masterClrMapping/>
+  </p:clrMapOvr>
+</p:sld>
+</file>
+
+<file path=ppt/slides/slide21.xml><?xml version="1.0" encoding="utf-8"?>
+<p:sld xmlns:a="http://schemas.openxmlformats.org/drawingml/2006/main" xmlns:r="http://schemas.openxmlformats.org/officeDocument/2006/relationships" xmlns:p="http://schemas.openxmlformats.org/presentationml/2006/main">
+  <p:cSld>
+    <p:spTree>
+      <p:nvGrpSpPr>
+        <p:cNvPr id="1" name="">
+          <a:extLst>
+            <a:ext uri="{FF2B5EF4-FFF2-40B4-BE49-F238E27FC236}">
+              <a16:creationId xmlns:a16="http://schemas.microsoft.com/office/drawing/2014/main" id="{DC9C449D-B2EE-73E6-9FE8-B2F4AD054168}"/>
+            </a:ext>
+          </a:extLst>
+        </p:cNvPr>
+        <p:cNvGrpSpPr/>
+        <p:nvPr/>
+      </p:nvGrpSpPr>
+      <p:grpSpPr>
+        <a:xfrm>
+          <a:off x="0" y="0"/>
+          <a:ext cx="0" cy="0"/>
+          <a:chOff x="0" y="0"/>
+          <a:chExt cx="0" cy="0"/>
+        </a:xfrm>
+      </p:grpSpPr>
+      <p:sp>
+        <p:nvSpPr>
+          <p:cNvPr id="2" name="Título 1">
+            <a:extLst>
+              <a:ext uri="{FF2B5EF4-FFF2-40B4-BE49-F238E27FC236}">
+                <a16:creationId xmlns:a16="http://schemas.microsoft.com/office/drawing/2014/main" id="{9E212F2F-EF2E-4668-E430-6AE92ED06C11}"/>
+              </a:ext>
+            </a:extLst>
+          </p:cNvPr>
+          <p:cNvSpPr>
+            <a:spLocks noGrp="1"/>
+          </p:cNvSpPr>
+          <p:nvPr>
+            <p:ph type="ctrTitle"/>
+          </p:nvPr>
+        </p:nvSpPr>
+        <p:spPr>
+          <a:xfrm>
+            <a:off x="1648479" y="1411357"/>
+            <a:ext cx="9144000" cy="852211"/>
+          </a:xfrm>
+        </p:spPr>
+        <p:txBody>
+          <a:bodyPr>
+            <a:noAutofit/>
+          </a:bodyPr>
+          <a:lstStyle/>
+          <a:p>
+            <a:r>
+              <a:rPr lang="pt-BR" sz="4800" dirty="0"/>
+              <a:t>TRABALHOS FUTUROS</a:t>
+            </a:r>
+          </a:p>
+        </p:txBody>
+      </p:sp>
+      <p:sp>
+        <p:nvSpPr>
+          <p:cNvPr id="3" name="Subtítulo 2">
+            <a:extLst>
+              <a:ext uri="{FF2B5EF4-FFF2-40B4-BE49-F238E27FC236}">
+                <a16:creationId xmlns:a16="http://schemas.microsoft.com/office/drawing/2014/main" id="{F0FD4423-35C9-AC93-1655-A586ED74B7AB}"/>
+              </a:ext>
+            </a:extLst>
+          </p:cNvPr>
+          <p:cNvSpPr>
+            <a:spLocks noGrp="1"/>
+          </p:cNvSpPr>
+          <p:nvPr>
+            <p:ph type="subTitle" idx="1"/>
+          </p:nvPr>
+        </p:nvSpPr>
+        <p:spPr>
+          <a:xfrm>
+            <a:off x="1345231" y="2548733"/>
+            <a:ext cx="9750495" cy="2307499"/>
+          </a:xfrm>
+        </p:spPr>
+        <p:txBody>
+          <a:bodyPr>
+            <a:normAutofit/>
+          </a:bodyPr>
+          <a:lstStyle/>
+          <a:p>
+            <a:pPr marL="457200" indent="-457200" algn="l">
+              <a:buFontTx/>
+              <a:buChar char="-"/>
+            </a:pPr>
+            <a:r>
+              <a:rPr lang="pt-BR" sz="3600" dirty="0"/>
+              <a:t>Expansão para outras escolas e séries</a:t>
+            </a:r>
+          </a:p>
+          <a:p>
+            <a:pPr marL="457200" indent="-457200" algn="l">
+              <a:buFontTx/>
+              <a:buChar char="-"/>
+            </a:pPr>
+            <a:r>
+              <a:rPr lang="pt-BR" sz="3600" dirty="0"/>
+              <a:t>Testes de longo prazo</a:t>
+            </a:r>
+          </a:p>
+          <a:p>
+            <a:pPr marL="457200" indent="-457200" algn="l">
+              <a:buFontTx/>
+              <a:buChar char="-"/>
+            </a:pPr>
+            <a:r>
+              <a:rPr lang="pt-BR" sz="3600" dirty="0"/>
+              <a:t>Integração de </a:t>
+            </a:r>
+            <a:r>
+              <a:rPr lang="pt-BR" sz="3600" dirty="0" err="1"/>
+              <a:t>analytics</a:t>
+            </a:r>
+            <a:r>
+              <a:rPr lang="pt-BR" sz="3600" dirty="0"/>
+              <a:t> avançados e AI</a:t>
+            </a:r>
+          </a:p>
+        </p:txBody>
+      </p:sp>
+      <p:pic>
+        <p:nvPicPr>
+          <p:cNvPr id="4" name="Imagem 3">
+            <a:extLst>
+              <a:ext uri="{FF2B5EF4-FFF2-40B4-BE49-F238E27FC236}">
+                <a16:creationId xmlns:a16="http://schemas.microsoft.com/office/drawing/2014/main" id="{493A8972-D029-D532-6E31-0E0FB637787E}"/>
+              </a:ext>
+            </a:extLst>
+          </p:cNvPr>
+          <p:cNvPicPr/>
+          <p:nvPr/>
+        </p:nvPicPr>
+        <p:blipFill>
+          <a:blip r:embed="rId2">
+            <a:extLst>
+              <a:ext uri="{28A0092B-C50C-407E-A947-70E740481C1C}">
+                <a14:useLocalDpi xmlns:a14="http://schemas.microsoft.com/office/drawing/2010/main" val="0"/>
+              </a:ext>
+            </a:extLst>
+          </a:blip>
+          <a:srcRect/>
+          <a:stretch>
+            <a:fillRect/>
+          </a:stretch>
+        </p:blipFill>
+        <p:spPr bwMode="auto">
+          <a:xfrm>
+            <a:off x="901148" y="207031"/>
+            <a:ext cx="1958215" cy="977900"/>
+          </a:xfrm>
+          <a:prstGeom prst="rect">
+            <a:avLst/>
+          </a:prstGeom>
+          <a:noFill/>
+          <a:ln>
+            <a:noFill/>
+          </a:ln>
+        </p:spPr>
+      </p:pic>
+      <p:pic>
+        <p:nvPicPr>
+          <p:cNvPr id="5" name="Imagem 4">
+            <a:extLst>
+              <a:ext uri="{FF2B5EF4-FFF2-40B4-BE49-F238E27FC236}">
+                <a16:creationId xmlns:a16="http://schemas.microsoft.com/office/drawing/2014/main" id="{3CA44AA8-F467-9730-06C7-AAB4DB61E516}"/>
+              </a:ext>
+            </a:extLst>
+          </p:cNvPr>
+          <p:cNvPicPr/>
+          <p:nvPr/>
+        </p:nvPicPr>
+        <p:blipFill>
+          <a:blip r:embed="rId3">
+            <a:extLst>
+              <a:ext uri="{28A0092B-C50C-407E-A947-70E740481C1C}">
+                <a14:useLocalDpi xmlns:a14="http://schemas.microsoft.com/office/drawing/2010/main" val="0"/>
+              </a:ext>
+            </a:extLst>
+          </a:blip>
+          <a:stretch>
+            <a:fillRect/>
+          </a:stretch>
+        </p:blipFill>
+        <p:spPr>
+          <a:xfrm>
+            <a:off x="8481392" y="273982"/>
+            <a:ext cx="3142076" cy="852210"/>
+          </a:xfrm>
+          <a:prstGeom prst="rect">
+            <a:avLst/>
+          </a:prstGeom>
+        </p:spPr>
+      </p:pic>
+    </p:spTree>
+    <p:extLst>
+      <p:ext uri="{BB962C8B-B14F-4D97-AF65-F5344CB8AC3E}">
+        <p14:creationId xmlns:p14="http://schemas.microsoft.com/office/powerpoint/2010/main" val="3658637"/>
+      </p:ext>
+    </p:extLst>
+  </p:cSld>
+  <p:clrMapOvr>
+    <a:masterClrMapping/>
+  </p:clrMapOvr>
+</p:sld>
+</file>
+
+<file path=ppt/slides/slide22.xml><?xml version="1.0" encoding="utf-8"?>
+<p:sld xmlns:a="http://schemas.openxmlformats.org/drawingml/2006/main" xmlns:r="http://schemas.openxmlformats.org/officeDocument/2006/relationships" xmlns:p="http://schemas.openxmlformats.org/presentationml/2006/main">
+  <p:cSld>
+    <p:spTree>
+      <p:nvGrpSpPr>
+        <p:cNvPr id="1" name=""/>
+        <p:cNvGrpSpPr/>
+        <p:nvPr/>
+      </p:nvGrpSpPr>
+      <p:grpSpPr>
+        <a:xfrm>
+          <a:off x="0" y="0"/>
+          <a:ext cx="0" cy="0"/>
+          <a:chOff x="0" y="0"/>
+          <a:chExt cx="0" cy="0"/>
+        </a:xfrm>
+      </p:grpSpPr>
+      <p:sp>
+        <p:nvSpPr>
+          <p:cNvPr id="2" name="Título 1">
+            <a:extLst>
+              <a:ext uri="{FF2B5EF4-FFF2-40B4-BE49-F238E27FC236}">
+                <a16:creationId xmlns:a16="http://schemas.microsoft.com/office/drawing/2014/main" id="{5E447ACB-E7DF-4BBE-AC44-A1AC9F22CAC8}"/>
+              </a:ext>
+            </a:extLst>
+          </p:cNvPr>
+          <p:cNvSpPr>
+            <a:spLocks noGrp="1"/>
+          </p:cNvSpPr>
+          <p:nvPr>
+            <p:ph type="ctrTitle"/>
+          </p:nvPr>
+        </p:nvSpPr>
+        <p:spPr>
+          <a:xfrm>
+            <a:off x="1580113" y="2024615"/>
+            <a:ext cx="9144000" cy="852211"/>
+          </a:xfrm>
+        </p:spPr>
+        <p:txBody>
+          <a:bodyPr>
+            <a:noAutofit/>
+          </a:bodyPr>
+          <a:lstStyle/>
+          <a:p>
+            <a:r>
+              <a:rPr lang="pt-BR" sz="4800" dirty="0"/>
+              <a:t>REFERÊNCIAS</a:t>
+            </a:r>
+          </a:p>
+        </p:txBody>
+      </p:sp>
+      <p:sp>
+        <p:nvSpPr>
+          <p:cNvPr id="3" name="Subtítulo 2">
+            <a:extLst>
+              <a:ext uri="{FF2B5EF4-FFF2-40B4-BE49-F238E27FC236}">
+                <a16:creationId xmlns:a16="http://schemas.microsoft.com/office/drawing/2014/main" id="{D925F25B-ABDD-439F-B7AE-9A79A3FDC1CE}"/>
+              </a:ext>
+            </a:extLst>
+          </p:cNvPr>
+          <p:cNvSpPr>
+            <a:spLocks noGrp="1"/>
+          </p:cNvSpPr>
+          <p:nvPr>
+            <p:ph type="subTitle" idx="1"/>
+          </p:nvPr>
+        </p:nvSpPr>
+        <p:spPr>
+          <a:xfrm>
+            <a:off x="1580113" y="3139144"/>
+            <a:ext cx="9750495" cy="1644891"/>
+          </a:xfrm>
+        </p:spPr>
+        <p:txBody>
+          <a:bodyPr>
+            <a:normAutofit/>
+          </a:bodyPr>
+          <a:lstStyle/>
+          <a:p>
+            <a:pPr marL="457200" indent="-457200" algn="l">
+              <a:buFontTx/>
+              <a:buChar char="-"/>
+            </a:pPr>
+            <a:r>
+              <a:rPr lang="pt-BR" sz="3200" dirty="0"/>
+              <a:t>PRINCIPAIS FONTES UTILIZADAS (FORMATO ABNT)</a:t>
+            </a:r>
+          </a:p>
+        </p:txBody>
+      </p:sp>
+      <p:pic>
+        <p:nvPicPr>
+          <p:cNvPr id="4" name="Imagem 3">
+            <a:extLst>
+              <a:ext uri="{FF2B5EF4-FFF2-40B4-BE49-F238E27FC236}">
+                <a16:creationId xmlns:a16="http://schemas.microsoft.com/office/drawing/2014/main" id="{4DE49855-8442-4D60-81FD-DFE2DB045AC2}"/>
+              </a:ext>
+            </a:extLst>
+          </p:cNvPr>
+          <p:cNvPicPr/>
+          <p:nvPr/>
+        </p:nvPicPr>
+        <p:blipFill>
+          <a:blip r:embed="rId2">
+            <a:extLst>
+              <a:ext uri="{28A0092B-C50C-407E-A947-70E740481C1C}">
+                <a14:useLocalDpi xmlns:a14="http://schemas.microsoft.com/office/drawing/2010/main" val="0"/>
+              </a:ext>
+            </a:extLst>
+          </a:blip>
+          <a:srcRect/>
+          <a:stretch>
+            <a:fillRect/>
+          </a:stretch>
+        </p:blipFill>
+        <p:spPr bwMode="auto">
+          <a:xfrm>
+            <a:off x="901148" y="207031"/>
+            <a:ext cx="1958215" cy="977900"/>
+          </a:xfrm>
+          <a:prstGeom prst="rect">
+            <a:avLst/>
+          </a:prstGeom>
+          <a:noFill/>
+          <a:ln>
+            <a:noFill/>
+          </a:ln>
+        </p:spPr>
+      </p:pic>
+      <p:pic>
+        <p:nvPicPr>
+          <p:cNvPr id="5" name="Imagem 4">
+            <a:extLst>
+              <a:ext uri="{FF2B5EF4-FFF2-40B4-BE49-F238E27FC236}">
+                <a16:creationId xmlns:a16="http://schemas.microsoft.com/office/drawing/2014/main" id="{00EB44F1-66E6-49A0-94D9-09FA009430BD}"/>
+              </a:ext>
+            </a:extLst>
+          </p:cNvPr>
+          <p:cNvPicPr/>
+          <p:nvPr/>
+        </p:nvPicPr>
+        <p:blipFill>
+          <a:blip r:embed="rId3">
+            <a:extLst>
+              <a:ext uri="{28A0092B-C50C-407E-A947-70E740481C1C}">
+                <a14:useLocalDpi xmlns:a14="http://schemas.microsoft.com/office/drawing/2010/main" val="0"/>
+              </a:ext>
+            </a:extLst>
+          </a:blip>
+          <a:stretch>
+            <a:fillRect/>
+          </a:stretch>
+        </p:blipFill>
+        <p:spPr>
+          <a:xfrm>
+            <a:off x="8481392" y="273982"/>
+            <a:ext cx="3142076" cy="852210"/>
+          </a:xfrm>
+          <a:prstGeom prst="rect">
+            <a:avLst/>
+          </a:prstGeom>
+        </p:spPr>
+      </p:pic>
+    </p:spTree>
+    <p:extLst>
+      <p:ext uri="{BB962C8B-B14F-4D97-AF65-F5344CB8AC3E}">
+        <p14:creationId xmlns:p14="http://schemas.microsoft.com/office/powerpoint/2010/main" val="3994031553"/>
+      </p:ext>
+    </p:extLst>
+  </p:cSld>
+  <p:clrMapOvr>
+    <a:masterClrMapping/>
+  </p:clrMapOvr>
+</p:sld>
+</file>
+
+<file path=ppt/slides/slide23.xml><?xml version="1.0" encoding="utf-8"?>
+<p:sld xmlns:a="http://schemas.openxmlformats.org/drawingml/2006/main" xmlns:r="http://schemas.openxmlformats.org/officeDocument/2006/relationships" xmlns:p="http://schemas.openxmlformats.org/presentationml/2006/main">
+  <p:cSld>
+    <p:spTree>
+      <p:nvGrpSpPr>
+        <p:cNvPr id="1" name=""/>
+        <p:cNvGrpSpPr/>
+        <p:nvPr/>
+      </p:nvGrpSpPr>
+      <p:grpSpPr>
+        <a:xfrm>
+          <a:off x="0" y="0"/>
+          <a:ext cx="0" cy="0"/>
+          <a:chOff x="0" y="0"/>
+          <a:chExt cx="0" cy="0"/>
+        </a:xfrm>
+      </p:grpSpPr>
+      <p:sp>
+        <p:nvSpPr>
+          <p:cNvPr id="2" name="Título 1">
+            <a:extLst>
+              <a:ext uri="{FF2B5EF4-FFF2-40B4-BE49-F238E27FC236}">
+                <a16:creationId xmlns:a16="http://schemas.microsoft.com/office/drawing/2014/main" id="{5E447ACB-E7DF-4BBE-AC44-A1AC9F22CAC8}"/>
+              </a:ext>
+            </a:extLst>
+          </p:cNvPr>
+          <p:cNvSpPr>
+            <a:spLocks noGrp="1"/>
+          </p:cNvSpPr>
+          <p:nvPr>
+            <p:ph type="ctrTitle"/>
+          </p:nvPr>
+        </p:nvSpPr>
+        <p:spPr>
+          <a:xfrm>
+            <a:off x="1580113" y="2024615"/>
+            <a:ext cx="9144000" cy="852211"/>
+          </a:xfrm>
+        </p:spPr>
+        <p:txBody>
+          <a:bodyPr>
+            <a:noAutofit/>
+          </a:bodyPr>
+          <a:lstStyle/>
+          <a:p>
+            <a:r>
+              <a:rPr lang="pt-BR" sz="4800" dirty="0"/>
               <a:t>AGRADECIMENTOS (OPCIONAL)</a:t>
             </a:r>
           </a:p>
@@ -7844,8 +8547,8 @@
         </p:nvSpPr>
         <p:spPr>
           <a:xfrm>
-            <a:off x="1580114" y="1706563"/>
-            <a:ext cx="9144000" cy="852211"/>
+            <a:off x="1523999" y="1329337"/>
+            <a:ext cx="9995731" cy="852211"/>
           </a:xfrm>
         </p:spPr>
         <p:txBody>
@@ -7856,7 +8559,7 @@
           <a:p>
             <a:r>
               <a:rPr lang="pt-BR" dirty="0"/>
-              <a:t>METODOLOGIA</a:t>
+              <a:t>METODOLOGIA (Tipo de Pesquisa)</a:t>
             </a:r>
           </a:p>
         </p:txBody>
@@ -7879,13 +8582,13 @@
         </p:nvSpPr>
         <p:spPr>
           <a:xfrm>
-            <a:off x="1580113" y="3139144"/>
-            <a:ext cx="9750495" cy="1896681"/>
+            <a:off x="1469018" y="2384694"/>
+            <a:ext cx="9750495" cy="3347114"/>
           </a:xfrm>
         </p:spPr>
         <p:txBody>
           <a:bodyPr>
-            <a:normAutofit fontScale="92500"/>
+            <a:normAutofit fontScale="77500" lnSpcReduction="20000"/>
           </a:bodyPr>
           <a:lstStyle/>
           <a:p>
@@ -7894,8 +8597,15 @@
               <a:buChar char="-"/>
             </a:pPr>
             <a:r>
+              <a:rPr lang="pt-BR" sz="2800" b="1" dirty="0"/>
+              <a:t>Revisão Bibliográfica</a:t>
+            </a:r>
+            <a:br>
               <a:rPr lang="pt-BR" sz="2800" dirty="0"/>
-              <a:t>TIPO DE PESQUISA: PESQUISA EXPLORATÓRIA, DESCRITIVA, EXPERIMENTAL, DE REVISÃO BIBLIOGRÁFICA E O ESTUDO DE CASO</a:t>
+            </a:br>
+            <a:r>
+              <a:rPr lang="pt-BR" sz="2800" dirty="0"/>
+              <a:t>Levantamento sistemático de artigos e livros sobre gamificação na educação (Google Acadêmico, bases científicas).</a:t>
             </a:r>
           </a:p>
           <a:p>
@@ -7904,8 +8614,15 @@
               <a:buChar char="-"/>
             </a:pPr>
             <a:r>
+              <a:rPr lang="pt-BR" sz="2800" b="1" dirty="0"/>
+              <a:t>Pesquisa Descritiva</a:t>
+            </a:r>
+            <a:br>
               <a:rPr lang="pt-BR" sz="2800" dirty="0"/>
-              <a:t>COMO VOCÊ COLETOU OS DADOS?</a:t>
+            </a:br>
+            <a:r>
+              <a:rPr lang="pt-BR" sz="2800" dirty="0"/>
+              <a:t>Mapeamento das características da plataforma (funcionalidades, tecnologia, fluxo de usuário).</a:t>
             </a:r>
           </a:p>
           <a:p>
@@ -7914,8 +8631,32 @@
               <a:buChar char="-"/>
             </a:pPr>
             <a:r>
+              <a:rPr lang="pt-BR" sz="2800" b="1" dirty="0"/>
+              <a:t>Estudo de Caso</a:t>
+            </a:r>
+            <a:br>
               <a:rPr lang="pt-BR" sz="2800" dirty="0"/>
-              <a:t>ONDE E COM QUEM FOI REALIZADA A PESQUISA?</a:t>
+            </a:br>
+            <a:r>
+              <a:rPr lang="pt-BR" sz="2800" dirty="0"/>
+              <a:t>Exame do projeto-piloto Play2Learn como um caso de aplicação de gamificação no Ensino Médio.</a:t>
+            </a:r>
+          </a:p>
+          <a:p>
+            <a:pPr marL="457200" indent="-457200" algn="l">
+              <a:buFontTx/>
+              <a:buChar char="-"/>
+            </a:pPr>
+            <a:r>
+              <a:rPr lang="pt-BR" sz="2800" b="1" dirty="0"/>
+              <a:t>Pesquisa Exploratória</a:t>
+            </a:r>
+            <a:br>
+              <a:rPr lang="pt-BR" sz="2800" dirty="0"/>
+            </a:br>
+            <a:r>
+              <a:rPr lang="pt-BR" sz="2800" dirty="0"/>
+              <a:t>Investigação inicial para identificar problemas de evasão e engajamento em materiais teóricos e relatórios do IBGE e Instituto Ayrton Senna.</a:t>
             </a:r>
           </a:p>
         </p:txBody>
@@ -8011,7 +8752,13 @@
   <p:cSld>
     <p:spTree>
       <p:nvGrpSpPr>
-        <p:cNvPr id="1" name=""/>
+        <p:cNvPr id="1" name="">
+          <a:extLst>
+            <a:ext uri="{FF2B5EF4-FFF2-40B4-BE49-F238E27FC236}">
+              <a16:creationId xmlns:a16="http://schemas.microsoft.com/office/drawing/2014/main" id="{946AF235-DE9F-259C-30CA-319465FE720B}"/>
+            </a:ext>
+          </a:extLst>
+        </p:cNvPr>
         <p:cNvGrpSpPr/>
         <p:nvPr/>
       </p:nvGrpSpPr>
@@ -8028,7 +8775,7 @@
           <p:cNvPr id="2" name="Título 1">
             <a:extLst>
               <a:ext uri="{FF2B5EF4-FFF2-40B4-BE49-F238E27FC236}">
-                <a16:creationId xmlns:a16="http://schemas.microsoft.com/office/drawing/2014/main" id="{5E447ACB-E7DF-4BBE-AC44-A1AC9F22CAC8}"/>
+                <a16:creationId xmlns:a16="http://schemas.microsoft.com/office/drawing/2014/main" id="{8FAD09A0-52C1-CBDE-4D7B-B86452663256}"/>
               </a:ext>
             </a:extLst>
           </p:cNvPr>
@@ -8041,19 +8788,19 @@
         </p:nvSpPr>
         <p:spPr>
           <a:xfrm>
-            <a:off x="1580113" y="1339195"/>
-            <a:ext cx="9144000" cy="852211"/>
+            <a:off x="1580113" y="1304910"/>
+            <a:ext cx="9750495" cy="852211"/>
           </a:xfrm>
         </p:spPr>
         <p:txBody>
           <a:bodyPr>
-            <a:noAutofit/>
+            <a:normAutofit fontScale="90000"/>
           </a:bodyPr>
           <a:lstStyle/>
           <a:p>
             <a:r>
-              <a:rPr lang="pt-BR" sz="4800" dirty="0"/>
-              <a:t>DESENVOLVIMENTO</a:t>
+              <a:rPr lang="pt-BR" dirty="0"/>
+              <a:t>METODOLOGIA (Coleta de Dados)</a:t>
             </a:r>
           </a:p>
         </p:txBody>
@@ -8063,7 +8810,7 @@
           <p:cNvPr id="3" name="Subtítulo 2">
             <a:extLst>
               <a:ext uri="{FF2B5EF4-FFF2-40B4-BE49-F238E27FC236}">
-                <a16:creationId xmlns:a16="http://schemas.microsoft.com/office/drawing/2014/main" id="{D925F25B-ABDD-439F-B7AE-9A79A3FDC1CE}"/>
+                <a16:creationId xmlns:a16="http://schemas.microsoft.com/office/drawing/2014/main" id="{837E3163-D9C6-5887-3A44-B81034BFCB99}"/>
               </a:ext>
             </a:extLst>
           </p:cNvPr>
@@ -8076,8 +8823,8 @@
         </p:nvSpPr>
         <p:spPr>
           <a:xfrm>
-            <a:off x="1276865" y="2345670"/>
-            <a:ext cx="9750495" cy="3525291"/>
+            <a:off x="1580114" y="2404207"/>
+            <a:ext cx="9750495" cy="3321477"/>
           </a:xfrm>
         </p:spPr>
         <p:txBody>
@@ -8092,73 +8839,55 @@
             </a:pPr>
             <a:r>
               <a:rPr lang="pt-BR" sz="2800" b="1" dirty="0"/>
-              <a:t>Atores</a:t>
-            </a:r>
-            <a:endParaRPr lang="pt-BR" b="1" dirty="0"/>
-          </a:p>
-          <a:p>
-            <a:pPr marL="914400" lvl="1" indent="-457200" algn="l">
+              <a:t>Revisão de Literatura</a:t>
+            </a:r>
+            <a:br>
+              <a:rPr lang="pt-BR" sz="1600" dirty="0"/>
+            </a:br>
+            <a:r>
+              <a:rPr lang="pt-BR" sz="2000" dirty="0"/>
+              <a:t>Seleção de artigos, teses e relatórios sobre gamificação e engajamento escolar.</a:t>
+            </a:r>
+          </a:p>
+          <a:p>
+            <a:pPr marL="457200" indent="-457200" algn="l">
               <a:buFontTx/>
               <a:buChar char="-"/>
             </a:pPr>
             <a:r>
-              <a:rPr lang="pt-BR" sz="2400" dirty="0">
-                <a:effectLst/>
-                <a:latin typeface="Arial" panose="020B0604020202020204" pitchFamily="34" charset="0"/>
-                <a:ea typeface="Calibri" panose="020F0502020204030204" pitchFamily="34" charset="0"/>
-              </a:rPr>
-              <a:t>Aluno</a:t>
-            </a:r>
-          </a:p>
-          <a:p>
-            <a:pPr marL="914400" lvl="1" indent="-457200" algn="l">
+              <a:rPr lang="pt-BR" sz="2800" b="1" dirty="0"/>
+              <a:t>Entrevistas pessoais</a:t>
+            </a:r>
+            <a:br>
+              <a:rPr lang="pt-BR" sz="2000" dirty="0"/>
+            </a:br>
+            <a:r>
+              <a:rPr lang="pt-BR" sz="2000" dirty="0"/>
+              <a:t>Foram realizadas entrevistas informais com conhecidos que ainda fazem pare do Ensino Médio, para mapear hábitos de estudo e motivação</a:t>
+            </a:r>
+          </a:p>
+          <a:p>
+            <a:pPr marL="457200" indent="-457200" algn="l">
               <a:buFontTx/>
               <a:buChar char="-"/>
             </a:pPr>
             <a:r>
-              <a:rPr lang="pt-BR" sz="2400" dirty="0">
-                <a:effectLst/>
-                <a:latin typeface="Arial" panose="020B0604020202020204" pitchFamily="34" charset="0"/>
-                <a:ea typeface="Calibri" panose="020F0502020204030204" pitchFamily="34" charset="0"/>
-              </a:rPr>
-              <a:t>Professor</a:t>
-            </a:r>
-            <a:endParaRPr lang="pt-BR" sz="2400" dirty="0">
-              <a:latin typeface="Arial" panose="020B0604020202020204" pitchFamily="34" charset="0"/>
-              <a:ea typeface="Calibri" panose="020F0502020204030204" pitchFamily="34" charset="0"/>
-            </a:endParaRPr>
-          </a:p>
-          <a:p>
-            <a:pPr marL="914400" lvl="1" indent="-457200" algn="l">
+              <a:rPr lang="pt-BR" sz="2800" b="1" dirty="0"/>
+              <a:t>Fontes Secundárias</a:t>
+            </a:r>
+            <a:br>
+              <a:rPr lang="pt-BR" sz="1600" dirty="0"/>
+            </a:br>
+            <a:r>
+              <a:rPr lang="pt-BR" sz="2000" dirty="0"/>
+              <a:t>Estatísticas de evasão e desempenho (IBGE, INEP, publicações institucionais)</a:t>
+            </a:r>
+          </a:p>
+          <a:p>
+            <a:pPr marL="457200" indent="-457200" algn="l">
               <a:buFontTx/>
               <a:buChar char="-"/>
             </a:pPr>
-            <a:r>
-              <a:rPr lang="pt-BR" sz="2400" dirty="0">
-                <a:effectLst/>
-                <a:latin typeface="Arial" panose="020B0604020202020204" pitchFamily="34" charset="0"/>
-                <a:ea typeface="Calibri" panose="020F0502020204030204" pitchFamily="34" charset="0"/>
-              </a:rPr>
-              <a:t>Diretor</a:t>
-            </a:r>
-          </a:p>
-          <a:p>
-            <a:pPr marL="914400" lvl="1" indent="-457200" algn="l">
-              <a:buFontTx/>
-              <a:buChar char="-"/>
-            </a:pPr>
-            <a:r>
-              <a:rPr lang="pt-BR" sz="2400" dirty="0">
-                <a:effectLst/>
-                <a:latin typeface="Arial" panose="020B0604020202020204" pitchFamily="34" charset="0"/>
-                <a:ea typeface="Calibri" panose="020F0502020204030204" pitchFamily="34" charset="0"/>
-              </a:rPr>
-              <a:t>Administrador</a:t>
-            </a:r>
-            <a:endParaRPr lang="pt-BR" sz="2400" dirty="0"/>
-          </a:p>
-          <a:p>
-            <a:pPr algn="l"/>
             <a:endParaRPr lang="pt-BR" sz="2800" dirty="0"/>
           </a:p>
         </p:txBody>
@@ -8168,7 +8897,7 @@
           <p:cNvPr id="4" name="Imagem 3">
             <a:extLst>
               <a:ext uri="{FF2B5EF4-FFF2-40B4-BE49-F238E27FC236}">
-                <a16:creationId xmlns:a16="http://schemas.microsoft.com/office/drawing/2014/main" id="{4DE49855-8442-4D60-81FD-DFE2DB045AC2}"/>
+                <a16:creationId xmlns:a16="http://schemas.microsoft.com/office/drawing/2014/main" id="{928A2235-C52E-3735-872A-B40D7924CE6F}"/>
               </a:ext>
             </a:extLst>
           </p:cNvPr>
@@ -8207,7 +8936,7 @@
           <p:cNvPr id="5" name="Imagem 4">
             <a:extLst>
               <a:ext uri="{FF2B5EF4-FFF2-40B4-BE49-F238E27FC236}">
-                <a16:creationId xmlns:a16="http://schemas.microsoft.com/office/drawing/2014/main" id="{00EB44F1-66E6-49A0-94D9-09FA009430BD}"/>
+                <a16:creationId xmlns:a16="http://schemas.microsoft.com/office/drawing/2014/main" id="{1689A014-497A-87BA-B1B2-8A829855F4E1}"/>
               </a:ext>
             </a:extLst>
           </p:cNvPr>
@@ -8239,7 +8968,7 @@
     </p:spTree>
     <p:extLst>
       <p:ext uri="{BB962C8B-B14F-4D97-AF65-F5344CB8AC3E}">
-        <p14:creationId xmlns:p14="http://schemas.microsoft.com/office/powerpoint/2010/main" val="1917091790"/>
+        <p14:creationId xmlns:p14="http://schemas.microsoft.com/office/powerpoint/2010/main" val="3620024156"/>
       </p:ext>
     </p:extLst>
   </p:cSld>
@@ -8254,7 +8983,13 @@
   <p:cSld>
     <p:spTree>
       <p:nvGrpSpPr>
-        <p:cNvPr id="1" name=""/>
+        <p:cNvPr id="1" name="">
+          <a:extLst>
+            <a:ext uri="{FF2B5EF4-FFF2-40B4-BE49-F238E27FC236}">
+              <a16:creationId xmlns:a16="http://schemas.microsoft.com/office/drawing/2014/main" id="{0A850B17-B98A-1D8C-C610-E88FFA6D4CF6}"/>
+            </a:ext>
+          </a:extLst>
+        </p:cNvPr>
         <p:cNvGrpSpPr/>
         <p:nvPr/>
       </p:nvGrpSpPr>
@@ -8271,7 +9006,7 @@
           <p:cNvPr id="2" name="Título 1">
             <a:extLst>
               <a:ext uri="{FF2B5EF4-FFF2-40B4-BE49-F238E27FC236}">
-                <a16:creationId xmlns:a16="http://schemas.microsoft.com/office/drawing/2014/main" id="{5E447ACB-E7DF-4BBE-AC44-A1AC9F22CAC8}"/>
+                <a16:creationId xmlns:a16="http://schemas.microsoft.com/office/drawing/2014/main" id="{28DE7EB5-C947-3A8E-EC23-1FED5749F638}"/>
               </a:ext>
             </a:extLst>
           </p:cNvPr>
@@ -8284,19 +9019,19 @@
         </p:nvSpPr>
         <p:spPr>
           <a:xfrm>
-            <a:off x="1417743" y="942458"/>
-            <a:ext cx="9144000" cy="852211"/>
+            <a:off x="1066807" y="1638197"/>
+            <a:ext cx="10777105" cy="852211"/>
           </a:xfrm>
         </p:spPr>
         <p:txBody>
           <a:bodyPr>
-            <a:noAutofit/>
+            <a:normAutofit fontScale="90000"/>
           </a:bodyPr>
           <a:lstStyle/>
           <a:p>
             <a:r>
-              <a:rPr lang="pt-BR" sz="4800" dirty="0"/>
-              <a:t>DESENVOLVIMENTO</a:t>
+              <a:rPr lang="pt-BR" dirty="0"/>
+              <a:t>METODOLOGIA (Local e Participantes)</a:t>
             </a:r>
           </a:p>
         </p:txBody>
@@ -8306,7 +9041,7 @@
           <p:cNvPr id="3" name="Subtítulo 2">
             <a:extLst>
               <a:ext uri="{FF2B5EF4-FFF2-40B4-BE49-F238E27FC236}">
-                <a16:creationId xmlns:a16="http://schemas.microsoft.com/office/drawing/2014/main" id="{D925F25B-ABDD-439F-B7AE-9A79A3FDC1CE}"/>
+                <a16:creationId xmlns:a16="http://schemas.microsoft.com/office/drawing/2014/main" id="{D2CF158D-A03D-2A3A-60A0-023DB6C50F98}"/>
               </a:ext>
             </a:extLst>
           </p:cNvPr>
@@ -8319,13 +9054,13 @@
         </p:nvSpPr>
         <p:spPr>
           <a:xfrm>
-            <a:off x="1220752" y="1920358"/>
-            <a:ext cx="9750495" cy="1896681"/>
+            <a:off x="1580113" y="3139144"/>
+            <a:ext cx="9750495" cy="2766000"/>
           </a:xfrm>
         </p:spPr>
         <p:txBody>
           <a:bodyPr>
-            <a:normAutofit/>
+            <a:normAutofit lnSpcReduction="10000"/>
           </a:bodyPr>
           <a:lstStyle/>
           <a:p>
@@ -8334,9 +9069,62 @@
               <a:buChar char="-"/>
             </a:pPr>
             <a:r>
+              <a:rPr lang="pt-BR" sz="2800" b="1" dirty="0"/>
+              <a:t>Local</a:t>
+            </a:r>
+            <a:r>
               <a:rPr lang="pt-BR" sz="2800" dirty="0"/>
-              <a:t>Diagrama de Classe</a:t>
-            </a:r>
+              <a:t>:</a:t>
+            </a:r>
+            <a:br>
+              <a:rPr lang="pt-BR" sz="2000" dirty="0"/>
+            </a:br>
+            <a:r>
+              <a:rPr lang="pt-BR" sz="2000" dirty="0"/>
+              <a:t>Liceu Santista (Santos/SP) — laboratórios de informática e salas de aula.</a:t>
+            </a:r>
+          </a:p>
+          <a:p>
+            <a:pPr marL="457200" indent="-457200" algn="l">
+              <a:buFontTx/>
+              <a:buChar char="-"/>
+            </a:pPr>
+            <a:r>
+              <a:rPr lang="pt-BR" sz="2800" b="1" dirty="0"/>
+              <a:t>Participantes:</a:t>
+            </a:r>
+            <a:br>
+              <a:rPr lang="pt-BR" sz="2800" dirty="0"/>
+            </a:br>
+            <a:r>
+              <a:rPr lang="pt-BR" sz="2000" dirty="0"/>
+              <a:t>Alunos: turma-piloto de 2ª série (n≈10), selecionados por conveniência.</a:t>
+            </a:r>
+          </a:p>
+          <a:p>
+            <a:pPr marL="457200" indent="-457200" algn="l">
+              <a:buFontTx/>
+              <a:buChar char="-"/>
+            </a:pPr>
+            <a:r>
+              <a:rPr lang="pt-BR" sz="3000" b="1" dirty="0"/>
+              <a:t>Período:</a:t>
+            </a:r>
+            <a:br>
+              <a:rPr lang="pt-BR" sz="2000" dirty="0"/>
+            </a:br>
+            <a:r>
+              <a:rPr lang="pt-BR" sz="2000" dirty="0"/>
+              <a:t>Dia 28 de maio de 2025, durante o período da tarde, teste em laboratório de informática</a:t>
+            </a:r>
+          </a:p>
+          <a:p>
+            <a:pPr algn="l"/>
+            <a:r>
+              <a:rPr lang="pt-BR" sz="2000" dirty="0"/>
+              <a:t>	</a:t>
+            </a:r>
+            <a:endParaRPr lang="pt-BR" sz="2800" dirty="0"/>
           </a:p>
         </p:txBody>
       </p:sp>
@@ -8345,7 +9133,7 @@
           <p:cNvPr id="4" name="Imagem 3">
             <a:extLst>
               <a:ext uri="{FF2B5EF4-FFF2-40B4-BE49-F238E27FC236}">
-                <a16:creationId xmlns:a16="http://schemas.microsoft.com/office/drawing/2014/main" id="{4DE49855-8442-4D60-81FD-DFE2DB045AC2}"/>
+                <a16:creationId xmlns:a16="http://schemas.microsoft.com/office/drawing/2014/main" id="{5A2928C0-B3A7-E388-2948-1D0702AC38AF}"/>
               </a:ext>
             </a:extLst>
           </p:cNvPr>
@@ -8384,7 +9172,7 @@
           <p:cNvPr id="5" name="Imagem 4">
             <a:extLst>
               <a:ext uri="{FF2B5EF4-FFF2-40B4-BE49-F238E27FC236}">
-                <a16:creationId xmlns:a16="http://schemas.microsoft.com/office/drawing/2014/main" id="{00EB44F1-66E6-49A0-94D9-09FA009430BD}"/>
+                <a16:creationId xmlns:a16="http://schemas.microsoft.com/office/drawing/2014/main" id="{7396E38A-7803-6EC0-67C0-4E8ED4C1CFFF}"/>
               </a:ext>
             </a:extLst>
           </p:cNvPr>
@@ -8413,107 +9201,10 @@
           </a:prstGeom>
         </p:spPr>
       </p:pic>
-      <p:pic>
-        <p:nvPicPr>
-          <p:cNvPr id="6" name="Imagem 5" descr="Diagrama, Desenho técnico&#10;&#10;O conteúdo gerado por IA pode estar incorreto.">
-            <a:extLst>
-              <a:ext uri="{FF2B5EF4-FFF2-40B4-BE49-F238E27FC236}">
-                <a16:creationId xmlns:a16="http://schemas.microsoft.com/office/drawing/2014/main" id="{B550CFC9-D36F-B621-311A-377D52F54910}"/>
-              </a:ext>
-            </a:extLst>
-          </p:cNvPr>
-          <p:cNvPicPr>
-            <a:picLocks noChangeAspect="1"/>
-          </p:cNvPicPr>
-          <p:nvPr/>
-        </p:nvPicPr>
-        <p:blipFill>
-          <a:blip r:embed="rId4">
-            <a:extLst>
-              <a:ext uri="{28A0092B-C50C-407E-A947-70E740481C1C}">
-                <a14:useLocalDpi xmlns:a14="http://schemas.microsoft.com/office/drawing/2010/main" val="0"/>
-              </a:ext>
-            </a:extLst>
-          </a:blip>
-          <a:srcRect/>
-          <a:stretch>
-            <a:fillRect/>
-          </a:stretch>
-        </p:blipFill>
-        <p:spPr bwMode="auto">
-          <a:xfrm>
-            <a:off x="5798459" y="1794668"/>
-            <a:ext cx="4823105" cy="4755586"/>
-          </a:xfrm>
-          <a:prstGeom prst="rect">
-            <a:avLst/>
-          </a:prstGeom>
-          <a:noFill/>
-          <a:ln>
-            <a:noFill/>
-          </a:ln>
-        </p:spPr>
-      </p:pic>
-      <p:sp>
-        <p:nvSpPr>
-          <p:cNvPr id="8" name="CaixaDeTexto 7">
-            <a:extLst>
-              <a:ext uri="{FF2B5EF4-FFF2-40B4-BE49-F238E27FC236}">
-                <a16:creationId xmlns:a16="http://schemas.microsoft.com/office/drawing/2014/main" id="{726E5CC1-EEC2-CA63-0847-2348B81DF330}"/>
-              </a:ext>
-            </a:extLst>
-          </p:cNvPr>
-          <p:cNvSpPr txBox="1"/>
-          <p:nvPr/>
-        </p:nvSpPr>
-        <p:spPr>
-          <a:xfrm>
-            <a:off x="5716827" y="6537443"/>
-            <a:ext cx="6097424" cy="276999"/>
-          </a:xfrm>
-          <a:prstGeom prst="rect">
-            <a:avLst/>
-          </a:prstGeom>
-          <a:noFill/>
-        </p:spPr>
-        <p:txBody>
-          <a:bodyPr wrap="square">
-            <a:spAutoFit/>
-          </a:bodyPr>
-          <a:lstStyle/>
-          <a:p>
-            <a:pPr algn="just"/>
-            <a:r>
-              <a:rPr lang="pt-BR" sz="1200" dirty="0">
-                <a:effectLst/>
-                <a:latin typeface="Arial" panose="020B0604020202020204" pitchFamily="34" charset="0"/>
-                <a:ea typeface="Calibri" panose="020F0502020204030204" pitchFamily="34" charset="0"/>
-                <a:cs typeface="Times New Roman" panose="02020603050405020304" pitchFamily="18" charset="0"/>
-              </a:rPr>
-              <a:t>Fonte: Elaborado pelo autor com </a:t>
-            </a:r>
-            <a:r>
-              <a:rPr lang="pt-BR" sz="1200" dirty="0" err="1">
-                <a:effectLst/>
-                <a:latin typeface="Arial" panose="020B0604020202020204" pitchFamily="34" charset="0"/>
-                <a:ea typeface="Calibri" panose="020F0502020204030204" pitchFamily="34" charset="0"/>
-                <a:cs typeface="Times New Roman" panose="02020603050405020304" pitchFamily="18" charset="0"/>
-              </a:rPr>
-              <a:t>PlantUML</a:t>
-            </a:r>
-            <a:endParaRPr lang="pt-BR" sz="1200" dirty="0">
-              <a:effectLst/>
-              <a:latin typeface="Calibri" panose="020F0502020204030204" pitchFamily="34" charset="0"/>
-              <a:ea typeface="Calibri" panose="020F0502020204030204" pitchFamily="34" charset="0"/>
-              <a:cs typeface="Times New Roman" panose="02020603050405020304" pitchFamily="18" charset="0"/>
-            </a:endParaRPr>
-          </a:p>
-        </p:txBody>
-      </p:sp>
     </p:spTree>
     <p:extLst>
       <p:ext uri="{BB962C8B-B14F-4D97-AF65-F5344CB8AC3E}">
-        <p14:creationId xmlns:p14="http://schemas.microsoft.com/office/powerpoint/2010/main" val="686589215"/>
+        <p14:creationId xmlns:p14="http://schemas.microsoft.com/office/powerpoint/2010/main" val="221259457"/>
       </p:ext>
     </p:extLst>
   </p:cSld>

</xml_diff>